<commit_message>
Updated .ppt, added Computer Specs file
</commit_message>
<xml_diff>
--- a/CMP202 Assessment.pptx
+++ b/CMP202 Assessment.pptx
@@ -114,6 +114,11 @@
       </a:defRPr>
     </a:lvl9pPr>
   </p:defaultTextStyle>
+  <p:extLst>
+    <p:ext uri="{EFAFB233-063F-42B5-8137-9DF3F51BA10A}">
+      <p15:sldGuideLst xmlns:p15="http://schemas.microsoft.com/office/powerpoint/2012/main"/>
+    </p:ext>
+  </p:extLst>
 </p:presentation>
 </file>
 
@@ -167,7 +172,7 @@
           <a:noFill/>
           <a:extLst>
             <a:ext uri="{909E8E84-426E-40dd-AFC4-6F175D3DCCD1}">
-              <a14:hiddenFill xmlns:a14="http://schemas.microsoft.com/office/drawing/2010/main" xmlns="">
+              <a14:hiddenFill xmlns="" xmlns:a14="http://schemas.microsoft.com/office/drawing/2010/main">
                 <a:solidFill>
                   <a:srgbClr val="FFFFFF"/>
                 </a:solidFill>
@@ -227,7 +232,7 @@
             </a:ln>
             <a:extLst>
               <a:ext uri="{91240B29-F687-4f45-9708-019B960494DF}">
-                <a14:hiddenLine xmlns:a14="http://schemas.microsoft.com/office/drawing/2010/main" xmlns="" w="9525">
+                <a14:hiddenLine xmlns="" xmlns:a14="http://schemas.microsoft.com/office/drawing/2010/main" w="9525">
                   <a:solidFill>
                     <a:srgbClr val="000000"/>
                   </a:solidFill>
@@ -317,7 +322,7 @@
             </a:ln>
             <a:extLst>
               <a:ext uri="{91240B29-F687-4f45-9708-019B960494DF}">
-                <a14:hiddenLine xmlns:a14="http://schemas.microsoft.com/office/drawing/2010/main" xmlns="" w="9525">
+                <a14:hiddenLine xmlns="" xmlns:a14="http://schemas.microsoft.com/office/drawing/2010/main" w="9525">
                   <a:solidFill>
                     <a:srgbClr val="000000"/>
                   </a:solidFill>
@@ -407,7 +412,7 @@
             </a:ln>
             <a:extLst>
               <a:ext uri="{91240B29-F687-4f45-9708-019B960494DF}">
-                <a14:hiddenLine xmlns:a14="http://schemas.microsoft.com/office/drawing/2010/main" xmlns="" w="9525">
+                <a14:hiddenLine xmlns="" xmlns:a14="http://schemas.microsoft.com/office/drawing/2010/main" w="9525">
                   <a:solidFill>
                     <a:srgbClr val="000000"/>
                   </a:solidFill>
@@ -441,7 +446,7 @@
             </a:ln>
             <a:extLst>
               <a:ext uri="{91240B29-F687-4f45-9708-019B960494DF}">
-                <a14:hiddenLine xmlns:a14="http://schemas.microsoft.com/office/drawing/2010/main" xmlns="" w="9525">
+                <a14:hiddenLine xmlns="" xmlns:a14="http://schemas.microsoft.com/office/drawing/2010/main" w="9525">
                   <a:solidFill>
                     <a:srgbClr val="000000"/>
                   </a:solidFill>
@@ -531,7 +536,7 @@
             </a:ln>
             <a:extLst>
               <a:ext uri="{91240B29-F687-4f45-9708-019B960494DF}">
-                <a14:hiddenLine xmlns:a14="http://schemas.microsoft.com/office/drawing/2010/main" xmlns="" w="9525">
+                <a14:hiddenLine xmlns="" xmlns:a14="http://schemas.microsoft.com/office/drawing/2010/main" w="9525">
                   <a:solidFill>
                     <a:srgbClr val="000000"/>
                   </a:solidFill>
@@ -593,7 +598,7 @@
             </a:ln>
             <a:extLst>
               <a:ext uri="{91240B29-F687-4f45-9708-019B960494DF}">
-                <a14:hiddenLine xmlns:a14="http://schemas.microsoft.com/office/drawing/2010/main" xmlns="" w="9525">
+                <a14:hiddenLine xmlns="" xmlns:a14="http://schemas.microsoft.com/office/drawing/2010/main" w="9525">
                   <a:solidFill>
                     <a:srgbClr val="000000"/>
                   </a:solidFill>
@@ -655,7 +660,7 @@
             </a:ln>
             <a:extLst>
               <a:ext uri="{91240B29-F687-4f45-9708-019B960494DF}">
-                <a14:hiddenLine xmlns:a14="http://schemas.microsoft.com/office/drawing/2010/main" xmlns="" w="9525">
+                <a14:hiddenLine xmlns="" xmlns:a14="http://schemas.microsoft.com/office/drawing/2010/main" w="9525">
                   <a:solidFill>
                     <a:srgbClr val="000000"/>
                   </a:solidFill>
@@ -745,7 +750,7 @@
             </a:ln>
             <a:extLst>
               <a:ext uri="{91240B29-F687-4f45-9708-019B960494DF}">
-                <a14:hiddenLine xmlns:a14="http://schemas.microsoft.com/office/drawing/2010/main" xmlns="" w="9525">
+                <a14:hiddenLine xmlns="" xmlns:a14="http://schemas.microsoft.com/office/drawing/2010/main" w="9525">
                   <a:solidFill>
                     <a:srgbClr val="000000"/>
                   </a:solidFill>
@@ -807,7 +812,7 @@
             </a:ln>
             <a:extLst>
               <a:ext uri="{91240B29-F687-4f45-9708-019B960494DF}">
-                <a14:hiddenLine xmlns:a14="http://schemas.microsoft.com/office/drawing/2010/main" xmlns="" w="9525">
+                <a14:hiddenLine xmlns="" xmlns:a14="http://schemas.microsoft.com/office/drawing/2010/main" w="9525">
                   <a:solidFill>
                     <a:srgbClr val="000000"/>
                   </a:solidFill>
@@ -869,7 +874,7 @@
             </a:ln>
             <a:extLst>
               <a:ext uri="{91240B29-F687-4f45-9708-019B960494DF}">
-                <a14:hiddenLine xmlns:a14="http://schemas.microsoft.com/office/drawing/2010/main" xmlns="" w="9525">
+                <a14:hiddenLine xmlns="" xmlns:a14="http://schemas.microsoft.com/office/drawing/2010/main" w="9525">
                   <a:solidFill>
                     <a:srgbClr val="000000"/>
                   </a:solidFill>
@@ -959,7 +964,7 @@
             </a:ln>
             <a:extLst>
               <a:ext uri="{91240B29-F687-4f45-9708-019B960494DF}">
-                <a14:hiddenLine xmlns:a14="http://schemas.microsoft.com/office/drawing/2010/main" xmlns="" w="9525">
+                <a14:hiddenLine xmlns="" xmlns:a14="http://schemas.microsoft.com/office/drawing/2010/main" w="9525">
                   <a:solidFill>
                     <a:srgbClr val="000000"/>
                   </a:solidFill>
@@ -1049,7 +1054,7 @@
             </a:ln>
             <a:extLst>
               <a:ext uri="{91240B29-F687-4f45-9708-019B960494DF}">
-                <a14:hiddenLine xmlns:a14="http://schemas.microsoft.com/office/drawing/2010/main" xmlns="" w="9525">
+                <a14:hiddenLine xmlns="" xmlns:a14="http://schemas.microsoft.com/office/drawing/2010/main" w="9525">
                   <a:solidFill>
                     <a:srgbClr val="000000"/>
                   </a:solidFill>
@@ -1111,7 +1116,7 @@
             </a:ln>
             <a:extLst>
               <a:ext uri="{91240B29-F687-4f45-9708-019B960494DF}">
-                <a14:hiddenLine xmlns:a14="http://schemas.microsoft.com/office/drawing/2010/main" xmlns="" w="9525">
+                <a14:hiddenLine xmlns="" xmlns:a14="http://schemas.microsoft.com/office/drawing/2010/main" w="9525">
                   <a:solidFill>
                     <a:srgbClr val="000000"/>
                   </a:solidFill>
@@ -1221,7 +1226,7 @@
             </a:ln>
             <a:extLst>
               <a:ext uri="{91240B29-F687-4f45-9708-019B960494DF}">
-                <a14:hiddenLine xmlns:a14="http://schemas.microsoft.com/office/drawing/2010/main" xmlns="" w="9525">
+                <a14:hiddenLine xmlns="" xmlns:a14="http://schemas.microsoft.com/office/drawing/2010/main" w="9525">
                   <a:solidFill>
                     <a:srgbClr val="000000"/>
                   </a:solidFill>
@@ -1283,7 +1288,7 @@
             </a:ln>
             <a:extLst>
               <a:ext uri="{91240B29-F687-4f45-9708-019B960494DF}">
-                <a14:hiddenLine xmlns:a14="http://schemas.microsoft.com/office/drawing/2010/main" xmlns="" w="9525">
+                <a14:hiddenLine xmlns="" xmlns:a14="http://schemas.microsoft.com/office/drawing/2010/main" w="9525">
                   <a:solidFill>
                     <a:srgbClr val="000000"/>
                   </a:solidFill>
@@ -1373,7 +1378,7 @@
             </a:ln>
             <a:extLst>
               <a:ext uri="{91240B29-F687-4f45-9708-019B960494DF}">
-                <a14:hiddenLine xmlns:a14="http://schemas.microsoft.com/office/drawing/2010/main" xmlns="" w="9525">
+                <a14:hiddenLine xmlns="" xmlns:a14="http://schemas.microsoft.com/office/drawing/2010/main" w="9525">
                   <a:solidFill>
                     <a:srgbClr val="000000"/>
                   </a:solidFill>
@@ -1463,7 +1468,7 @@
             </a:ln>
             <a:extLst>
               <a:ext uri="{91240B29-F687-4f45-9708-019B960494DF}">
-                <a14:hiddenLine xmlns:a14="http://schemas.microsoft.com/office/drawing/2010/main" xmlns="" w="9525">
+                <a14:hiddenLine xmlns="" xmlns:a14="http://schemas.microsoft.com/office/drawing/2010/main" w="9525">
                   <a:solidFill>
                     <a:srgbClr val="000000"/>
                   </a:solidFill>
@@ -1525,7 +1530,7 @@
             </a:ln>
             <a:extLst>
               <a:ext uri="{91240B29-F687-4f45-9708-019B960494DF}">
-                <a14:hiddenLine xmlns:a14="http://schemas.microsoft.com/office/drawing/2010/main" xmlns="" w="9525">
+                <a14:hiddenLine xmlns="" xmlns:a14="http://schemas.microsoft.com/office/drawing/2010/main" w="9525">
                   <a:solidFill>
                     <a:srgbClr val="000000"/>
                   </a:solidFill>
@@ -1615,7 +1620,7 @@
             </a:ln>
             <a:extLst>
               <a:ext uri="{91240B29-F687-4f45-9708-019B960494DF}">
-                <a14:hiddenLine xmlns:a14="http://schemas.microsoft.com/office/drawing/2010/main" xmlns="" w="9525">
+                <a14:hiddenLine xmlns="" xmlns:a14="http://schemas.microsoft.com/office/drawing/2010/main" w="9525">
                   <a:solidFill>
                     <a:srgbClr val="000000"/>
                   </a:solidFill>
@@ -1705,7 +1710,7 @@
             </a:ln>
             <a:extLst>
               <a:ext uri="{91240B29-F687-4f45-9708-019B960494DF}">
-                <a14:hiddenLine xmlns:a14="http://schemas.microsoft.com/office/drawing/2010/main" xmlns="" w="9525">
+                <a14:hiddenLine xmlns="" xmlns:a14="http://schemas.microsoft.com/office/drawing/2010/main" w="9525">
                   <a:solidFill>
                     <a:srgbClr val="000000"/>
                   </a:solidFill>
@@ -1761,7 +1766,7 @@
             </a:ln>
             <a:extLst>
               <a:ext uri="{91240B29-F687-4f45-9708-019B960494DF}">
-                <a14:hiddenLine xmlns:a14="http://schemas.microsoft.com/office/drawing/2010/main" xmlns="" w="9525">
+                <a14:hiddenLine xmlns="" xmlns:a14="http://schemas.microsoft.com/office/drawing/2010/main" w="9525">
                   <a:solidFill>
                     <a:srgbClr val="000000"/>
                   </a:solidFill>
@@ -1851,7 +1856,7 @@
             </a:ln>
             <a:extLst>
               <a:ext uri="{91240B29-F687-4f45-9708-019B960494DF}">
-                <a14:hiddenLine xmlns:a14="http://schemas.microsoft.com/office/drawing/2010/main" xmlns="" w="9525">
+                <a14:hiddenLine xmlns="" xmlns:a14="http://schemas.microsoft.com/office/drawing/2010/main" w="9525">
                   <a:solidFill>
                     <a:srgbClr val="000000"/>
                   </a:solidFill>
@@ -1907,7 +1912,7 @@
             </a:ln>
             <a:extLst>
               <a:ext uri="{91240B29-F687-4f45-9708-019B960494DF}">
-                <a14:hiddenLine xmlns:a14="http://schemas.microsoft.com/office/drawing/2010/main" xmlns="" w="9525">
+                <a14:hiddenLine xmlns="" xmlns:a14="http://schemas.microsoft.com/office/drawing/2010/main" w="9525">
                   <a:solidFill>
                     <a:srgbClr val="000000"/>
                   </a:solidFill>
@@ -1997,7 +2002,7 @@
             </a:ln>
             <a:extLst>
               <a:ext uri="{91240B29-F687-4f45-9708-019B960494DF}">
-                <a14:hiddenLine xmlns:a14="http://schemas.microsoft.com/office/drawing/2010/main" xmlns="" w="9525">
+                <a14:hiddenLine xmlns="" xmlns:a14="http://schemas.microsoft.com/office/drawing/2010/main" w="9525">
                   <a:solidFill>
                     <a:srgbClr val="000000"/>
                   </a:solidFill>
@@ -2065,7 +2070,7 @@
             </a:ln>
             <a:extLst>
               <a:ext uri="{91240B29-F687-4f45-9708-019B960494DF}">
-                <a14:hiddenLine xmlns:a14="http://schemas.microsoft.com/office/drawing/2010/main" xmlns="" w="9525">
+                <a14:hiddenLine xmlns="" xmlns:a14="http://schemas.microsoft.com/office/drawing/2010/main" w="9525">
                   <a:solidFill>
                     <a:srgbClr val="000000"/>
                   </a:solidFill>
@@ -2155,7 +2160,7 @@
             </a:ln>
             <a:extLst>
               <a:ext uri="{91240B29-F687-4f45-9708-019B960494DF}">
-                <a14:hiddenLine xmlns:a14="http://schemas.microsoft.com/office/drawing/2010/main" xmlns="" w="9525">
+                <a14:hiddenLine xmlns="" xmlns:a14="http://schemas.microsoft.com/office/drawing/2010/main" w="9525">
                   <a:solidFill>
                     <a:srgbClr val="000000"/>
                   </a:solidFill>
@@ -2223,7 +2228,7 @@
             </a:ln>
             <a:extLst>
               <a:ext uri="{91240B29-F687-4f45-9708-019B960494DF}">
-                <a14:hiddenLine xmlns:a14="http://schemas.microsoft.com/office/drawing/2010/main" xmlns="" w="9525">
+                <a14:hiddenLine xmlns="" xmlns:a14="http://schemas.microsoft.com/office/drawing/2010/main" w="9525">
                   <a:solidFill>
                     <a:srgbClr val="000000"/>
                   </a:solidFill>
@@ -2313,7 +2318,7 @@
             </a:ln>
             <a:extLst>
               <a:ext uri="{91240B29-F687-4f45-9708-019B960494DF}">
-                <a14:hiddenLine xmlns:a14="http://schemas.microsoft.com/office/drawing/2010/main" xmlns="" w="9525">
+                <a14:hiddenLine xmlns="" xmlns:a14="http://schemas.microsoft.com/office/drawing/2010/main" w="9525">
                   <a:solidFill>
                     <a:srgbClr val="000000"/>
                   </a:solidFill>
@@ -2347,7 +2352,7 @@
             </a:ln>
             <a:extLst>
               <a:ext uri="{91240B29-F687-4f45-9708-019B960494DF}">
-                <a14:hiddenLine xmlns:a14="http://schemas.microsoft.com/office/drawing/2010/main" xmlns="" w="9525">
+                <a14:hiddenLine xmlns="" xmlns:a14="http://schemas.microsoft.com/office/drawing/2010/main" w="9525">
                   <a:solidFill>
                     <a:srgbClr val="000000"/>
                   </a:solidFill>
@@ -2437,7 +2442,7 @@
             </a:ln>
             <a:extLst>
               <a:ext uri="{91240B29-F687-4f45-9708-019B960494DF}">
-                <a14:hiddenLine xmlns:a14="http://schemas.microsoft.com/office/drawing/2010/main" xmlns="" w="9525">
+                <a14:hiddenLine xmlns="" xmlns:a14="http://schemas.microsoft.com/office/drawing/2010/main" w="9525">
                   <a:solidFill>
                     <a:srgbClr val="000000"/>
                   </a:solidFill>
@@ -2499,7 +2504,7 @@
             </a:ln>
             <a:extLst>
               <a:ext uri="{91240B29-F687-4f45-9708-019B960494DF}">
-                <a14:hiddenLine xmlns:a14="http://schemas.microsoft.com/office/drawing/2010/main" xmlns="" w="9525">
+                <a14:hiddenLine xmlns="" xmlns:a14="http://schemas.microsoft.com/office/drawing/2010/main" w="9525">
                   <a:solidFill>
                     <a:srgbClr val="000000"/>
                   </a:solidFill>
@@ -2561,7 +2566,7 @@
             </a:ln>
             <a:extLst>
               <a:ext uri="{91240B29-F687-4f45-9708-019B960494DF}">
-                <a14:hiddenLine xmlns:a14="http://schemas.microsoft.com/office/drawing/2010/main" xmlns="" w="9525">
+                <a14:hiddenLine xmlns="" xmlns:a14="http://schemas.microsoft.com/office/drawing/2010/main" w="9525">
                   <a:solidFill>
                     <a:srgbClr val="000000"/>
                   </a:solidFill>
@@ -2651,7 +2656,7 @@
             </a:ln>
             <a:extLst>
               <a:ext uri="{91240B29-F687-4f45-9708-019B960494DF}">
-                <a14:hiddenLine xmlns:a14="http://schemas.microsoft.com/office/drawing/2010/main" xmlns="" w="9525">
+                <a14:hiddenLine xmlns="" xmlns:a14="http://schemas.microsoft.com/office/drawing/2010/main" w="9525">
                   <a:solidFill>
                     <a:srgbClr val="000000"/>
                   </a:solidFill>
@@ -2719,7 +2724,7 @@
             </a:ln>
             <a:extLst>
               <a:ext uri="{91240B29-F687-4f45-9708-019B960494DF}">
-                <a14:hiddenLine xmlns:a14="http://schemas.microsoft.com/office/drawing/2010/main" xmlns="" w="9525">
+                <a14:hiddenLine xmlns="" xmlns:a14="http://schemas.microsoft.com/office/drawing/2010/main" w="9525">
                   <a:solidFill>
                     <a:srgbClr val="000000"/>
                   </a:solidFill>
@@ -2781,7 +2786,7 @@
             </a:ln>
             <a:extLst>
               <a:ext uri="{91240B29-F687-4f45-9708-019B960494DF}">
-                <a14:hiddenLine xmlns:a14="http://schemas.microsoft.com/office/drawing/2010/main" xmlns="" w="9525">
+                <a14:hiddenLine xmlns="" xmlns:a14="http://schemas.microsoft.com/office/drawing/2010/main" w="9525">
                   <a:solidFill>
                     <a:srgbClr val="000000"/>
                   </a:solidFill>
@@ -2871,7 +2876,7 @@
             </a:ln>
             <a:extLst>
               <a:ext uri="{91240B29-F687-4f45-9708-019B960494DF}">
-                <a14:hiddenLine xmlns:a14="http://schemas.microsoft.com/office/drawing/2010/main" xmlns="" w="9525">
+                <a14:hiddenLine xmlns="" xmlns:a14="http://schemas.microsoft.com/office/drawing/2010/main" w="9525">
                   <a:solidFill>
                     <a:srgbClr val="000000"/>
                   </a:solidFill>
@@ -2933,7 +2938,7 @@
             </a:ln>
             <a:extLst>
               <a:ext uri="{91240B29-F687-4f45-9708-019B960494DF}">
-                <a14:hiddenLine xmlns:a14="http://schemas.microsoft.com/office/drawing/2010/main" xmlns="" w="9525">
+                <a14:hiddenLine xmlns="" xmlns:a14="http://schemas.microsoft.com/office/drawing/2010/main" w="9525">
                   <a:solidFill>
                     <a:srgbClr val="000000"/>
                   </a:solidFill>
@@ -3023,7 +3028,7 @@
             </a:ln>
             <a:extLst>
               <a:ext uri="{91240B29-F687-4f45-9708-019B960494DF}">
-                <a14:hiddenLine xmlns:a14="http://schemas.microsoft.com/office/drawing/2010/main" xmlns="" w="9525">
+                <a14:hiddenLine xmlns="" xmlns:a14="http://schemas.microsoft.com/office/drawing/2010/main" w="9525">
                   <a:solidFill>
                     <a:srgbClr val="000000"/>
                   </a:solidFill>
@@ -3085,7 +3090,7 @@
             </a:ln>
             <a:extLst>
               <a:ext uri="{91240B29-F687-4f45-9708-019B960494DF}">
-                <a14:hiddenLine xmlns:a14="http://schemas.microsoft.com/office/drawing/2010/main" xmlns="" w="9525">
+                <a14:hiddenLine xmlns="" xmlns:a14="http://schemas.microsoft.com/office/drawing/2010/main" w="9525">
                   <a:solidFill>
                     <a:srgbClr val="000000"/>
                   </a:solidFill>
@@ -3175,7 +3180,7 @@
             </a:ln>
             <a:extLst>
               <a:ext uri="{91240B29-F687-4f45-9708-019B960494DF}">
-                <a14:hiddenLine xmlns:a14="http://schemas.microsoft.com/office/drawing/2010/main" xmlns="" w="9525">
+                <a14:hiddenLine xmlns="" xmlns:a14="http://schemas.microsoft.com/office/drawing/2010/main" w="9525">
                   <a:solidFill>
                     <a:srgbClr val="000000"/>
                   </a:solidFill>
@@ -3209,7 +3214,7 @@
             </a:ln>
             <a:extLst>
               <a:ext uri="{91240B29-F687-4f45-9708-019B960494DF}">
-                <a14:hiddenLine xmlns:a14="http://schemas.microsoft.com/office/drawing/2010/main" xmlns="" w="9525">
+                <a14:hiddenLine xmlns="" xmlns:a14="http://schemas.microsoft.com/office/drawing/2010/main" w="9525">
                   <a:solidFill>
                     <a:srgbClr val="000000"/>
                   </a:solidFill>
@@ -3274,7 +3279,7 @@
             </a:ln>
             <a:extLst>
               <a:ext uri="{91240B29-F687-4f45-9708-019B960494DF}">
-                <a14:hiddenLine xmlns:a14="http://schemas.microsoft.com/office/drawing/2010/main" xmlns="" w="9525">
+                <a14:hiddenLine xmlns="" xmlns:a14="http://schemas.microsoft.com/office/drawing/2010/main" w="9525">
                   <a:solidFill>
                     <a:srgbClr val="000000"/>
                   </a:solidFill>
@@ -3364,7 +3369,7 @@
             </a:ln>
             <a:extLst>
               <a:ext uri="{91240B29-F687-4f45-9708-019B960494DF}">
-                <a14:hiddenLine xmlns:a14="http://schemas.microsoft.com/office/drawing/2010/main" xmlns="" w="9525">
+                <a14:hiddenLine xmlns="" xmlns:a14="http://schemas.microsoft.com/office/drawing/2010/main" w="9525">
                   <a:solidFill>
                     <a:srgbClr val="000000"/>
                   </a:solidFill>
@@ -3426,7 +3431,7 @@
             </a:ln>
             <a:extLst>
               <a:ext uri="{91240B29-F687-4f45-9708-019B960494DF}">
-                <a14:hiddenLine xmlns:a14="http://schemas.microsoft.com/office/drawing/2010/main" xmlns="" w="9525">
+                <a14:hiddenLine xmlns="" xmlns:a14="http://schemas.microsoft.com/office/drawing/2010/main" w="9525">
                   <a:solidFill>
                     <a:srgbClr val="000000"/>
                   </a:solidFill>
@@ -3516,7 +3521,7 @@
             </a:ln>
             <a:extLst>
               <a:ext uri="{91240B29-F687-4f45-9708-019B960494DF}">
-                <a14:hiddenLine xmlns:a14="http://schemas.microsoft.com/office/drawing/2010/main" xmlns="" w="9525">
+                <a14:hiddenLine xmlns="" xmlns:a14="http://schemas.microsoft.com/office/drawing/2010/main" w="9525">
                   <a:solidFill>
                     <a:srgbClr val="000000"/>
                   </a:solidFill>
@@ -3606,7 +3611,7 @@
             </a:ln>
             <a:extLst>
               <a:ext uri="{91240B29-F687-4f45-9708-019B960494DF}">
-                <a14:hiddenLine xmlns:a14="http://schemas.microsoft.com/office/drawing/2010/main" xmlns="" w="9525">
+                <a14:hiddenLine xmlns="" xmlns:a14="http://schemas.microsoft.com/office/drawing/2010/main" w="9525">
                   <a:solidFill>
                     <a:srgbClr val="000000"/>
                   </a:solidFill>
@@ -3671,7 +3676,7 @@
             </a:ln>
             <a:extLst>
               <a:ext uri="{91240B29-F687-4f45-9708-019B960494DF}">
-                <a14:hiddenLine xmlns:a14="http://schemas.microsoft.com/office/drawing/2010/main" xmlns="" w="9525">
+                <a14:hiddenLine xmlns="" xmlns:a14="http://schemas.microsoft.com/office/drawing/2010/main" w="9525">
                   <a:solidFill>
                     <a:srgbClr val="000000"/>
                   </a:solidFill>
@@ -3733,7 +3738,7 @@
             </a:ln>
             <a:extLst>
               <a:ext uri="{91240B29-F687-4f45-9708-019B960494DF}">
-                <a14:hiddenLine xmlns:a14="http://schemas.microsoft.com/office/drawing/2010/main" xmlns="" w="9525">
+                <a14:hiddenLine xmlns="" xmlns:a14="http://schemas.microsoft.com/office/drawing/2010/main" w="9525">
                   <a:solidFill>
                     <a:srgbClr val="000000"/>
                   </a:solidFill>
@@ -3823,7 +3828,7 @@
             </a:ln>
             <a:extLst>
               <a:ext uri="{91240B29-F687-4f45-9708-019B960494DF}">
-                <a14:hiddenLine xmlns:a14="http://schemas.microsoft.com/office/drawing/2010/main" xmlns="" w="9525">
+                <a14:hiddenLine xmlns="" xmlns:a14="http://schemas.microsoft.com/office/drawing/2010/main" w="9525">
                   <a:solidFill>
                     <a:srgbClr val="000000"/>
                   </a:solidFill>
@@ -3913,7 +3918,7 @@
             </a:ln>
             <a:extLst>
               <a:ext uri="{91240B29-F687-4f45-9708-019B960494DF}">
-                <a14:hiddenLine xmlns:a14="http://schemas.microsoft.com/office/drawing/2010/main" xmlns="" w="9525">
+                <a14:hiddenLine xmlns="" xmlns:a14="http://schemas.microsoft.com/office/drawing/2010/main" w="9525">
                   <a:solidFill>
                     <a:srgbClr val="000000"/>
                   </a:solidFill>
@@ -3975,7 +3980,7 @@
             </a:ln>
             <a:extLst>
               <a:ext uri="{91240B29-F687-4f45-9708-019B960494DF}">
-                <a14:hiddenLine xmlns:a14="http://schemas.microsoft.com/office/drawing/2010/main" xmlns="" w="9525">
+                <a14:hiddenLine xmlns="" xmlns:a14="http://schemas.microsoft.com/office/drawing/2010/main" w="9525">
                   <a:solidFill>
                     <a:srgbClr val="000000"/>
                   </a:solidFill>
@@ -4095,7 +4100,7 @@
             </a:ln>
             <a:extLst>
               <a:ext uri="{91240B29-F687-4f45-9708-019B960494DF}">
-                <a14:hiddenLine xmlns:a14="http://schemas.microsoft.com/office/drawing/2010/main" xmlns="" w="9525">
+                <a14:hiddenLine xmlns="" xmlns:a14="http://schemas.microsoft.com/office/drawing/2010/main" w="9525">
                   <a:solidFill>
                     <a:srgbClr val="000000"/>
                   </a:solidFill>
@@ -4163,7 +4168,7 @@
             </a:ln>
             <a:extLst>
               <a:ext uri="{91240B29-F687-4f45-9708-019B960494DF}">
-                <a14:hiddenLine xmlns:a14="http://schemas.microsoft.com/office/drawing/2010/main" xmlns="" w="9525">
+                <a14:hiddenLine xmlns="" xmlns:a14="http://schemas.microsoft.com/office/drawing/2010/main" w="9525">
                   <a:solidFill>
                     <a:srgbClr val="000000"/>
                   </a:solidFill>
@@ -4253,7 +4258,7 @@
             </a:ln>
             <a:extLst>
               <a:ext uri="{91240B29-F687-4f45-9708-019B960494DF}">
-                <a14:hiddenLine xmlns:a14="http://schemas.microsoft.com/office/drawing/2010/main" xmlns="" w="9525">
+                <a14:hiddenLine xmlns="" xmlns:a14="http://schemas.microsoft.com/office/drawing/2010/main" w="9525">
                   <a:solidFill>
                     <a:srgbClr val="000000"/>
                   </a:solidFill>
@@ -4393,7 +4398,7 @@
           <a:p>
             <a:fld id="{48A87A34-81AB-432B-8DAE-1953F412C126}" type="datetimeFigureOut">
               <a:rPr lang="en-US" dirty="0"/>
-              <a:t>4/14/2018</a:t>
+              <a:t>4/21/2018</a:t>
             </a:fld>
             <a:endParaRPr lang="en-US" dirty="0"/>
           </a:p>
@@ -4655,7 +4660,7 @@
           <a:p>
             <a:fld id="{48A87A34-81AB-432B-8DAE-1953F412C126}" type="datetimeFigureOut">
               <a:rPr lang="en-US" dirty="0"/>
-              <a:t>4/14/2018</a:t>
+              <a:t>4/21/2018</a:t>
             </a:fld>
             <a:endParaRPr lang="en-US" dirty="0"/>
           </a:p>
@@ -4846,7 +4851,7 @@
           <a:p>
             <a:fld id="{48A87A34-81AB-432B-8DAE-1953F412C126}" type="datetimeFigureOut">
               <a:rPr lang="en-US" dirty="0"/>
-              <a:t>4/14/2018</a:t>
+              <a:t>4/21/2018</a:t>
             </a:fld>
             <a:endParaRPr lang="en-US" dirty="0"/>
           </a:p>
@@ -5104,7 +5109,7 @@
           <a:p>
             <a:fld id="{48A87A34-81AB-432B-8DAE-1953F412C126}" type="datetimeFigureOut">
               <a:rPr lang="en-US" dirty="0"/>
-              <a:t>4/14/2018</a:t>
+              <a:t>4/21/2018</a:t>
             </a:fld>
             <a:endParaRPr lang="en-US" dirty="0"/>
           </a:p>
@@ -5533,7 +5538,7 @@
           <a:p>
             <a:fld id="{48A87A34-81AB-432B-8DAE-1953F412C126}" type="datetimeFigureOut">
               <a:rPr lang="en-US" dirty="0"/>
-              <a:t>4/14/2018</a:t>
+              <a:t>4/21/2018</a:t>
             </a:fld>
             <a:endParaRPr lang="en-US" dirty="0"/>
           </a:p>
@@ -6074,7 +6079,7 @@
           <a:p>
             <a:fld id="{48A87A34-81AB-432B-8DAE-1953F412C126}" type="datetimeFigureOut">
               <a:rPr lang="en-US" dirty="0"/>
-              <a:t>4/14/2018</a:t>
+              <a:t>4/21/2018</a:t>
             </a:fld>
             <a:endParaRPr lang="en-US" dirty="0"/>
           </a:p>
@@ -6789,7 +6794,7 @@
           <a:p>
             <a:fld id="{48A87A34-81AB-432B-8DAE-1953F412C126}" type="datetimeFigureOut">
               <a:rPr lang="en-US" dirty="0"/>
-              <a:t>4/14/2018</a:t>
+              <a:t>4/21/2018</a:t>
             </a:fld>
             <a:endParaRPr lang="en-US" dirty="0"/>
           </a:p>
@@ -6954,7 +6959,7 @@
           <a:p>
             <a:fld id="{48A87A34-81AB-432B-8DAE-1953F412C126}" type="datetimeFigureOut">
               <a:rPr lang="en-US" dirty="0"/>
-              <a:t>4/14/2018</a:t>
+              <a:t>4/21/2018</a:t>
             </a:fld>
             <a:endParaRPr lang="en-US" dirty="0"/>
           </a:p>
@@ -7129,7 +7134,7 @@
           <a:p>
             <a:fld id="{48A87A34-81AB-432B-8DAE-1953F412C126}" type="datetimeFigureOut">
               <a:rPr lang="en-US" dirty="0"/>
-              <a:t>4/14/2018</a:t>
+              <a:t>4/21/2018</a:t>
             </a:fld>
             <a:endParaRPr lang="en-US" dirty="0"/>
           </a:p>
@@ -7294,7 +7299,7 @@
           <a:p>
             <a:fld id="{48A87A34-81AB-432B-8DAE-1953F412C126}" type="datetimeFigureOut">
               <a:rPr lang="en-US" dirty="0"/>
-              <a:t>4/14/2018</a:t>
+              <a:t>4/21/2018</a:t>
             </a:fld>
             <a:endParaRPr lang="en-US" dirty="0"/>
           </a:p>
@@ -7539,7 +7544,7 @@
           <a:p>
             <a:fld id="{48A87A34-81AB-432B-8DAE-1953F412C126}" type="datetimeFigureOut">
               <a:rPr lang="en-US" dirty="0"/>
-              <a:t>4/14/2018</a:t>
+              <a:t>4/21/2018</a:t>
             </a:fld>
             <a:endParaRPr lang="en-US" dirty="0"/>
           </a:p>
@@ -7766,7 +7771,7 @@
           <a:p>
             <a:fld id="{48A87A34-81AB-432B-8DAE-1953F412C126}" type="datetimeFigureOut">
               <a:rPr lang="en-US" dirty="0"/>
-              <a:t>4/14/2018</a:t>
+              <a:t>4/21/2018</a:t>
             </a:fld>
             <a:endParaRPr lang="en-US" dirty="0"/>
           </a:p>
@@ -8142,7 +8147,7 @@
           <a:p>
             <a:fld id="{48A87A34-81AB-432B-8DAE-1953F412C126}" type="datetimeFigureOut">
               <a:rPr lang="en-US" dirty="0"/>
-              <a:t>4/14/2018</a:t>
+              <a:t>4/21/2018</a:t>
             </a:fld>
             <a:endParaRPr lang="en-US" dirty="0"/>
           </a:p>
@@ -8255,7 +8260,7 @@
           <a:p>
             <a:fld id="{48A87A34-81AB-432B-8DAE-1953F412C126}" type="datetimeFigureOut">
               <a:rPr lang="en-US" dirty="0"/>
-              <a:t>4/14/2018</a:t>
+              <a:t>4/21/2018</a:t>
             </a:fld>
             <a:endParaRPr lang="en-US" dirty="0"/>
           </a:p>
@@ -8345,7 +8350,7 @@
           <a:p>
             <a:fld id="{48A87A34-81AB-432B-8DAE-1953F412C126}" type="datetimeFigureOut">
               <a:rPr lang="en-US" dirty="0"/>
-              <a:t>4/14/2018</a:t>
+              <a:t>4/21/2018</a:t>
             </a:fld>
             <a:endParaRPr lang="en-US" dirty="0"/>
           </a:p>
@@ -8589,7 +8594,7 @@
           <a:p>
             <a:fld id="{48A87A34-81AB-432B-8DAE-1953F412C126}" type="datetimeFigureOut">
               <a:rPr lang="en-US" dirty="0"/>
-              <a:t>4/14/2018</a:t>
+              <a:t>4/21/2018</a:t>
             </a:fld>
             <a:endParaRPr lang="en-US" dirty="0"/>
           </a:p>
@@ -8864,7 +8869,7 @@
           <a:p>
             <a:fld id="{48A87A34-81AB-432B-8DAE-1953F412C126}" type="datetimeFigureOut">
               <a:rPr lang="en-US" dirty="0"/>
-              <a:t>4/14/2018</a:t>
+              <a:t>4/21/2018</a:t>
             </a:fld>
             <a:endParaRPr lang="en-US" dirty="0"/>
           </a:p>
@@ -8975,7 +8980,7 @@
           <a:noFill/>
           <a:extLst>
             <a:ext uri="{909E8E84-426E-40dd-AFC4-6F175D3DCCD1}">
-              <a14:hiddenFill xmlns:a14="http://schemas.microsoft.com/office/drawing/2010/main" xmlns="">
+              <a14:hiddenFill xmlns="" xmlns:a14="http://schemas.microsoft.com/office/drawing/2010/main">
                 <a:solidFill>
                   <a:srgbClr val="FFFFFF"/>
                 </a:solidFill>
@@ -9049,7 +9054,7 @@
               </a:ln>
               <a:extLst>
                 <a:ext uri="{91240B29-F687-4f45-9708-019B960494DF}">
-                  <a14:hiddenLine xmlns:a14="http://schemas.microsoft.com/office/drawing/2010/main" xmlns="" w="9525">
+                  <a14:hiddenLine xmlns="" xmlns:a14="http://schemas.microsoft.com/office/drawing/2010/main" w="9525">
                     <a:solidFill>
                       <a:srgbClr val="000000"/>
                     </a:solidFill>
@@ -9139,7 +9144,7 @@
               </a:ln>
               <a:extLst>
                 <a:ext uri="{91240B29-F687-4f45-9708-019B960494DF}">
-                  <a14:hiddenLine xmlns:a14="http://schemas.microsoft.com/office/drawing/2010/main" xmlns="" w="9525">
+                  <a14:hiddenLine xmlns="" xmlns:a14="http://schemas.microsoft.com/office/drawing/2010/main" w="9525">
                     <a:solidFill>
                       <a:srgbClr val="000000"/>
                     </a:solidFill>
@@ -9229,7 +9234,7 @@
               </a:ln>
               <a:extLst>
                 <a:ext uri="{91240B29-F687-4f45-9708-019B960494DF}">
-                  <a14:hiddenLine xmlns:a14="http://schemas.microsoft.com/office/drawing/2010/main" xmlns="" w="9525">
+                  <a14:hiddenLine xmlns="" xmlns:a14="http://schemas.microsoft.com/office/drawing/2010/main" w="9525">
                     <a:solidFill>
                       <a:srgbClr val="000000"/>
                     </a:solidFill>
@@ -9291,7 +9296,7 @@
               </a:ln>
               <a:extLst>
                 <a:ext uri="{91240B29-F687-4f45-9708-019B960494DF}">
-                  <a14:hiddenLine xmlns:a14="http://schemas.microsoft.com/office/drawing/2010/main" xmlns="" w="9525">
+                  <a14:hiddenLine xmlns="" xmlns:a14="http://schemas.microsoft.com/office/drawing/2010/main" w="9525">
                     <a:solidFill>
                       <a:srgbClr val="000000"/>
                     </a:solidFill>
@@ -9381,7 +9386,7 @@
               </a:ln>
               <a:extLst>
                 <a:ext uri="{91240B29-F687-4f45-9708-019B960494DF}">
-                  <a14:hiddenLine xmlns:a14="http://schemas.microsoft.com/office/drawing/2010/main" xmlns="" w="9525">
+                  <a14:hiddenLine xmlns="" xmlns:a14="http://schemas.microsoft.com/office/drawing/2010/main" w="9525">
                     <a:solidFill>
                       <a:srgbClr val="000000"/>
                     </a:solidFill>
@@ -9443,7 +9448,7 @@
               </a:ln>
               <a:extLst>
                 <a:ext uri="{91240B29-F687-4f45-9708-019B960494DF}">
-                  <a14:hiddenLine xmlns:a14="http://schemas.microsoft.com/office/drawing/2010/main" xmlns="" w="9525">
+                  <a14:hiddenLine xmlns="" xmlns:a14="http://schemas.microsoft.com/office/drawing/2010/main" w="9525">
                     <a:solidFill>
                       <a:srgbClr val="000000"/>
                     </a:solidFill>
@@ -9505,7 +9510,7 @@
               </a:ln>
               <a:extLst>
                 <a:ext uri="{91240B29-F687-4f45-9708-019B960494DF}">
-                  <a14:hiddenLine xmlns:a14="http://schemas.microsoft.com/office/drawing/2010/main" xmlns="" w="9525">
+                  <a14:hiddenLine xmlns="" xmlns:a14="http://schemas.microsoft.com/office/drawing/2010/main" w="9525">
                     <a:solidFill>
                       <a:srgbClr val="000000"/>
                     </a:solidFill>
@@ -9595,7 +9600,7 @@
               </a:ln>
               <a:extLst>
                 <a:ext uri="{91240B29-F687-4f45-9708-019B960494DF}">
-                  <a14:hiddenLine xmlns:a14="http://schemas.microsoft.com/office/drawing/2010/main" xmlns="" w="9525">
+                  <a14:hiddenLine xmlns="" xmlns:a14="http://schemas.microsoft.com/office/drawing/2010/main" w="9525">
                     <a:solidFill>
                       <a:srgbClr val="000000"/>
                     </a:solidFill>
@@ -9685,7 +9690,7 @@
               </a:ln>
               <a:extLst>
                 <a:ext uri="{91240B29-F687-4f45-9708-019B960494DF}">
-                  <a14:hiddenLine xmlns:a14="http://schemas.microsoft.com/office/drawing/2010/main" xmlns="" w="9525">
+                  <a14:hiddenLine xmlns="" xmlns:a14="http://schemas.microsoft.com/office/drawing/2010/main" w="9525">
                     <a:solidFill>
                       <a:srgbClr val="000000"/>
                     </a:solidFill>
@@ -9747,7 +9752,7 @@
               </a:ln>
               <a:extLst>
                 <a:ext uri="{91240B29-F687-4f45-9708-019B960494DF}">
-                  <a14:hiddenLine xmlns:a14="http://schemas.microsoft.com/office/drawing/2010/main" xmlns="" w="9525">
+                  <a14:hiddenLine xmlns="" xmlns:a14="http://schemas.microsoft.com/office/drawing/2010/main" w="9525">
                     <a:solidFill>
                       <a:srgbClr val="000000"/>
                     </a:solidFill>
@@ -9857,7 +9862,7 @@
               </a:ln>
               <a:extLst>
                 <a:ext uri="{91240B29-F687-4f45-9708-019B960494DF}">
-                  <a14:hiddenLine xmlns:a14="http://schemas.microsoft.com/office/drawing/2010/main" xmlns="" w="9525">
+                  <a14:hiddenLine xmlns="" xmlns:a14="http://schemas.microsoft.com/office/drawing/2010/main" w="9525">
                     <a:solidFill>
                       <a:srgbClr val="000000"/>
                     </a:solidFill>
@@ -9941,7 +9946,7 @@
               </a:ln>
               <a:extLst>
                 <a:ext uri="{91240B29-F687-4f45-9708-019B960494DF}">
-                  <a14:hiddenLine xmlns:a14="http://schemas.microsoft.com/office/drawing/2010/main" xmlns="" w="9525">
+                  <a14:hiddenLine xmlns="" xmlns:a14="http://schemas.microsoft.com/office/drawing/2010/main" w="9525">
                     <a:solidFill>
                       <a:srgbClr val="000000"/>
                     </a:solidFill>
@@ -10003,7 +10008,7 @@
               </a:ln>
               <a:extLst>
                 <a:ext uri="{91240B29-F687-4f45-9708-019B960494DF}">
-                  <a14:hiddenLine xmlns:a14="http://schemas.microsoft.com/office/drawing/2010/main" xmlns="" w="9525">
+                  <a14:hiddenLine xmlns="" xmlns:a14="http://schemas.microsoft.com/office/drawing/2010/main" w="9525">
                     <a:solidFill>
                       <a:srgbClr val="000000"/>
                     </a:solidFill>
@@ -10065,7 +10070,7 @@
               </a:ln>
               <a:extLst>
                 <a:ext uri="{91240B29-F687-4f45-9708-019B960494DF}">
-                  <a14:hiddenLine xmlns:a14="http://schemas.microsoft.com/office/drawing/2010/main" xmlns="" w="9525">
+                  <a14:hiddenLine xmlns="" xmlns:a14="http://schemas.microsoft.com/office/drawing/2010/main" w="9525">
                     <a:solidFill>
                       <a:srgbClr val="000000"/>
                     </a:solidFill>
@@ -10155,7 +10160,7 @@
               </a:ln>
               <a:extLst>
                 <a:ext uri="{91240B29-F687-4f45-9708-019B960494DF}">
-                  <a14:hiddenLine xmlns:a14="http://schemas.microsoft.com/office/drawing/2010/main" xmlns="" w="9525">
+                  <a14:hiddenLine xmlns="" xmlns:a14="http://schemas.microsoft.com/office/drawing/2010/main" w="9525">
                     <a:solidFill>
                       <a:srgbClr val="000000"/>
                     </a:solidFill>
@@ -10189,7 +10194,7 @@
               </a:ln>
               <a:extLst>
                 <a:ext uri="{91240B29-F687-4f45-9708-019B960494DF}">
-                  <a14:hiddenLine xmlns:a14="http://schemas.microsoft.com/office/drawing/2010/main" xmlns="" w="9525">
+                  <a14:hiddenLine xmlns="" xmlns:a14="http://schemas.microsoft.com/office/drawing/2010/main" w="9525">
                     <a:solidFill>
                       <a:srgbClr val="000000"/>
                     </a:solidFill>
@@ -10254,7 +10259,7 @@
               </a:ln>
               <a:extLst>
                 <a:ext uri="{91240B29-F687-4f45-9708-019B960494DF}">
-                  <a14:hiddenLine xmlns:a14="http://schemas.microsoft.com/office/drawing/2010/main" xmlns="" w="9525">
+                  <a14:hiddenLine xmlns="" xmlns:a14="http://schemas.microsoft.com/office/drawing/2010/main" w="9525">
                     <a:solidFill>
                       <a:srgbClr val="000000"/>
                     </a:solidFill>
@@ -10344,7 +10349,7 @@
               </a:ln>
               <a:extLst>
                 <a:ext uri="{91240B29-F687-4f45-9708-019B960494DF}">
-                  <a14:hiddenLine xmlns:a14="http://schemas.microsoft.com/office/drawing/2010/main" xmlns="" w="9525">
+                  <a14:hiddenLine xmlns="" xmlns:a14="http://schemas.microsoft.com/office/drawing/2010/main" w="9525">
                     <a:solidFill>
                       <a:srgbClr val="000000"/>
                     </a:solidFill>
@@ -10406,7 +10411,7 @@
               </a:ln>
               <a:extLst>
                 <a:ext uri="{91240B29-F687-4f45-9708-019B960494DF}">
-                  <a14:hiddenLine xmlns:a14="http://schemas.microsoft.com/office/drawing/2010/main" xmlns="" w="9525">
+                  <a14:hiddenLine xmlns="" xmlns:a14="http://schemas.microsoft.com/office/drawing/2010/main" w="9525">
                     <a:solidFill>
                       <a:srgbClr val="000000"/>
                     </a:solidFill>
@@ -10496,7 +10501,7 @@
               </a:ln>
               <a:extLst>
                 <a:ext uri="{91240B29-F687-4f45-9708-019B960494DF}">
-                  <a14:hiddenLine xmlns:a14="http://schemas.microsoft.com/office/drawing/2010/main" xmlns="" w="9525">
+                  <a14:hiddenLine xmlns="" xmlns:a14="http://schemas.microsoft.com/office/drawing/2010/main" w="9525">
                     <a:solidFill>
                       <a:srgbClr val="000000"/>
                     </a:solidFill>
@@ -10561,7 +10566,7 @@
               </a:ln>
               <a:extLst>
                 <a:ext uri="{91240B29-F687-4f45-9708-019B960494DF}">
-                  <a14:hiddenLine xmlns:a14="http://schemas.microsoft.com/office/drawing/2010/main" xmlns="" w="9525">
+                  <a14:hiddenLine xmlns="" xmlns:a14="http://schemas.microsoft.com/office/drawing/2010/main" w="9525">
                     <a:solidFill>
                       <a:srgbClr val="000000"/>
                     </a:solidFill>
@@ -10623,7 +10628,7 @@
               </a:ln>
               <a:extLst>
                 <a:ext uri="{91240B29-F687-4f45-9708-019B960494DF}">
-                  <a14:hiddenLine xmlns:a14="http://schemas.microsoft.com/office/drawing/2010/main" xmlns="" w="9525">
+                  <a14:hiddenLine xmlns="" xmlns:a14="http://schemas.microsoft.com/office/drawing/2010/main" w="9525">
                     <a:solidFill>
                       <a:srgbClr val="000000"/>
                     </a:solidFill>
@@ -10713,7 +10718,7 @@
               </a:ln>
               <a:extLst>
                 <a:ext uri="{91240B29-F687-4f45-9708-019B960494DF}">
-                  <a14:hiddenLine xmlns:a14="http://schemas.microsoft.com/office/drawing/2010/main" xmlns="" w="9525">
+                  <a14:hiddenLine xmlns="" xmlns:a14="http://schemas.microsoft.com/office/drawing/2010/main" w="9525">
                     <a:solidFill>
                       <a:srgbClr val="000000"/>
                     </a:solidFill>
@@ -10803,7 +10808,7 @@
               </a:ln>
               <a:extLst>
                 <a:ext uri="{91240B29-F687-4f45-9708-019B960494DF}">
-                  <a14:hiddenLine xmlns:a14="http://schemas.microsoft.com/office/drawing/2010/main" xmlns="" w="9525">
+                  <a14:hiddenLine xmlns="" xmlns:a14="http://schemas.microsoft.com/office/drawing/2010/main" w="9525">
                     <a:solidFill>
                       <a:srgbClr val="000000"/>
                     </a:solidFill>
@@ -10868,7 +10873,7 @@
               </a:ln>
               <a:extLst>
                 <a:ext uri="{91240B29-F687-4f45-9708-019B960494DF}">
-                  <a14:hiddenLine xmlns:a14="http://schemas.microsoft.com/office/drawing/2010/main" xmlns="" w="9525">
+                  <a14:hiddenLine xmlns="" xmlns:a14="http://schemas.microsoft.com/office/drawing/2010/main" w="9525">
                     <a:solidFill>
                       <a:srgbClr val="000000"/>
                     </a:solidFill>
@@ -10988,7 +10993,7 @@
               </a:ln>
               <a:extLst>
                 <a:ext uri="{91240B29-F687-4f45-9708-019B960494DF}">
-                  <a14:hiddenLine xmlns:a14="http://schemas.microsoft.com/office/drawing/2010/main" xmlns="" w="9525">
+                  <a14:hiddenLine xmlns="" xmlns:a14="http://schemas.microsoft.com/office/drawing/2010/main" w="9525">
                     <a:solidFill>
                       <a:srgbClr val="000000"/>
                     </a:solidFill>
@@ -11086,7 +11091,7 @@
               </a:ln>
               <a:extLst>
                 <a:ext uri="{91240B29-F687-4f45-9708-019B960494DF}">
-                  <a14:hiddenLine xmlns:a14="http://schemas.microsoft.com/office/drawing/2010/main" xmlns="" w="9525">
+                  <a14:hiddenLine xmlns="" xmlns:a14="http://schemas.microsoft.com/office/drawing/2010/main" w="9525">
                     <a:solidFill>
                       <a:srgbClr val="000000"/>
                     </a:solidFill>
@@ -11201,7 +11206,7 @@
               </a:ln>
               <a:extLst>
                 <a:ext uri="{91240B29-F687-4f45-9708-019B960494DF}">
-                  <a14:hiddenLine xmlns:a14="http://schemas.microsoft.com/office/drawing/2010/main" xmlns="" w="9525">
+                  <a14:hiddenLine xmlns="" xmlns:a14="http://schemas.microsoft.com/office/drawing/2010/main" w="9525">
                     <a:solidFill>
                       <a:srgbClr val="000000"/>
                     </a:solidFill>
@@ -11291,7 +11296,7 @@
               </a:ln>
               <a:extLst>
                 <a:ext uri="{91240B29-F687-4f45-9708-019B960494DF}">
-                  <a14:hiddenLine xmlns:a14="http://schemas.microsoft.com/office/drawing/2010/main" xmlns="" w="9525">
+                  <a14:hiddenLine xmlns="" xmlns:a14="http://schemas.microsoft.com/office/drawing/2010/main" w="9525">
                     <a:solidFill>
                       <a:srgbClr val="000000"/>
                     </a:solidFill>
@@ -11356,7 +11361,7 @@
               </a:ln>
               <a:extLst>
                 <a:ext uri="{91240B29-F687-4f45-9708-019B960494DF}">
-                  <a14:hiddenLine xmlns:a14="http://schemas.microsoft.com/office/drawing/2010/main" xmlns="" w="9525">
+                  <a14:hiddenLine xmlns="" xmlns:a14="http://schemas.microsoft.com/office/drawing/2010/main" w="9525">
                     <a:solidFill>
                       <a:srgbClr val="000000"/>
                     </a:solidFill>
@@ -11446,7 +11451,7 @@
               </a:ln>
               <a:extLst>
                 <a:ext uri="{91240B29-F687-4f45-9708-019B960494DF}">
-                  <a14:hiddenLine xmlns:a14="http://schemas.microsoft.com/office/drawing/2010/main" xmlns="" w="9525">
+                  <a14:hiddenLine xmlns="" xmlns:a14="http://schemas.microsoft.com/office/drawing/2010/main" w="9525">
                     <a:solidFill>
                       <a:srgbClr val="000000"/>
                     </a:solidFill>
@@ -11514,7 +11519,7 @@
               </a:ln>
               <a:extLst>
                 <a:ext uri="{91240B29-F687-4f45-9708-019B960494DF}">
-                  <a14:hiddenLine xmlns:a14="http://schemas.microsoft.com/office/drawing/2010/main" xmlns="" w="9525">
+                  <a14:hiddenLine xmlns="" xmlns:a14="http://schemas.microsoft.com/office/drawing/2010/main" w="9525">
                     <a:solidFill>
                       <a:srgbClr val="000000"/>
                     </a:solidFill>
@@ -11604,7 +11609,7 @@
               </a:ln>
               <a:extLst>
                 <a:ext uri="{91240B29-F687-4f45-9708-019B960494DF}">
-                  <a14:hiddenLine xmlns:a14="http://schemas.microsoft.com/office/drawing/2010/main" xmlns="" w="9525">
+                  <a14:hiddenLine xmlns="" xmlns:a14="http://schemas.microsoft.com/office/drawing/2010/main" w="9525">
                     <a:solidFill>
                       <a:srgbClr val="000000"/>
                     </a:solidFill>
@@ -11672,7 +11677,7 @@
               </a:ln>
               <a:extLst>
                 <a:ext uri="{91240B29-F687-4f45-9708-019B960494DF}">
-                  <a14:hiddenLine xmlns:a14="http://schemas.microsoft.com/office/drawing/2010/main" xmlns="" w="9525">
+                  <a14:hiddenLine xmlns="" xmlns:a14="http://schemas.microsoft.com/office/drawing/2010/main" w="9525">
                     <a:solidFill>
                       <a:srgbClr val="000000"/>
                     </a:solidFill>
@@ -11762,7 +11767,7 @@
               </a:ln>
               <a:extLst>
                 <a:ext uri="{91240B29-F687-4f45-9708-019B960494DF}">
-                  <a14:hiddenLine xmlns:a14="http://schemas.microsoft.com/office/drawing/2010/main" xmlns="" w="9525">
+                  <a14:hiddenLine xmlns="" xmlns:a14="http://schemas.microsoft.com/office/drawing/2010/main" w="9525">
                     <a:solidFill>
                       <a:srgbClr val="000000"/>
                     </a:solidFill>
@@ -11796,7 +11801,7 @@
               </a:ln>
               <a:extLst>
                 <a:ext uri="{91240B29-F687-4f45-9708-019B960494DF}">
-                  <a14:hiddenLine xmlns:a14="http://schemas.microsoft.com/office/drawing/2010/main" xmlns="" w="9525">
+                  <a14:hiddenLine xmlns="" xmlns:a14="http://schemas.microsoft.com/office/drawing/2010/main" w="9525">
                     <a:solidFill>
                       <a:srgbClr val="000000"/>
                     </a:solidFill>
@@ -11937,7 +11942,7 @@
             <a:fld id="{48A87A34-81AB-432B-8DAE-1953F412C126}" type="datetimeFigureOut">
               <a:rPr lang="en-US" dirty="0"/>
               <a:pPr/>
-              <a:t>4/14/2018</a:t>
+              <a:t>4/21/2018</a:t>
             </a:fld>
             <a:endParaRPr lang="en-US" dirty="0"/>
           </a:p>
@@ -12681,9 +12686,17 @@
           <a:p>
             <a:pPr lvl="1"/>
             <a:r>
-              <a:rPr lang="en-GB" dirty="0"/>
-              <a:t>X</a:t>
-            </a:r>
+              <a:rPr lang="en-GB" dirty="0" smtClean="0"/>
+              <a:t>TBB</a:t>
+            </a:r>
+          </a:p>
+          <a:p>
+            <a:pPr lvl="1"/>
+            <a:r>
+              <a:rPr lang="en-GB" dirty="0" smtClean="0"/>
+              <a:t>OpenGL (Year 2, Semester 1 base project file)</a:t>
+            </a:r>
+            <a:endParaRPr lang="en-GB" dirty="0"/>
           </a:p>
           <a:p>
             <a:endParaRPr lang="en-GB" dirty="0"/>
@@ -12771,8 +12784,60 @@
           <a:p>
             <a:r>
               <a:rPr lang="en-GB" dirty="0"/>
-              <a:t>The CPU or GPU specification used for testing depending on your chosen application.</a:t>
-            </a:r>
+              <a:t>The CPU or GPU specification used for testing depending on your chosen application</a:t>
+            </a:r>
+            <a:r>
+              <a:rPr lang="en-GB" dirty="0" smtClean="0"/>
+              <a:t>.</a:t>
+            </a:r>
+          </a:p>
+          <a:p>
+            <a:r>
+              <a:rPr lang="en-GB" dirty="0" smtClean="0"/>
+              <a:t>Vita Lab Computers</a:t>
+            </a:r>
+          </a:p>
+          <a:p>
+            <a:pPr lvl="1"/>
+            <a:r>
+              <a:rPr lang="en-GB" dirty="0" smtClean="0"/>
+              <a:t>OS – Windows 7 Professional</a:t>
+            </a:r>
+          </a:p>
+          <a:p>
+            <a:pPr lvl="1"/>
+            <a:r>
+              <a:rPr lang="en-GB" dirty="0" smtClean="0"/>
+              <a:t>GPU – NVIDIA GeForce GT 440</a:t>
+            </a:r>
+          </a:p>
+          <a:p>
+            <a:pPr lvl="1"/>
+            <a:r>
+              <a:rPr lang="en-GB" dirty="0" smtClean="0"/>
+              <a:t>CPU – Intel64 Family 6 Model 58 Stepping 9 </a:t>
+            </a:r>
+            <a:r>
+              <a:rPr lang="en-GB" dirty="0" err="1" smtClean="0"/>
+              <a:t>GenuineIntel</a:t>
+            </a:r>
+            <a:r>
+              <a:rPr lang="en-GB" dirty="0" smtClean="0"/>
+              <a:t> ~2880 </a:t>
+            </a:r>
+            <a:r>
+              <a:rPr lang="en-GB" dirty="0" err="1" smtClean="0"/>
+              <a:t>Mhz</a:t>
+            </a:r>
+            <a:endParaRPr lang="en-GB" dirty="0" smtClean="0"/>
+          </a:p>
+          <a:p>
+            <a:pPr lvl="1"/>
+            <a:r>
+              <a:rPr lang="en-GB" dirty="0" smtClean="0"/>
+              <a:t>RAM – 16	GB</a:t>
+            </a:r>
+            <a:endParaRPr lang="en-GB" dirty="0"/>
           </a:p>
         </p:txBody>
       </p:sp>
@@ -12857,8 +12922,28 @@
           <a:p>
             <a:r>
               <a:rPr lang="en-GB" dirty="0"/>
-              <a:t>The results you have measured, including graphs.</a:t>
-            </a:r>
+              <a:t>The results you have measured, including graphs</a:t>
+            </a:r>
+            <a:r>
+              <a:rPr lang="en-GB" dirty="0" smtClean="0"/>
+              <a:t>.</a:t>
+            </a:r>
+          </a:p>
+          <a:p>
+            <a:pPr lvl="1"/>
+            <a:r>
+              <a:rPr lang="en-GB" dirty="0" smtClean="0"/>
+              <a:t>Time taken to compute Mandelbrot at various levels. (Iterations, movement, zoom) (</a:t>
+            </a:r>
+            <a:r>
+              <a:rPr lang="en-GB" dirty="0" err="1" smtClean="0"/>
+              <a:t>ms</a:t>
+            </a:r>
+            <a:r>
+              <a:rPr lang="en-GB" dirty="0" smtClean="0"/>
+              <a:t>)</a:t>
+            </a:r>
+            <a:endParaRPr lang="en-GB" dirty="0"/>
           </a:p>
         </p:txBody>
       </p:sp>
@@ -13037,8 +13122,26 @@
           <a:p>
             <a:r>
               <a:rPr lang="en-GB" dirty="0"/>
-              <a:t>Purpose of the application and the problem you’re trying to solve through parallel programming</a:t>
-            </a:r>
+              <a:t>Purpose of the application and the problem you’re trying to solve through parallel </a:t>
+            </a:r>
+            <a:r>
+              <a:rPr lang="en-GB" dirty="0" smtClean="0"/>
+              <a:t>programming</a:t>
+            </a:r>
+          </a:p>
+          <a:p>
+            <a:r>
+              <a:rPr lang="en-GB" dirty="0" smtClean="0"/>
+              <a:t>Interactive Mandelbrot via OpenGL</a:t>
+            </a:r>
+          </a:p>
+          <a:p>
+            <a:pPr lvl="1"/>
+            <a:r>
+              <a:rPr lang="en-GB" dirty="0" smtClean="0"/>
+              <a:t>Run quicker/demonstrate good GPU parallelisable program.</a:t>
+            </a:r>
+            <a:endParaRPr lang="en-GB" dirty="0"/>
           </a:p>
         </p:txBody>
       </p:sp>
@@ -13123,7 +13226,15 @@
           <a:p>
             <a:r>
               <a:rPr lang="en-GB" dirty="0"/>
-              <a:t>How the parallel parts of the code are structured(e.g. in terms of patters discussed in the module) and how they are integrated with the rest of your application.</a:t>
+              <a:t>How the parallel parts of the code are structured(e.g. in terms of </a:t>
+            </a:r>
+            <a:r>
+              <a:rPr lang="en-GB" dirty="0" smtClean="0"/>
+              <a:t>patterns </a:t>
+            </a:r>
+            <a:r>
+              <a:rPr lang="en-GB" dirty="0"/>
+              <a:t>discussed in the module) and how they are integrated with the rest of your application.</a:t>
             </a:r>
           </a:p>
         </p:txBody>
@@ -13209,8 +13320,37 @@
           <a:p>
             <a:r>
               <a:rPr lang="en-GB" dirty="0"/>
-              <a:t>How your application makes use of threads and how interactions between threads are managed safely (mutexes, atomic operations or barriers).</a:t>
-            </a:r>
+              <a:t>How your application makes use of threads and how interactions between threads are managed safely (mutexes, atomic operations or barriers</a:t>
+            </a:r>
+            <a:r>
+              <a:rPr lang="en-GB" dirty="0" smtClean="0"/>
+              <a:t>).</a:t>
+            </a:r>
+          </a:p>
+          <a:p>
+            <a:r>
+              <a:rPr lang="en-GB" dirty="0" smtClean="0"/>
+              <a:t>Non-tiled GPU utilised function</a:t>
+            </a:r>
+          </a:p>
+          <a:p>
+            <a:r>
+              <a:rPr lang="en-GB" dirty="0" smtClean="0"/>
+              <a:t>No communication between pixels so no interactions therefore </a:t>
+            </a:r>
+            <a:r>
+              <a:rPr lang="en-GB" dirty="0"/>
+              <a:t>no </a:t>
+            </a:r>
+            <a:r>
+              <a:rPr lang="en-GB" dirty="0" err="1"/>
+              <a:t>mutexes</a:t>
+            </a:r>
+            <a:r>
+              <a:rPr lang="en-GB" dirty="0"/>
+              <a:t>, atomic operations or barriers</a:t>
+            </a:r>
+            <a:endParaRPr lang="en-GB" dirty="0"/>
           </a:p>
         </p:txBody>
       </p:sp>
@@ -13295,8 +13435,19 @@
           <a:p>
             <a:r>
               <a:rPr lang="en-GB" dirty="0"/>
-              <a:t>Presentation of key results of the performance evaluation (Slides 3 – 5)</a:t>
-            </a:r>
+              <a:t>Presentation of key results of the performance evaluation (Slides 3 – 5</a:t>
+            </a:r>
+            <a:r>
+              <a:rPr lang="en-GB" dirty="0" smtClean="0"/>
+              <a:t>)</a:t>
+            </a:r>
+          </a:p>
+          <a:p>
+            <a:r>
+              <a:rPr lang="en-GB" dirty="0" smtClean="0"/>
+              <a:t>Timing against various renderings of Mandelbrot.</a:t>
+            </a:r>
+            <a:endParaRPr lang="en-GB" dirty="0"/>
           </a:p>
         </p:txBody>
       </p:sp>

</xml_diff>

<commit_message>
Renamed files, updated .ppt
</commit_message>
<xml_diff>
--- a/CMP202 Assessment.pptx
+++ b/CMP202 Assessment.pptx
@@ -12,11 +12,23 @@
     <p:sldId id="263" r:id="rId6"/>
     <p:sldId id="258" r:id="rId7"/>
     <p:sldId id="259" r:id="rId8"/>
-    <p:sldId id="260" r:id="rId9"/>
-    <p:sldId id="264" r:id="rId10"/>
-    <p:sldId id="265" r:id="rId11"/>
-    <p:sldId id="266" r:id="rId12"/>
-    <p:sldId id="276" r:id="rId13"/>
+    <p:sldId id="277" r:id="rId9"/>
+    <p:sldId id="281" r:id="rId10"/>
+    <p:sldId id="282" r:id="rId11"/>
+    <p:sldId id="278" r:id="rId12"/>
+    <p:sldId id="283" r:id="rId13"/>
+    <p:sldId id="284" r:id="rId14"/>
+    <p:sldId id="279" r:id="rId15"/>
+    <p:sldId id="285" r:id="rId16"/>
+    <p:sldId id="286" r:id="rId17"/>
+    <p:sldId id="280" r:id="rId18"/>
+    <p:sldId id="287" r:id="rId19"/>
+    <p:sldId id="288" r:id="rId20"/>
+    <p:sldId id="260" r:id="rId21"/>
+    <p:sldId id="264" r:id="rId22"/>
+    <p:sldId id="265" r:id="rId23"/>
+    <p:sldId id="266" r:id="rId24"/>
+    <p:sldId id="276" r:id="rId25"/>
   </p:sldIdLst>
   <p:sldSz cx="12192000" cy="6858000"/>
   <p:notesSz cx="6858000" cy="9144000"/>
@@ -173,7 +185,7 @@
           <a:noFill/>
           <a:extLst>
             <a:ext uri="{909E8E84-426E-40dd-AFC4-6F175D3DCCD1}">
-              <a14:hiddenFill xmlns="" xmlns:a14="http://schemas.microsoft.com/office/drawing/2010/main">
+              <a14:hiddenFill xmlns:a14="http://schemas.microsoft.com/office/drawing/2010/main" xmlns="">
                 <a:solidFill>
                   <a:srgbClr val="FFFFFF"/>
                 </a:solidFill>
@@ -233,7 +245,7 @@
             </a:ln>
             <a:extLst>
               <a:ext uri="{91240B29-F687-4f45-9708-019B960494DF}">
-                <a14:hiddenLine xmlns="" xmlns:a14="http://schemas.microsoft.com/office/drawing/2010/main" w="9525">
+                <a14:hiddenLine xmlns:a14="http://schemas.microsoft.com/office/drawing/2010/main" xmlns="" w="9525">
                   <a:solidFill>
                     <a:srgbClr val="000000"/>
                   </a:solidFill>
@@ -323,7 +335,7 @@
             </a:ln>
             <a:extLst>
               <a:ext uri="{91240B29-F687-4f45-9708-019B960494DF}">
-                <a14:hiddenLine xmlns="" xmlns:a14="http://schemas.microsoft.com/office/drawing/2010/main" w="9525">
+                <a14:hiddenLine xmlns:a14="http://schemas.microsoft.com/office/drawing/2010/main" xmlns="" w="9525">
                   <a:solidFill>
                     <a:srgbClr val="000000"/>
                   </a:solidFill>
@@ -413,7 +425,7 @@
             </a:ln>
             <a:extLst>
               <a:ext uri="{91240B29-F687-4f45-9708-019B960494DF}">
-                <a14:hiddenLine xmlns="" xmlns:a14="http://schemas.microsoft.com/office/drawing/2010/main" w="9525">
+                <a14:hiddenLine xmlns:a14="http://schemas.microsoft.com/office/drawing/2010/main" xmlns="" w="9525">
                   <a:solidFill>
                     <a:srgbClr val="000000"/>
                   </a:solidFill>
@@ -447,7 +459,7 @@
             </a:ln>
             <a:extLst>
               <a:ext uri="{91240B29-F687-4f45-9708-019B960494DF}">
-                <a14:hiddenLine xmlns="" xmlns:a14="http://schemas.microsoft.com/office/drawing/2010/main" w="9525">
+                <a14:hiddenLine xmlns:a14="http://schemas.microsoft.com/office/drawing/2010/main" xmlns="" w="9525">
                   <a:solidFill>
                     <a:srgbClr val="000000"/>
                   </a:solidFill>
@@ -537,7 +549,7 @@
             </a:ln>
             <a:extLst>
               <a:ext uri="{91240B29-F687-4f45-9708-019B960494DF}">
-                <a14:hiddenLine xmlns="" xmlns:a14="http://schemas.microsoft.com/office/drawing/2010/main" w="9525">
+                <a14:hiddenLine xmlns:a14="http://schemas.microsoft.com/office/drawing/2010/main" xmlns="" w="9525">
                   <a:solidFill>
                     <a:srgbClr val="000000"/>
                   </a:solidFill>
@@ -599,7 +611,7 @@
             </a:ln>
             <a:extLst>
               <a:ext uri="{91240B29-F687-4f45-9708-019B960494DF}">
-                <a14:hiddenLine xmlns="" xmlns:a14="http://schemas.microsoft.com/office/drawing/2010/main" w="9525">
+                <a14:hiddenLine xmlns:a14="http://schemas.microsoft.com/office/drawing/2010/main" xmlns="" w="9525">
                   <a:solidFill>
                     <a:srgbClr val="000000"/>
                   </a:solidFill>
@@ -661,7 +673,7 @@
             </a:ln>
             <a:extLst>
               <a:ext uri="{91240B29-F687-4f45-9708-019B960494DF}">
-                <a14:hiddenLine xmlns="" xmlns:a14="http://schemas.microsoft.com/office/drawing/2010/main" w="9525">
+                <a14:hiddenLine xmlns:a14="http://schemas.microsoft.com/office/drawing/2010/main" xmlns="" w="9525">
                   <a:solidFill>
                     <a:srgbClr val="000000"/>
                   </a:solidFill>
@@ -751,7 +763,7 @@
             </a:ln>
             <a:extLst>
               <a:ext uri="{91240B29-F687-4f45-9708-019B960494DF}">
-                <a14:hiddenLine xmlns="" xmlns:a14="http://schemas.microsoft.com/office/drawing/2010/main" w="9525">
+                <a14:hiddenLine xmlns:a14="http://schemas.microsoft.com/office/drawing/2010/main" xmlns="" w="9525">
                   <a:solidFill>
                     <a:srgbClr val="000000"/>
                   </a:solidFill>
@@ -813,7 +825,7 @@
             </a:ln>
             <a:extLst>
               <a:ext uri="{91240B29-F687-4f45-9708-019B960494DF}">
-                <a14:hiddenLine xmlns="" xmlns:a14="http://schemas.microsoft.com/office/drawing/2010/main" w="9525">
+                <a14:hiddenLine xmlns:a14="http://schemas.microsoft.com/office/drawing/2010/main" xmlns="" w="9525">
                   <a:solidFill>
                     <a:srgbClr val="000000"/>
                   </a:solidFill>
@@ -875,7 +887,7 @@
             </a:ln>
             <a:extLst>
               <a:ext uri="{91240B29-F687-4f45-9708-019B960494DF}">
-                <a14:hiddenLine xmlns="" xmlns:a14="http://schemas.microsoft.com/office/drawing/2010/main" w="9525">
+                <a14:hiddenLine xmlns:a14="http://schemas.microsoft.com/office/drawing/2010/main" xmlns="" w="9525">
                   <a:solidFill>
                     <a:srgbClr val="000000"/>
                   </a:solidFill>
@@ -965,7 +977,7 @@
             </a:ln>
             <a:extLst>
               <a:ext uri="{91240B29-F687-4f45-9708-019B960494DF}">
-                <a14:hiddenLine xmlns="" xmlns:a14="http://schemas.microsoft.com/office/drawing/2010/main" w="9525">
+                <a14:hiddenLine xmlns:a14="http://schemas.microsoft.com/office/drawing/2010/main" xmlns="" w="9525">
                   <a:solidFill>
                     <a:srgbClr val="000000"/>
                   </a:solidFill>
@@ -1055,7 +1067,7 @@
             </a:ln>
             <a:extLst>
               <a:ext uri="{91240B29-F687-4f45-9708-019B960494DF}">
-                <a14:hiddenLine xmlns="" xmlns:a14="http://schemas.microsoft.com/office/drawing/2010/main" w="9525">
+                <a14:hiddenLine xmlns:a14="http://schemas.microsoft.com/office/drawing/2010/main" xmlns="" w="9525">
                   <a:solidFill>
                     <a:srgbClr val="000000"/>
                   </a:solidFill>
@@ -1117,7 +1129,7 @@
             </a:ln>
             <a:extLst>
               <a:ext uri="{91240B29-F687-4f45-9708-019B960494DF}">
-                <a14:hiddenLine xmlns="" xmlns:a14="http://schemas.microsoft.com/office/drawing/2010/main" w="9525">
+                <a14:hiddenLine xmlns:a14="http://schemas.microsoft.com/office/drawing/2010/main" xmlns="" w="9525">
                   <a:solidFill>
                     <a:srgbClr val="000000"/>
                   </a:solidFill>
@@ -1227,7 +1239,7 @@
             </a:ln>
             <a:extLst>
               <a:ext uri="{91240B29-F687-4f45-9708-019B960494DF}">
-                <a14:hiddenLine xmlns="" xmlns:a14="http://schemas.microsoft.com/office/drawing/2010/main" w="9525">
+                <a14:hiddenLine xmlns:a14="http://schemas.microsoft.com/office/drawing/2010/main" xmlns="" w="9525">
                   <a:solidFill>
                     <a:srgbClr val="000000"/>
                   </a:solidFill>
@@ -1289,7 +1301,7 @@
             </a:ln>
             <a:extLst>
               <a:ext uri="{91240B29-F687-4f45-9708-019B960494DF}">
-                <a14:hiddenLine xmlns="" xmlns:a14="http://schemas.microsoft.com/office/drawing/2010/main" w="9525">
+                <a14:hiddenLine xmlns:a14="http://schemas.microsoft.com/office/drawing/2010/main" xmlns="" w="9525">
                   <a:solidFill>
                     <a:srgbClr val="000000"/>
                   </a:solidFill>
@@ -1379,7 +1391,7 @@
             </a:ln>
             <a:extLst>
               <a:ext uri="{91240B29-F687-4f45-9708-019B960494DF}">
-                <a14:hiddenLine xmlns="" xmlns:a14="http://schemas.microsoft.com/office/drawing/2010/main" w="9525">
+                <a14:hiddenLine xmlns:a14="http://schemas.microsoft.com/office/drawing/2010/main" xmlns="" w="9525">
                   <a:solidFill>
                     <a:srgbClr val="000000"/>
                   </a:solidFill>
@@ -1469,7 +1481,7 @@
             </a:ln>
             <a:extLst>
               <a:ext uri="{91240B29-F687-4f45-9708-019B960494DF}">
-                <a14:hiddenLine xmlns="" xmlns:a14="http://schemas.microsoft.com/office/drawing/2010/main" w="9525">
+                <a14:hiddenLine xmlns:a14="http://schemas.microsoft.com/office/drawing/2010/main" xmlns="" w="9525">
                   <a:solidFill>
                     <a:srgbClr val="000000"/>
                   </a:solidFill>
@@ -1531,7 +1543,7 @@
             </a:ln>
             <a:extLst>
               <a:ext uri="{91240B29-F687-4f45-9708-019B960494DF}">
-                <a14:hiddenLine xmlns="" xmlns:a14="http://schemas.microsoft.com/office/drawing/2010/main" w="9525">
+                <a14:hiddenLine xmlns:a14="http://schemas.microsoft.com/office/drawing/2010/main" xmlns="" w="9525">
                   <a:solidFill>
                     <a:srgbClr val="000000"/>
                   </a:solidFill>
@@ -1621,7 +1633,7 @@
             </a:ln>
             <a:extLst>
               <a:ext uri="{91240B29-F687-4f45-9708-019B960494DF}">
-                <a14:hiddenLine xmlns="" xmlns:a14="http://schemas.microsoft.com/office/drawing/2010/main" w="9525">
+                <a14:hiddenLine xmlns:a14="http://schemas.microsoft.com/office/drawing/2010/main" xmlns="" w="9525">
                   <a:solidFill>
                     <a:srgbClr val="000000"/>
                   </a:solidFill>
@@ -1711,7 +1723,7 @@
             </a:ln>
             <a:extLst>
               <a:ext uri="{91240B29-F687-4f45-9708-019B960494DF}">
-                <a14:hiddenLine xmlns="" xmlns:a14="http://schemas.microsoft.com/office/drawing/2010/main" w="9525">
+                <a14:hiddenLine xmlns:a14="http://schemas.microsoft.com/office/drawing/2010/main" xmlns="" w="9525">
                   <a:solidFill>
                     <a:srgbClr val="000000"/>
                   </a:solidFill>
@@ -1767,7 +1779,7 @@
             </a:ln>
             <a:extLst>
               <a:ext uri="{91240B29-F687-4f45-9708-019B960494DF}">
-                <a14:hiddenLine xmlns="" xmlns:a14="http://schemas.microsoft.com/office/drawing/2010/main" w="9525">
+                <a14:hiddenLine xmlns:a14="http://schemas.microsoft.com/office/drawing/2010/main" xmlns="" w="9525">
                   <a:solidFill>
                     <a:srgbClr val="000000"/>
                   </a:solidFill>
@@ -1857,7 +1869,7 @@
             </a:ln>
             <a:extLst>
               <a:ext uri="{91240B29-F687-4f45-9708-019B960494DF}">
-                <a14:hiddenLine xmlns="" xmlns:a14="http://schemas.microsoft.com/office/drawing/2010/main" w="9525">
+                <a14:hiddenLine xmlns:a14="http://schemas.microsoft.com/office/drawing/2010/main" xmlns="" w="9525">
                   <a:solidFill>
                     <a:srgbClr val="000000"/>
                   </a:solidFill>
@@ -1913,7 +1925,7 @@
             </a:ln>
             <a:extLst>
               <a:ext uri="{91240B29-F687-4f45-9708-019B960494DF}">
-                <a14:hiddenLine xmlns="" xmlns:a14="http://schemas.microsoft.com/office/drawing/2010/main" w="9525">
+                <a14:hiddenLine xmlns:a14="http://schemas.microsoft.com/office/drawing/2010/main" xmlns="" w="9525">
                   <a:solidFill>
                     <a:srgbClr val="000000"/>
                   </a:solidFill>
@@ -2003,7 +2015,7 @@
             </a:ln>
             <a:extLst>
               <a:ext uri="{91240B29-F687-4f45-9708-019B960494DF}">
-                <a14:hiddenLine xmlns="" xmlns:a14="http://schemas.microsoft.com/office/drawing/2010/main" w="9525">
+                <a14:hiddenLine xmlns:a14="http://schemas.microsoft.com/office/drawing/2010/main" xmlns="" w="9525">
                   <a:solidFill>
                     <a:srgbClr val="000000"/>
                   </a:solidFill>
@@ -2071,7 +2083,7 @@
             </a:ln>
             <a:extLst>
               <a:ext uri="{91240B29-F687-4f45-9708-019B960494DF}">
-                <a14:hiddenLine xmlns="" xmlns:a14="http://schemas.microsoft.com/office/drawing/2010/main" w="9525">
+                <a14:hiddenLine xmlns:a14="http://schemas.microsoft.com/office/drawing/2010/main" xmlns="" w="9525">
                   <a:solidFill>
                     <a:srgbClr val="000000"/>
                   </a:solidFill>
@@ -2161,7 +2173,7 @@
             </a:ln>
             <a:extLst>
               <a:ext uri="{91240B29-F687-4f45-9708-019B960494DF}">
-                <a14:hiddenLine xmlns="" xmlns:a14="http://schemas.microsoft.com/office/drawing/2010/main" w="9525">
+                <a14:hiddenLine xmlns:a14="http://schemas.microsoft.com/office/drawing/2010/main" xmlns="" w="9525">
                   <a:solidFill>
                     <a:srgbClr val="000000"/>
                   </a:solidFill>
@@ -2229,7 +2241,7 @@
             </a:ln>
             <a:extLst>
               <a:ext uri="{91240B29-F687-4f45-9708-019B960494DF}">
-                <a14:hiddenLine xmlns="" xmlns:a14="http://schemas.microsoft.com/office/drawing/2010/main" w="9525">
+                <a14:hiddenLine xmlns:a14="http://schemas.microsoft.com/office/drawing/2010/main" xmlns="" w="9525">
                   <a:solidFill>
                     <a:srgbClr val="000000"/>
                   </a:solidFill>
@@ -2319,7 +2331,7 @@
             </a:ln>
             <a:extLst>
               <a:ext uri="{91240B29-F687-4f45-9708-019B960494DF}">
-                <a14:hiddenLine xmlns="" xmlns:a14="http://schemas.microsoft.com/office/drawing/2010/main" w="9525">
+                <a14:hiddenLine xmlns:a14="http://schemas.microsoft.com/office/drawing/2010/main" xmlns="" w="9525">
                   <a:solidFill>
                     <a:srgbClr val="000000"/>
                   </a:solidFill>
@@ -2353,7 +2365,7 @@
             </a:ln>
             <a:extLst>
               <a:ext uri="{91240B29-F687-4f45-9708-019B960494DF}">
-                <a14:hiddenLine xmlns="" xmlns:a14="http://schemas.microsoft.com/office/drawing/2010/main" w="9525">
+                <a14:hiddenLine xmlns:a14="http://schemas.microsoft.com/office/drawing/2010/main" xmlns="" w="9525">
                   <a:solidFill>
                     <a:srgbClr val="000000"/>
                   </a:solidFill>
@@ -2443,7 +2455,7 @@
             </a:ln>
             <a:extLst>
               <a:ext uri="{91240B29-F687-4f45-9708-019B960494DF}">
-                <a14:hiddenLine xmlns="" xmlns:a14="http://schemas.microsoft.com/office/drawing/2010/main" w="9525">
+                <a14:hiddenLine xmlns:a14="http://schemas.microsoft.com/office/drawing/2010/main" xmlns="" w="9525">
                   <a:solidFill>
                     <a:srgbClr val="000000"/>
                   </a:solidFill>
@@ -2505,7 +2517,7 @@
             </a:ln>
             <a:extLst>
               <a:ext uri="{91240B29-F687-4f45-9708-019B960494DF}">
-                <a14:hiddenLine xmlns="" xmlns:a14="http://schemas.microsoft.com/office/drawing/2010/main" w="9525">
+                <a14:hiddenLine xmlns:a14="http://schemas.microsoft.com/office/drawing/2010/main" xmlns="" w="9525">
                   <a:solidFill>
                     <a:srgbClr val="000000"/>
                   </a:solidFill>
@@ -2567,7 +2579,7 @@
             </a:ln>
             <a:extLst>
               <a:ext uri="{91240B29-F687-4f45-9708-019B960494DF}">
-                <a14:hiddenLine xmlns="" xmlns:a14="http://schemas.microsoft.com/office/drawing/2010/main" w="9525">
+                <a14:hiddenLine xmlns:a14="http://schemas.microsoft.com/office/drawing/2010/main" xmlns="" w="9525">
                   <a:solidFill>
                     <a:srgbClr val="000000"/>
                   </a:solidFill>
@@ -2657,7 +2669,7 @@
             </a:ln>
             <a:extLst>
               <a:ext uri="{91240B29-F687-4f45-9708-019B960494DF}">
-                <a14:hiddenLine xmlns="" xmlns:a14="http://schemas.microsoft.com/office/drawing/2010/main" w="9525">
+                <a14:hiddenLine xmlns:a14="http://schemas.microsoft.com/office/drawing/2010/main" xmlns="" w="9525">
                   <a:solidFill>
                     <a:srgbClr val="000000"/>
                   </a:solidFill>
@@ -2725,7 +2737,7 @@
             </a:ln>
             <a:extLst>
               <a:ext uri="{91240B29-F687-4f45-9708-019B960494DF}">
-                <a14:hiddenLine xmlns="" xmlns:a14="http://schemas.microsoft.com/office/drawing/2010/main" w="9525">
+                <a14:hiddenLine xmlns:a14="http://schemas.microsoft.com/office/drawing/2010/main" xmlns="" w="9525">
                   <a:solidFill>
                     <a:srgbClr val="000000"/>
                   </a:solidFill>
@@ -2787,7 +2799,7 @@
             </a:ln>
             <a:extLst>
               <a:ext uri="{91240B29-F687-4f45-9708-019B960494DF}">
-                <a14:hiddenLine xmlns="" xmlns:a14="http://schemas.microsoft.com/office/drawing/2010/main" w="9525">
+                <a14:hiddenLine xmlns:a14="http://schemas.microsoft.com/office/drawing/2010/main" xmlns="" w="9525">
                   <a:solidFill>
                     <a:srgbClr val="000000"/>
                   </a:solidFill>
@@ -2877,7 +2889,7 @@
             </a:ln>
             <a:extLst>
               <a:ext uri="{91240B29-F687-4f45-9708-019B960494DF}">
-                <a14:hiddenLine xmlns="" xmlns:a14="http://schemas.microsoft.com/office/drawing/2010/main" w="9525">
+                <a14:hiddenLine xmlns:a14="http://schemas.microsoft.com/office/drawing/2010/main" xmlns="" w="9525">
                   <a:solidFill>
                     <a:srgbClr val="000000"/>
                   </a:solidFill>
@@ -2939,7 +2951,7 @@
             </a:ln>
             <a:extLst>
               <a:ext uri="{91240B29-F687-4f45-9708-019B960494DF}">
-                <a14:hiddenLine xmlns="" xmlns:a14="http://schemas.microsoft.com/office/drawing/2010/main" w="9525">
+                <a14:hiddenLine xmlns:a14="http://schemas.microsoft.com/office/drawing/2010/main" xmlns="" w="9525">
                   <a:solidFill>
                     <a:srgbClr val="000000"/>
                   </a:solidFill>
@@ -3029,7 +3041,7 @@
             </a:ln>
             <a:extLst>
               <a:ext uri="{91240B29-F687-4f45-9708-019B960494DF}">
-                <a14:hiddenLine xmlns="" xmlns:a14="http://schemas.microsoft.com/office/drawing/2010/main" w="9525">
+                <a14:hiddenLine xmlns:a14="http://schemas.microsoft.com/office/drawing/2010/main" xmlns="" w="9525">
                   <a:solidFill>
                     <a:srgbClr val="000000"/>
                   </a:solidFill>
@@ -3091,7 +3103,7 @@
             </a:ln>
             <a:extLst>
               <a:ext uri="{91240B29-F687-4f45-9708-019B960494DF}">
-                <a14:hiddenLine xmlns="" xmlns:a14="http://schemas.microsoft.com/office/drawing/2010/main" w="9525">
+                <a14:hiddenLine xmlns:a14="http://schemas.microsoft.com/office/drawing/2010/main" xmlns="" w="9525">
                   <a:solidFill>
                     <a:srgbClr val="000000"/>
                   </a:solidFill>
@@ -3181,7 +3193,7 @@
             </a:ln>
             <a:extLst>
               <a:ext uri="{91240B29-F687-4f45-9708-019B960494DF}">
-                <a14:hiddenLine xmlns="" xmlns:a14="http://schemas.microsoft.com/office/drawing/2010/main" w="9525">
+                <a14:hiddenLine xmlns:a14="http://schemas.microsoft.com/office/drawing/2010/main" xmlns="" w="9525">
                   <a:solidFill>
                     <a:srgbClr val="000000"/>
                   </a:solidFill>
@@ -3215,7 +3227,7 @@
             </a:ln>
             <a:extLst>
               <a:ext uri="{91240B29-F687-4f45-9708-019B960494DF}">
-                <a14:hiddenLine xmlns="" xmlns:a14="http://schemas.microsoft.com/office/drawing/2010/main" w="9525">
+                <a14:hiddenLine xmlns:a14="http://schemas.microsoft.com/office/drawing/2010/main" xmlns="" w="9525">
                   <a:solidFill>
                     <a:srgbClr val="000000"/>
                   </a:solidFill>
@@ -3280,7 +3292,7 @@
             </a:ln>
             <a:extLst>
               <a:ext uri="{91240B29-F687-4f45-9708-019B960494DF}">
-                <a14:hiddenLine xmlns="" xmlns:a14="http://schemas.microsoft.com/office/drawing/2010/main" w="9525">
+                <a14:hiddenLine xmlns:a14="http://schemas.microsoft.com/office/drawing/2010/main" xmlns="" w="9525">
                   <a:solidFill>
                     <a:srgbClr val="000000"/>
                   </a:solidFill>
@@ -3370,7 +3382,7 @@
             </a:ln>
             <a:extLst>
               <a:ext uri="{91240B29-F687-4f45-9708-019B960494DF}">
-                <a14:hiddenLine xmlns="" xmlns:a14="http://schemas.microsoft.com/office/drawing/2010/main" w="9525">
+                <a14:hiddenLine xmlns:a14="http://schemas.microsoft.com/office/drawing/2010/main" xmlns="" w="9525">
                   <a:solidFill>
                     <a:srgbClr val="000000"/>
                   </a:solidFill>
@@ -3432,7 +3444,7 @@
             </a:ln>
             <a:extLst>
               <a:ext uri="{91240B29-F687-4f45-9708-019B960494DF}">
-                <a14:hiddenLine xmlns="" xmlns:a14="http://schemas.microsoft.com/office/drawing/2010/main" w="9525">
+                <a14:hiddenLine xmlns:a14="http://schemas.microsoft.com/office/drawing/2010/main" xmlns="" w="9525">
                   <a:solidFill>
                     <a:srgbClr val="000000"/>
                   </a:solidFill>
@@ -3522,7 +3534,7 @@
             </a:ln>
             <a:extLst>
               <a:ext uri="{91240B29-F687-4f45-9708-019B960494DF}">
-                <a14:hiddenLine xmlns="" xmlns:a14="http://schemas.microsoft.com/office/drawing/2010/main" w="9525">
+                <a14:hiddenLine xmlns:a14="http://schemas.microsoft.com/office/drawing/2010/main" xmlns="" w="9525">
                   <a:solidFill>
                     <a:srgbClr val="000000"/>
                   </a:solidFill>
@@ -3612,7 +3624,7 @@
             </a:ln>
             <a:extLst>
               <a:ext uri="{91240B29-F687-4f45-9708-019B960494DF}">
-                <a14:hiddenLine xmlns="" xmlns:a14="http://schemas.microsoft.com/office/drawing/2010/main" w="9525">
+                <a14:hiddenLine xmlns:a14="http://schemas.microsoft.com/office/drawing/2010/main" xmlns="" w="9525">
                   <a:solidFill>
                     <a:srgbClr val="000000"/>
                   </a:solidFill>
@@ -3677,7 +3689,7 @@
             </a:ln>
             <a:extLst>
               <a:ext uri="{91240B29-F687-4f45-9708-019B960494DF}">
-                <a14:hiddenLine xmlns="" xmlns:a14="http://schemas.microsoft.com/office/drawing/2010/main" w="9525">
+                <a14:hiddenLine xmlns:a14="http://schemas.microsoft.com/office/drawing/2010/main" xmlns="" w="9525">
                   <a:solidFill>
                     <a:srgbClr val="000000"/>
                   </a:solidFill>
@@ -3739,7 +3751,7 @@
             </a:ln>
             <a:extLst>
               <a:ext uri="{91240B29-F687-4f45-9708-019B960494DF}">
-                <a14:hiddenLine xmlns="" xmlns:a14="http://schemas.microsoft.com/office/drawing/2010/main" w="9525">
+                <a14:hiddenLine xmlns:a14="http://schemas.microsoft.com/office/drawing/2010/main" xmlns="" w="9525">
                   <a:solidFill>
                     <a:srgbClr val="000000"/>
                   </a:solidFill>
@@ -3829,7 +3841,7 @@
             </a:ln>
             <a:extLst>
               <a:ext uri="{91240B29-F687-4f45-9708-019B960494DF}">
-                <a14:hiddenLine xmlns="" xmlns:a14="http://schemas.microsoft.com/office/drawing/2010/main" w="9525">
+                <a14:hiddenLine xmlns:a14="http://schemas.microsoft.com/office/drawing/2010/main" xmlns="" w="9525">
                   <a:solidFill>
                     <a:srgbClr val="000000"/>
                   </a:solidFill>
@@ -3919,7 +3931,7 @@
             </a:ln>
             <a:extLst>
               <a:ext uri="{91240B29-F687-4f45-9708-019B960494DF}">
-                <a14:hiddenLine xmlns="" xmlns:a14="http://schemas.microsoft.com/office/drawing/2010/main" w="9525">
+                <a14:hiddenLine xmlns:a14="http://schemas.microsoft.com/office/drawing/2010/main" xmlns="" w="9525">
                   <a:solidFill>
                     <a:srgbClr val="000000"/>
                   </a:solidFill>
@@ -3981,7 +3993,7 @@
             </a:ln>
             <a:extLst>
               <a:ext uri="{91240B29-F687-4f45-9708-019B960494DF}">
-                <a14:hiddenLine xmlns="" xmlns:a14="http://schemas.microsoft.com/office/drawing/2010/main" w="9525">
+                <a14:hiddenLine xmlns:a14="http://schemas.microsoft.com/office/drawing/2010/main" xmlns="" w="9525">
                   <a:solidFill>
                     <a:srgbClr val="000000"/>
                   </a:solidFill>
@@ -4101,7 +4113,7 @@
             </a:ln>
             <a:extLst>
               <a:ext uri="{91240B29-F687-4f45-9708-019B960494DF}">
-                <a14:hiddenLine xmlns="" xmlns:a14="http://schemas.microsoft.com/office/drawing/2010/main" w="9525">
+                <a14:hiddenLine xmlns:a14="http://schemas.microsoft.com/office/drawing/2010/main" xmlns="" w="9525">
                   <a:solidFill>
                     <a:srgbClr val="000000"/>
                   </a:solidFill>
@@ -4169,7 +4181,7 @@
             </a:ln>
             <a:extLst>
               <a:ext uri="{91240B29-F687-4f45-9708-019B960494DF}">
-                <a14:hiddenLine xmlns="" xmlns:a14="http://schemas.microsoft.com/office/drawing/2010/main" w="9525">
+                <a14:hiddenLine xmlns:a14="http://schemas.microsoft.com/office/drawing/2010/main" xmlns="" w="9525">
                   <a:solidFill>
                     <a:srgbClr val="000000"/>
                   </a:solidFill>
@@ -4259,7 +4271,7 @@
             </a:ln>
             <a:extLst>
               <a:ext uri="{91240B29-F687-4f45-9708-019B960494DF}">
-                <a14:hiddenLine xmlns="" xmlns:a14="http://schemas.microsoft.com/office/drawing/2010/main" w="9525">
+                <a14:hiddenLine xmlns:a14="http://schemas.microsoft.com/office/drawing/2010/main" xmlns="" w="9525">
                   <a:solidFill>
                     <a:srgbClr val="000000"/>
                   </a:solidFill>
@@ -4399,7 +4411,7 @@
           <a:p>
             <a:fld id="{48A87A34-81AB-432B-8DAE-1953F412C126}" type="datetimeFigureOut">
               <a:rPr lang="en-US" dirty="0"/>
-              <a:t>4/26/2018</a:t>
+              <a:t>4/27/2018</a:t>
             </a:fld>
             <a:endParaRPr lang="en-US" dirty="0"/>
           </a:p>
@@ -4661,7 +4673,7 @@
           <a:p>
             <a:fld id="{48A87A34-81AB-432B-8DAE-1953F412C126}" type="datetimeFigureOut">
               <a:rPr lang="en-US" dirty="0"/>
-              <a:t>4/26/2018</a:t>
+              <a:t>4/27/2018</a:t>
             </a:fld>
             <a:endParaRPr lang="en-US" dirty="0"/>
           </a:p>
@@ -4852,7 +4864,7 @@
           <a:p>
             <a:fld id="{48A87A34-81AB-432B-8DAE-1953F412C126}" type="datetimeFigureOut">
               <a:rPr lang="en-US" dirty="0"/>
-              <a:t>4/26/2018</a:t>
+              <a:t>4/27/2018</a:t>
             </a:fld>
             <a:endParaRPr lang="en-US" dirty="0"/>
           </a:p>
@@ -5110,7 +5122,7 @@
           <a:p>
             <a:fld id="{48A87A34-81AB-432B-8DAE-1953F412C126}" type="datetimeFigureOut">
               <a:rPr lang="en-US" dirty="0"/>
-              <a:t>4/26/2018</a:t>
+              <a:t>4/27/2018</a:t>
             </a:fld>
             <a:endParaRPr lang="en-US" dirty="0"/>
           </a:p>
@@ -5539,7 +5551,7 @@
           <a:p>
             <a:fld id="{48A87A34-81AB-432B-8DAE-1953F412C126}" type="datetimeFigureOut">
               <a:rPr lang="en-US" dirty="0"/>
-              <a:t>4/26/2018</a:t>
+              <a:t>4/27/2018</a:t>
             </a:fld>
             <a:endParaRPr lang="en-US" dirty="0"/>
           </a:p>
@@ -6080,7 +6092,7 @@
           <a:p>
             <a:fld id="{48A87A34-81AB-432B-8DAE-1953F412C126}" type="datetimeFigureOut">
               <a:rPr lang="en-US" dirty="0"/>
-              <a:t>4/26/2018</a:t>
+              <a:t>4/27/2018</a:t>
             </a:fld>
             <a:endParaRPr lang="en-US" dirty="0"/>
           </a:p>
@@ -6795,7 +6807,7 @@
           <a:p>
             <a:fld id="{48A87A34-81AB-432B-8DAE-1953F412C126}" type="datetimeFigureOut">
               <a:rPr lang="en-US" dirty="0"/>
-              <a:t>4/26/2018</a:t>
+              <a:t>4/27/2018</a:t>
             </a:fld>
             <a:endParaRPr lang="en-US" dirty="0"/>
           </a:p>
@@ -6960,7 +6972,7 @@
           <a:p>
             <a:fld id="{48A87A34-81AB-432B-8DAE-1953F412C126}" type="datetimeFigureOut">
               <a:rPr lang="en-US" dirty="0"/>
-              <a:t>4/26/2018</a:t>
+              <a:t>4/27/2018</a:t>
             </a:fld>
             <a:endParaRPr lang="en-US" dirty="0"/>
           </a:p>
@@ -7135,7 +7147,7 @@
           <a:p>
             <a:fld id="{48A87A34-81AB-432B-8DAE-1953F412C126}" type="datetimeFigureOut">
               <a:rPr lang="en-US" dirty="0"/>
-              <a:t>4/26/2018</a:t>
+              <a:t>4/27/2018</a:t>
             </a:fld>
             <a:endParaRPr lang="en-US" dirty="0"/>
           </a:p>
@@ -7300,7 +7312,7 @@
           <a:p>
             <a:fld id="{48A87A34-81AB-432B-8DAE-1953F412C126}" type="datetimeFigureOut">
               <a:rPr lang="en-US" dirty="0"/>
-              <a:t>4/26/2018</a:t>
+              <a:t>4/27/2018</a:t>
             </a:fld>
             <a:endParaRPr lang="en-US" dirty="0"/>
           </a:p>
@@ -7545,7 +7557,7 @@
           <a:p>
             <a:fld id="{48A87A34-81AB-432B-8DAE-1953F412C126}" type="datetimeFigureOut">
               <a:rPr lang="en-US" dirty="0"/>
-              <a:t>4/26/2018</a:t>
+              <a:t>4/27/2018</a:t>
             </a:fld>
             <a:endParaRPr lang="en-US" dirty="0"/>
           </a:p>
@@ -7772,7 +7784,7 @@
           <a:p>
             <a:fld id="{48A87A34-81AB-432B-8DAE-1953F412C126}" type="datetimeFigureOut">
               <a:rPr lang="en-US" dirty="0"/>
-              <a:t>4/26/2018</a:t>
+              <a:t>4/27/2018</a:t>
             </a:fld>
             <a:endParaRPr lang="en-US" dirty="0"/>
           </a:p>
@@ -8148,7 +8160,7 @@
           <a:p>
             <a:fld id="{48A87A34-81AB-432B-8DAE-1953F412C126}" type="datetimeFigureOut">
               <a:rPr lang="en-US" dirty="0"/>
-              <a:t>4/26/2018</a:t>
+              <a:t>4/27/2018</a:t>
             </a:fld>
             <a:endParaRPr lang="en-US" dirty="0"/>
           </a:p>
@@ -8261,7 +8273,7 @@
           <a:p>
             <a:fld id="{48A87A34-81AB-432B-8DAE-1953F412C126}" type="datetimeFigureOut">
               <a:rPr lang="en-US" dirty="0"/>
-              <a:t>4/26/2018</a:t>
+              <a:t>4/27/2018</a:t>
             </a:fld>
             <a:endParaRPr lang="en-US" dirty="0"/>
           </a:p>
@@ -8351,7 +8363,7 @@
           <a:p>
             <a:fld id="{48A87A34-81AB-432B-8DAE-1953F412C126}" type="datetimeFigureOut">
               <a:rPr lang="en-US" dirty="0"/>
-              <a:t>4/26/2018</a:t>
+              <a:t>4/27/2018</a:t>
             </a:fld>
             <a:endParaRPr lang="en-US" dirty="0"/>
           </a:p>
@@ -8595,7 +8607,7 @@
           <a:p>
             <a:fld id="{48A87A34-81AB-432B-8DAE-1953F412C126}" type="datetimeFigureOut">
               <a:rPr lang="en-US" dirty="0"/>
-              <a:t>4/26/2018</a:t>
+              <a:t>4/27/2018</a:t>
             </a:fld>
             <a:endParaRPr lang="en-US" dirty="0"/>
           </a:p>
@@ -8870,7 +8882,7 @@
           <a:p>
             <a:fld id="{48A87A34-81AB-432B-8DAE-1953F412C126}" type="datetimeFigureOut">
               <a:rPr lang="en-US" dirty="0"/>
-              <a:t>4/26/2018</a:t>
+              <a:t>4/27/2018</a:t>
             </a:fld>
             <a:endParaRPr lang="en-US" dirty="0"/>
           </a:p>
@@ -8981,7 +8993,7 @@
           <a:noFill/>
           <a:extLst>
             <a:ext uri="{909E8E84-426E-40dd-AFC4-6F175D3DCCD1}">
-              <a14:hiddenFill xmlns="" xmlns:a14="http://schemas.microsoft.com/office/drawing/2010/main">
+              <a14:hiddenFill xmlns:a14="http://schemas.microsoft.com/office/drawing/2010/main" xmlns="">
                 <a:solidFill>
                   <a:srgbClr val="FFFFFF"/>
                 </a:solidFill>
@@ -9055,7 +9067,7 @@
               </a:ln>
               <a:extLst>
                 <a:ext uri="{91240B29-F687-4f45-9708-019B960494DF}">
-                  <a14:hiddenLine xmlns="" xmlns:a14="http://schemas.microsoft.com/office/drawing/2010/main" w="9525">
+                  <a14:hiddenLine xmlns:a14="http://schemas.microsoft.com/office/drawing/2010/main" xmlns="" w="9525">
                     <a:solidFill>
                       <a:srgbClr val="000000"/>
                     </a:solidFill>
@@ -9145,7 +9157,7 @@
               </a:ln>
               <a:extLst>
                 <a:ext uri="{91240B29-F687-4f45-9708-019B960494DF}">
-                  <a14:hiddenLine xmlns="" xmlns:a14="http://schemas.microsoft.com/office/drawing/2010/main" w="9525">
+                  <a14:hiddenLine xmlns:a14="http://schemas.microsoft.com/office/drawing/2010/main" xmlns="" w="9525">
                     <a:solidFill>
                       <a:srgbClr val="000000"/>
                     </a:solidFill>
@@ -9235,7 +9247,7 @@
               </a:ln>
               <a:extLst>
                 <a:ext uri="{91240B29-F687-4f45-9708-019B960494DF}">
-                  <a14:hiddenLine xmlns="" xmlns:a14="http://schemas.microsoft.com/office/drawing/2010/main" w="9525">
+                  <a14:hiddenLine xmlns:a14="http://schemas.microsoft.com/office/drawing/2010/main" xmlns="" w="9525">
                     <a:solidFill>
                       <a:srgbClr val="000000"/>
                     </a:solidFill>
@@ -9297,7 +9309,7 @@
               </a:ln>
               <a:extLst>
                 <a:ext uri="{91240B29-F687-4f45-9708-019B960494DF}">
-                  <a14:hiddenLine xmlns="" xmlns:a14="http://schemas.microsoft.com/office/drawing/2010/main" w="9525">
+                  <a14:hiddenLine xmlns:a14="http://schemas.microsoft.com/office/drawing/2010/main" xmlns="" w="9525">
                     <a:solidFill>
                       <a:srgbClr val="000000"/>
                     </a:solidFill>
@@ -9387,7 +9399,7 @@
               </a:ln>
               <a:extLst>
                 <a:ext uri="{91240B29-F687-4f45-9708-019B960494DF}">
-                  <a14:hiddenLine xmlns="" xmlns:a14="http://schemas.microsoft.com/office/drawing/2010/main" w="9525">
+                  <a14:hiddenLine xmlns:a14="http://schemas.microsoft.com/office/drawing/2010/main" xmlns="" w="9525">
                     <a:solidFill>
                       <a:srgbClr val="000000"/>
                     </a:solidFill>
@@ -9449,7 +9461,7 @@
               </a:ln>
               <a:extLst>
                 <a:ext uri="{91240B29-F687-4f45-9708-019B960494DF}">
-                  <a14:hiddenLine xmlns="" xmlns:a14="http://schemas.microsoft.com/office/drawing/2010/main" w="9525">
+                  <a14:hiddenLine xmlns:a14="http://schemas.microsoft.com/office/drawing/2010/main" xmlns="" w="9525">
                     <a:solidFill>
                       <a:srgbClr val="000000"/>
                     </a:solidFill>
@@ -9511,7 +9523,7 @@
               </a:ln>
               <a:extLst>
                 <a:ext uri="{91240B29-F687-4f45-9708-019B960494DF}">
-                  <a14:hiddenLine xmlns="" xmlns:a14="http://schemas.microsoft.com/office/drawing/2010/main" w="9525">
+                  <a14:hiddenLine xmlns:a14="http://schemas.microsoft.com/office/drawing/2010/main" xmlns="" w="9525">
                     <a:solidFill>
                       <a:srgbClr val="000000"/>
                     </a:solidFill>
@@ -9601,7 +9613,7 @@
               </a:ln>
               <a:extLst>
                 <a:ext uri="{91240B29-F687-4f45-9708-019B960494DF}">
-                  <a14:hiddenLine xmlns="" xmlns:a14="http://schemas.microsoft.com/office/drawing/2010/main" w="9525">
+                  <a14:hiddenLine xmlns:a14="http://schemas.microsoft.com/office/drawing/2010/main" xmlns="" w="9525">
                     <a:solidFill>
                       <a:srgbClr val="000000"/>
                     </a:solidFill>
@@ -9691,7 +9703,7 @@
               </a:ln>
               <a:extLst>
                 <a:ext uri="{91240B29-F687-4f45-9708-019B960494DF}">
-                  <a14:hiddenLine xmlns="" xmlns:a14="http://schemas.microsoft.com/office/drawing/2010/main" w="9525">
+                  <a14:hiddenLine xmlns:a14="http://schemas.microsoft.com/office/drawing/2010/main" xmlns="" w="9525">
                     <a:solidFill>
                       <a:srgbClr val="000000"/>
                     </a:solidFill>
@@ -9753,7 +9765,7 @@
               </a:ln>
               <a:extLst>
                 <a:ext uri="{91240B29-F687-4f45-9708-019B960494DF}">
-                  <a14:hiddenLine xmlns="" xmlns:a14="http://schemas.microsoft.com/office/drawing/2010/main" w="9525">
+                  <a14:hiddenLine xmlns:a14="http://schemas.microsoft.com/office/drawing/2010/main" xmlns="" w="9525">
                     <a:solidFill>
                       <a:srgbClr val="000000"/>
                     </a:solidFill>
@@ -9863,7 +9875,7 @@
               </a:ln>
               <a:extLst>
                 <a:ext uri="{91240B29-F687-4f45-9708-019B960494DF}">
-                  <a14:hiddenLine xmlns="" xmlns:a14="http://schemas.microsoft.com/office/drawing/2010/main" w="9525">
+                  <a14:hiddenLine xmlns:a14="http://schemas.microsoft.com/office/drawing/2010/main" xmlns="" w="9525">
                     <a:solidFill>
                       <a:srgbClr val="000000"/>
                     </a:solidFill>
@@ -9947,7 +9959,7 @@
               </a:ln>
               <a:extLst>
                 <a:ext uri="{91240B29-F687-4f45-9708-019B960494DF}">
-                  <a14:hiddenLine xmlns="" xmlns:a14="http://schemas.microsoft.com/office/drawing/2010/main" w="9525">
+                  <a14:hiddenLine xmlns:a14="http://schemas.microsoft.com/office/drawing/2010/main" xmlns="" w="9525">
                     <a:solidFill>
                       <a:srgbClr val="000000"/>
                     </a:solidFill>
@@ -10009,7 +10021,7 @@
               </a:ln>
               <a:extLst>
                 <a:ext uri="{91240B29-F687-4f45-9708-019B960494DF}">
-                  <a14:hiddenLine xmlns="" xmlns:a14="http://schemas.microsoft.com/office/drawing/2010/main" w="9525">
+                  <a14:hiddenLine xmlns:a14="http://schemas.microsoft.com/office/drawing/2010/main" xmlns="" w="9525">
                     <a:solidFill>
                       <a:srgbClr val="000000"/>
                     </a:solidFill>
@@ -10071,7 +10083,7 @@
               </a:ln>
               <a:extLst>
                 <a:ext uri="{91240B29-F687-4f45-9708-019B960494DF}">
-                  <a14:hiddenLine xmlns="" xmlns:a14="http://schemas.microsoft.com/office/drawing/2010/main" w="9525">
+                  <a14:hiddenLine xmlns:a14="http://schemas.microsoft.com/office/drawing/2010/main" xmlns="" w="9525">
                     <a:solidFill>
                       <a:srgbClr val="000000"/>
                     </a:solidFill>
@@ -10161,7 +10173,7 @@
               </a:ln>
               <a:extLst>
                 <a:ext uri="{91240B29-F687-4f45-9708-019B960494DF}">
-                  <a14:hiddenLine xmlns="" xmlns:a14="http://schemas.microsoft.com/office/drawing/2010/main" w="9525">
+                  <a14:hiddenLine xmlns:a14="http://schemas.microsoft.com/office/drawing/2010/main" xmlns="" w="9525">
                     <a:solidFill>
                       <a:srgbClr val="000000"/>
                     </a:solidFill>
@@ -10195,7 +10207,7 @@
               </a:ln>
               <a:extLst>
                 <a:ext uri="{91240B29-F687-4f45-9708-019B960494DF}">
-                  <a14:hiddenLine xmlns="" xmlns:a14="http://schemas.microsoft.com/office/drawing/2010/main" w="9525">
+                  <a14:hiddenLine xmlns:a14="http://schemas.microsoft.com/office/drawing/2010/main" xmlns="" w="9525">
                     <a:solidFill>
                       <a:srgbClr val="000000"/>
                     </a:solidFill>
@@ -10260,7 +10272,7 @@
               </a:ln>
               <a:extLst>
                 <a:ext uri="{91240B29-F687-4f45-9708-019B960494DF}">
-                  <a14:hiddenLine xmlns="" xmlns:a14="http://schemas.microsoft.com/office/drawing/2010/main" w="9525">
+                  <a14:hiddenLine xmlns:a14="http://schemas.microsoft.com/office/drawing/2010/main" xmlns="" w="9525">
                     <a:solidFill>
                       <a:srgbClr val="000000"/>
                     </a:solidFill>
@@ -10350,7 +10362,7 @@
               </a:ln>
               <a:extLst>
                 <a:ext uri="{91240B29-F687-4f45-9708-019B960494DF}">
-                  <a14:hiddenLine xmlns="" xmlns:a14="http://schemas.microsoft.com/office/drawing/2010/main" w="9525">
+                  <a14:hiddenLine xmlns:a14="http://schemas.microsoft.com/office/drawing/2010/main" xmlns="" w="9525">
                     <a:solidFill>
                       <a:srgbClr val="000000"/>
                     </a:solidFill>
@@ -10412,7 +10424,7 @@
               </a:ln>
               <a:extLst>
                 <a:ext uri="{91240B29-F687-4f45-9708-019B960494DF}">
-                  <a14:hiddenLine xmlns="" xmlns:a14="http://schemas.microsoft.com/office/drawing/2010/main" w="9525">
+                  <a14:hiddenLine xmlns:a14="http://schemas.microsoft.com/office/drawing/2010/main" xmlns="" w="9525">
                     <a:solidFill>
                       <a:srgbClr val="000000"/>
                     </a:solidFill>
@@ -10502,7 +10514,7 @@
               </a:ln>
               <a:extLst>
                 <a:ext uri="{91240B29-F687-4f45-9708-019B960494DF}">
-                  <a14:hiddenLine xmlns="" xmlns:a14="http://schemas.microsoft.com/office/drawing/2010/main" w="9525">
+                  <a14:hiddenLine xmlns:a14="http://schemas.microsoft.com/office/drawing/2010/main" xmlns="" w="9525">
                     <a:solidFill>
                       <a:srgbClr val="000000"/>
                     </a:solidFill>
@@ -10567,7 +10579,7 @@
               </a:ln>
               <a:extLst>
                 <a:ext uri="{91240B29-F687-4f45-9708-019B960494DF}">
-                  <a14:hiddenLine xmlns="" xmlns:a14="http://schemas.microsoft.com/office/drawing/2010/main" w="9525">
+                  <a14:hiddenLine xmlns:a14="http://schemas.microsoft.com/office/drawing/2010/main" xmlns="" w="9525">
                     <a:solidFill>
                       <a:srgbClr val="000000"/>
                     </a:solidFill>
@@ -10629,7 +10641,7 @@
               </a:ln>
               <a:extLst>
                 <a:ext uri="{91240B29-F687-4f45-9708-019B960494DF}">
-                  <a14:hiddenLine xmlns="" xmlns:a14="http://schemas.microsoft.com/office/drawing/2010/main" w="9525">
+                  <a14:hiddenLine xmlns:a14="http://schemas.microsoft.com/office/drawing/2010/main" xmlns="" w="9525">
                     <a:solidFill>
                       <a:srgbClr val="000000"/>
                     </a:solidFill>
@@ -10719,7 +10731,7 @@
               </a:ln>
               <a:extLst>
                 <a:ext uri="{91240B29-F687-4f45-9708-019B960494DF}">
-                  <a14:hiddenLine xmlns="" xmlns:a14="http://schemas.microsoft.com/office/drawing/2010/main" w="9525">
+                  <a14:hiddenLine xmlns:a14="http://schemas.microsoft.com/office/drawing/2010/main" xmlns="" w="9525">
                     <a:solidFill>
                       <a:srgbClr val="000000"/>
                     </a:solidFill>
@@ -10809,7 +10821,7 @@
               </a:ln>
               <a:extLst>
                 <a:ext uri="{91240B29-F687-4f45-9708-019B960494DF}">
-                  <a14:hiddenLine xmlns="" xmlns:a14="http://schemas.microsoft.com/office/drawing/2010/main" w="9525">
+                  <a14:hiddenLine xmlns:a14="http://schemas.microsoft.com/office/drawing/2010/main" xmlns="" w="9525">
                     <a:solidFill>
                       <a:srgbClr val="000000"/>
                     </a:solidFill>
@@ -10874,7 +10886,7 @@
               </a:ln>
               <a:extLst>
                 <a:ext uri="{91240B29-F687-4f45-9708-019B960494DF}">
-                  <a14:hiddenLine xmlns="" xmlns:a14="http://schemas.microsoft.com/office/drawing/2010/main" w="9525">
+                  <a14:hiddenLine xmlns:a14="http://schemas.microsoft.com/office/drawing/2010/main" xmlns="" w="9525">
                     <a:solidFill>
                       <a:srgbClr val="000000"/>
                     </a:solidFill>
@@ -10994,7 +11006,7 @@
               </a:ln>
               <a:extLst>
                 <a:ext uri="{91240B29-F687-4f45-9708-019B960494DF}">
-                  <a14:hiddenLine xmlns="" xmlns:a14="http://schemas.microsoft.com/office/drawing/2010/main" w="9525">
+                  <a14:hiddenLine xmlns:a14="http://schemas.microsoft.com/office/drawing/2010/main" xmlns="" w="9525">
                     <a:solidFill>
                       <a:srgbClr val="000000"/>
                     </a:solidFill>
@@ -11092,7 +11104,7 @@
               </a:ln>
               <a:extLst>
                 <a:ext uri="{91240B29-F687-4f45-9708-019B960494DF}">
-                  <a14:hiddenLine xmlns="" xmlns:a14="http://schemas.microsoft.com/office/drawing/2010/main" w="9525">
+                  <a14:hiddenLine xmlns:a14="http://schemas.microsoft.com/office/drawing/2010/main" xmlns="" w="9525">
                     <a:solidFill>
                       <a:srgbClr val="000000"/>
                     </a:solidFill>
@@ -11207,7 +11219,7 @@
               </a:ln>
               <a:extLst>
                 <a:ext uri="{91240B29-F687-4f45-9708-019B960494DF}">
-                  <a14:hiddenLine xmlns="" xmlns:a14="http://schemas.microsoft.com/office/drawing/2010/main" w="9525">
+                  <a14:hiddenLine xmlns:a14="http://schemas.microsoft.com/office/drawing/2010/main" xmlns="" w="9525">
                     <a:solidFill>
                       <a:srgbClr val="000000"/>
                     </a:solidFill>
@@ -11297,7 +11309,7 @@
               </a:ln>
               <a:extLst>
                 <a:ext uri="{91240B29-F687-4f45-9708-019B960494DF}">
-                  <a14:hiddenLine xmlns="" xmlns:a14="http://schemas.microsoft.com/office/drawing/2010/main" w="9525">
+                  <a14:hiddenLine xmlns:a14="http://schemas.microsoft.com/office/drawing/2010/main" xmlns="" w="9525">
                     <a:solidFill>
                       <a:srgbClr val="000000"/>
                     </a:solidFill>
@@ -11362,7 +11374,7 @@
               </a:ln>
               <a:extLst>
                 <a:ext uri="{91240B29-F687-4f45-9708-019B960494DF}">
-                  <a14:hiddenLine xmlns="" xmlns:a14="http://schemas.microsoft.com/office/drawing/2010/main" w="9525">
+                  <a14:hiddenLine xmlns:a14="http://schemas.microsoft.com/office/drawing/2010/main" xmlns="" w="9525">
                     <a:solidFill>
                       <a:srgbClr val="000000"/>
                     </a:solidFill>
@@ -11452,7 +11464,7 @@
               </a:ln>
               <a:extLst>
                 <a:ext uri="{91240B29-F687-4f45-9708-019B960494DF}">
-                  <a14:hiddenLine xmlns="" xmlns:a14="http://schemas.microsoft.com/office/drawing/2010/main" w="9525">
+                  <a14:hiddenLine xmlns:a14="http://schemas.microsoft.com/office/drawing/2010/main" xmlns="" w="9525">
                     <a:solidFill>
                       <a:srgbClr val="000000"/>
                     </a:solidFill>
@@ -11520,7 +11532,7 @@
               </a:ln>
               <a:extLst>
                 <a:ext uri="{91240B29-F687-4f45-9708-019B960494DF}">
-                  <a14:hiddenLine xmlns="" xmlns:a14="http://schemas.microsoft.com/office/drawing/2010/main" w="9525">
+                  <a14:hiddenLine xmlns:a14="http://schemas.microsoft.com/office/drawing/2010/main" xmlns="" w="9525">
                     <a:solidFill>
                       <a:srgbClr val="000000"/>
                     </a:solidFill>
@@ -11610,7 +11622,7 @@
               </a:ln>
               <a:extLst>
                 <a:ext uri="{91240B29-F687-4f45-9708-019B960494DF}">
-                  <a14:hiddenLine xmlns="" xmlns:a14="http://schemas.microsoft.com/office/drawing/2010/main" w="9525">
+                  <a14:hiddenLine xmlns:a14="http://schemas.microsoft.com/office/drawing/2010/main" xmlns="" w="9525">
                     <a:solidFill>
                       <a:srgbClr val="000000"/>
                     </a:solidFill>
@@ -11678,7 +11690,7 @@
               </a:ln>
               <a:extLst>
                 <a:ext uri="{91240B29-F687-4f45-9708-019B960494DF}">
-                  <a14:hiddenLine xmlns="" xmlns:a14="http://schemas.microsoft.com/office/drawing/2010/main" w="9525">
+                  <a14:hiddenLine xmlns:a14="http://schemas.microsoft.com/office/drawing/2010/main" xmlns="" w="9525">
                     <a:solidFill>
                       <a:srgbClr val="000000"/>
                     </a:solidFill>
@@ -11768,7 +11780,7 @@
               </a:ln>
               <a:extLst>
                 <a:ext uri="{91240B29-F687-4f45-9708-019B960494DF}">
-                  <a14:hiddenLine xmlns="" xmlns:a14="http://schemas.microsoft.com/office/drawing/2010/main" w="9525">
+                  <a14:hiddenLine xmlns:a14="http://schemas.microsoft.com/office/drawing/2010/main" xmlns="" w="9525">
                     <a:solidFill>
                       <a:srgbClr val="000000"/>
                     </a:solidFill>
@@ -11802,7 +11814,7 @@
               </a:ln>
               <a:extLst>
                 <a:ext uri="{91240B29-F687-4f45-9708-019B960494DF}">
-                  <a14:hiddenLine xmlns="" xmlns:a14="http://schemas.microsoft.com/office/drawing/2010/main" w="9525">
+                  <a14:hiddenLine xmlns:a14="http://schemas.microsoft.com/office/drawing/2010/main" xmlns="" w="9525">
                     <a:solidFill>
                       <a:srgbClr val="000000"/>
                     </a:solidFill>
@@ -11943,7 +11955,7 @@
             <a:fld id="{48A87A34-81AB-432B-8DAE-1953F412C126}" type="datetimeFigureOut">
               <a:rPr lang="en-US" dirty="0"/>
               <a:pPr/>
-              <a:t>4/26/2018</a:t>
+              <a:t>4/27/2018</a:t>
             </a:fld>
             <a:endParaRPr lang="en-US" dirty="0"/>
           </a:p>
@@ -12375,7 +12387,12 @@
             <p:ph type="ctrTitle"/>
           </p:nvPr>
         </p:nvSpPr>
-        <p:spPr/>
+        <p:spPr>
+          <a:xfrm>
+            <a:off x="1876423" y="1117600"/>
+            <a:ext cx="8791575" cy="2387600"/>
+          </a:xfrm>
+        </p:spPr>
         <p:txBody>
           <a:bodyPr/>
           <a:lstStyle/>
@@ -12410,13 +12427,8 @@
           <a:p>
             <a:r>
               <a:rPr lang="en-GB" dirty="0"/>
-              <a:t>By Fraser </a:t>
-            </a:r>
-            <a:r>
-              <a:rPr lang="en-GB" dirty="0" smtClean="0"/>
-              <a:t>Barker(1600196)</a:t>
-            </a:r>
-            <a:endParaRPr lang="en-GB" dirty="0"/>
+              <a:t>By Fraser Barker(1600196)</a:t>
+            </a:r>
           </a:p>
         </p:txBody>
       </p:sp>
@@ -12455,7 +12467,7 @@
           <p:cNvPr id="2" name="Title 1">
             <a:extLst>
               <a:ext uri="{FF2B5EF4-FFF2-40B4-BE49-F238E27FC236}">
-                <a16:creationId xmlns:a16="http://schemas.microsoft.com/office/drawing/2014/main" id="{F08D4311-F194-4C6E-8AB8-D46E7031A897}"/>
+                <a16:creationId xmlns:a16="http://schemas.microsoft.com/office/drawing/2014/main" id="{4DC6CCA2-6548-4388-9415-49961107B342}"/>
               </a:ext>
             </a:extLst>
           </p:cNvPr>
@@ -12473,35 +12485,126 @@
           <a:p>
             <a:r>
               <a:rPr lang="en-GB" dirty="0"/>
-              <a:t>Critical evaluation</a:t>
+              <a:t>Results – 640x480 – 5000 ITERATIONS</a:t>
             </a:r>
           </a:p>
         </p:txBody>
       </p:sp>
-      <p:sp>
-        <p:nvSpPr>
-          <p:cNvPr id="3" name="Content Placeholder 2">
+      <p:pic>
+        <p:nvPicPr>
+          <p:cNvPr id="3" name="Picture 2">
             <a:extLst>
               <a:ext uri="{FF2B5EF4-FFF2-40B4-BE49-F238E27FC236}">
-                <a16:creationId xmlns:a16="http://schemas.microsoft.com/office/drawing/2014/main" id="{4EC26013-34BE-4AED-8BD4-907A05590B5B}"/>
+                <a16:creationId xmlns:a16="http://schemas.microsoft.com/office/drawing/2014/main" id="{7710D451-59C2-4904-8665-7310BE91AAAB}"/>
               </a:ext>
             </a:extLst>
           </p:cNvPr>
-          <p:cNvSpPr>
-            <a:spLocks noGrp="1"/>
-          </p:cNvSpPr>
-          <p:nvPr>
-            <p:ph idx="1"/>
-          </p:nvPr>
+          <p:cNvPicPr>
+            <a:picLocks noChangeAspect="1"/>
+          </p:cNvPicPr>
+          <p:nvPr/>
+        </p:nvPicPr>
+        <p:blipFill>
+          <a:blip r:embed="rId2"/>
+          <a:stretch>
+            <a:fillRect/>
+          </a:stretch>
+        </p:blipFill>
+        <p:spPr>
+          <a:xfrm>
+            <a:off x="1141413" y="2097088"/>
+            <a:ext cx="4979534" cy="3531405"/>
+          </a:xfrm>
+          <a:prstGeom prst="rect">
+            <a:avLst/>
+          </a:prstGeom>
+        </p:spPr>
+      </p:pic>
+      <p:sp>
+        <p:nvSpPr>
+          <p:cNvPr id="6" name="TextBox 5">
+            <a:extLst>
+              <a:ext uri="{FF2B5EF4-FFF2-40B4-BE49-F238E27FC236}">
+                <a16:creationId xmlns:a16="http://schemas.microsoft.com/office/drawing/2014/main" id="{A059A357-4045-400B-AD12-D88C7FDEB417}"/>
+              </a:ext>
+            </a:extLst>
+          </p:cNvPr>
+          <p:cNvSpPr txBox="1"/>
+          <p:nvPr/>
         </p:nvSpPr>
-        <p:spPr/>
+        <p:spPr>
+          <a:xfrm>
+            <a:off x="6120947" y="2097088"/>
+            <a:ext cx="3256548" cy="2862322"/>
+          </a:xfrm>
+          <a:prstGeom prst="rect">
+            <a:avLst/>
+          </a:prstGeom>
+          <a:noFill/>
+        </p:spPr>
         <p:txBody>
-          <a:bodyPr/>
+          <a:bodyPr wrap="square" rtlCol="0">
+            <a:spAutoFit/>
+          </a:bodyPr>
           <a:lstStyle/>
           <a:p>
             <a:r>
               <a:rPr lang="en-GB" dirty="0"/>
-              <a:t>A critical evaluation of the effectiveness of your solution, with reference to your performance evaluation.</a:t>
+              <a:t>Data1 - Mean: 157.963036963</a:t>
+            </a:r>
+          </a:p>
+          <a:p>
+            <a:r>
+              <a:rPr lang="en-GB" dirty="0"/>
+              <a:t>Data1 - Median: 157.0</a:t>
+            </a:r>
+          </a:p>
+          <a:p>
+            <a:r>
+              <a:rPr lang="en-GB" dirty="0"/>
+              <a:t>Data2 - Mean: 151.51048951</a:t>
+            </a:r>
+          </a:p>
+          <a:p>
+            <a:r>
+              <a:rPr lang="en-GB" dirty="0"/>
+              <a:t>Data2 - Median: 151.0</a:t>
+            </a:r>
+          </a:p>
+          <a:p>
+            <a:r>
+              <a:rPr lang="en-GB" dirty="0"/>
+              <a:t>Data3 - Mean: 154.268731269</a:t>
+            </a:r>
+          </a:p>
+          <a:p>
+            <a:r>
+              <a:rPr lang="en-GB" dirty="0"/>
+              <a:t>Data3 - Median: 154.0</a:t>
+            </a:r>
+          </a:p>
+          <a:p>
+            <a:r>
+              <a:rPr lang="en-GB" dirty="0"/>
+              <a:t>Data4 - Mean: 156.754245754</a:t>
+            </a:r>
+          </a:p>
+          <a:p>
+            <a:r>
+              <a:rPr lang="en-GB" dirty="0"/>
+              <a:t>Data4 - Median: 157.0</a:t>
+            </a:r>
+          </a:p>
+          <a:p>
+            <a:r>
+              <a:rPr lang="en-GB" dirty="0"/>
+              <a:t>Data5 - Mean: 156.92007992</a:t>
+            </a:r>
+          </a:p>
+          <a:p>
+            <a:r>
+              <a:rPr lang="en-GB" dirty="0"/>
+              <a:t>Data5 - Median: 157.0</a:t>
             </a:r>
           </a:p>
         </p:txBody>
@@ -12509,7 +12612,7 @@
     </p:spTree>
     <p:extLst>
       <p:ext uri="{BB962C8B-B14F-4D97-AF65-F5344CB8AC3E}">
-        <p14:creationId xmlns:p14="http://schemas.microsoft.com/office/powerpoint/2010/main" val="3601078021"/>
+        <p14:creationId xmlns:p14="http://schemas.microsoft.com/office/powerpoint/2010/main" val="2137154390"/>
       </p:ext>
     </p:extLst>
   </p:cSld>
@@ -12541,7 +12644,7 @@
           <p:cNvPr id="2" name="Title 1">
             <a:extLst>
               <a:ext uri="{FF2B5EF4-FFF2-40B4-BE49-F238E27FC236}">
-                <a16:creationId xmlns:a16="http://schemas.microsoft.com/office/drawing/2014/main" id="{EBDBBD2B-AF5B-4F40-9703-4737906965A2}"/>
+                <a16:creationId xmlns:a16="http://schemas.microsoft.com/office/drawing/2014/main" id="{4DC6CCA2-6548-4388-9415-49961107B342}"/>
               </a:ext>
             </a:extLst>
           </p:cNvPr>
@@ -12559,35 +12662,126 @@
           <a:p>
             <a:r>
               <a:rPr lang="en-GB" dirty="0"/>
-              <a:t>Technical choices</a:t>
+              <a:t>Results – 960x768 – 500 ITERATIONS</a:t>
             </a:r>
           </a:p>
         </p:txBody>
       </p:sp>
-      <p:sp>
-        <p:nvSpPr>
-          <p:cNvPr id="3" name="Content Placeholder 2">
+      <p:pic>
+        <p:nvPicPr>
+          <p:cNvPr id="4" name="Picture 3">
             <a:extLst>
               <a:ext uri="{FF2B5EF4-FFF2-40B4-BE49-F238E27FC236}">
-                <a16:creationId xmlns:a16="http://schemas.microsoft.com/office/drawing/2014/main" id="{A6DFCE2A-8360-40B7-82C4-8546CEFCAF4D}"/>
+                <a16:creationId xmlns:a16="http://schemas.microsoft.com/office/drawing/2014/main" id="{3F86DA6F-5383-404D-82B1-231683C67188}"/>
               </a:ext>
             </a:extLst>
           </p:cNvPr>
-          <p:cNvSpPr>
-            <a:spLocks noGrp="1"/>
-          </p:cNvSpPr>
-          <p:nvPr>
-            <p:ph idx="1"/>
-          </p:nvPr>
+          <p:cNvPicPr>
+            <a:picLocks noChangeAspect="1"/>
+          </p:cNvPicPr>
+          <p:nvPr/>
+        </p:nvPicPr>
+        <p:blipFill>
+          <a:blip r:embed="rId2"/>
+          <a:stretch>
+            <a:fillRect/>
+          </a:stretch>
+        </p:blipFill>
+        <p:spPr>
+          <a:xfrm>
+            <a:off x="1141413" y="2097088"/>
+            <a:ext cx="4979534" cy="3531405"/>
+          </a:xfrm>
+          <a:prstGeom prst="rect">
+            <a:avLst/>
+          </a:prstGeom>
+        </p:spPr>
+      </p:pic>
+      <p:sp>
+        <p:nvSpPr>
+          <p:cNvPr id="5" name="TextBox 4">
+            <a:extLst>
+              <a:ext uri="{FF2B5EF4-FFF2-40B4-BE49-F238E27FC236}">
+                <a16:creationId xmlns:a16="http://schemas.microsoft.com/office/drawing/2014/main" id="{D4B655D6-29AA-4BE8-A257-CB3461E6A6B5}"/>
+              </a:ext>
+            </a:extLst>
+          </p:cNvPr>
+          <p:cNvSpPr txBox="1"/>
+          <p:nvPr/>
         </p:nvSpPr>
-        <p:spPr/>
+        <p:spPr>
+          <a:xfrm>
+            <a:off x="6120947" y="2097088"/>
+            <a:ext cx="3256548" cy="2862322"/>
+          </a:xfrm>
+          <a:prstGeom prst="rect">
+            <a:avLst/>
+          </a:prstGeom>
+          <a:noFill/>
+        </p:spPr>
         <p:txBody>
-          <a:bodyPr/>
+          <a:bodyPr wrap="square" rtlCol="0">
+            <a:spAutoFit/>
+          </a:bodyPr>
           <a:lstStyle/>
           <a:p>
             <a:r>
               <a:rPr lang="en-GB" dirty="0"/>
-              <a:t>You must explicitly justify your technical choices, and quantify their effect during performance evaluation, using the knowledge you’ve gained from undertaking the module.</a:t>
+              <a:t>Data1 - Mean: 42.6983016983</a:t>
+            </a:r>
+          </a:p>
+          <a:p>
+            <a:r>
+              <a:rPr lang="en-GB" dirty="0"/>
+              <a:t>Data1 - Median: 43.0</a:t>
+            </a:r>
+          </a:p>
+          <a:p>
+            <a:r>
+              <a:rPr lang="en-GB" dirty="0"/>
+              <a:t>Data2 - Mean: 41.4445554446</a:t>
+            </a:r>
+          </a:p>
+          <a:p>
+            <a:r>
+              <a:rPr lang="en-GB" dirty="0"/>
+              <a:t>Data2 - Median: 41.0</a:t>
+            </a:r>
+          </a:p>
+          <a:p>
+            <a:r>
+              <a:rPr lang="en-GB" dirty="0"/>
+              <a:t>Data3 - Mean: 41.9380619381</a:t>
+            </a:r>
+          </a:p>
+          <a:p>
+            <a:r>
+              <a:rPr lang="en-GB" dirty="0"/>
+              <a:t>Data3 - Median: 42.0</a:t>
+            </a:r>
+          </a:p>
+          <a:p>
+            <a:r>
+              <a:rPr lang="en-GB" dirty="0"/>
+              <a:t>Data4 - Mean: 42.2747252747</a:t>
+            </a:r>
+          </a:p>
+          <a:p>
+            <a:r>
+              <a:rPr lang="en-GB" dirty="0"/>
+              <a:t>Data4 - Median: 42.0</a:t>
+            </a:r>
+          </a:p>
+          <a:p>
+            <a:r>
+              <a:rPr lang="en-GB" dirty="0"/>
+              <a:t>Data5 - Mean: 42.4185814186</a:t>
+            </a:r>
+          </a:p>
+          <a:p>
+            <a:r>
+              <a:rPr lang="en-GB" dirty="0"/>
+              <a:t>Data5 - Median: 42.0</a:t>
             </a:r>
           </a:p>
         </p:txBody>
@@ -12595,7 +12789,7 @@
     </p:spTree>
     <p:extLst>
       <p:ext uri="{BB962C8B-B14F-4D97-AF65-F5344CB8AC3E}">
-        <p14:creationId xmlns:p14="http://schemas.microsoft.com/office/powerpoint/2010/main" val="674413947"/>
+        <p14:creationId xmlns:p14="http://schemas.microsoft.com/office/powerpoint/2010/main" val="4112242897"/>
       </p:ext>
     </p:extLst>
   </p:cSld>
@@ -12624,7 +12818,13 @@
       </p:grpSpPr>
       <p:sp>
         <p:nvSpPr>
-          <p:cNvPr id="2" name="Title 1"/>
+          <p:cNvPr id="2" name="Title 1">
+            <a:extLst>
+              <a:ext uri="{FF2B5EF4-FFF2-40B4-BE49-F238E27FC236}">
+                <a16:creationId xmlns:a16="http://schemas.microsoft.com/office/drawing/2014/main" id="{4DC6CCA2-6548-4388-9415-49961107B342}"/>
+              </a:ext>
+            </a:extLst>
+          </p:cNvPr>
           <p:cNvSpPr>
             <a:spLocks noGrp="1"/>
           </p:cNvSpPr>
@@ -12638,21 +12838,175 @@
           <a:lstStyle/>
           <a:p>
             <a:r>
-              <a:rPr lang="en-GB" dirty="0" smtClean="0"/>
-              <a:t>Resources</a:t>
-            </a:r>
-            <a:endParaRPr lang="en-GB" dirty="0"/>
+              <a:rPr lang="en-GB" dirty="0"/>
+              <a:t>Results – 960x768 – 2500 ITERATIONS</a:t>
+            </a:r>
           </a:p>
         </p:txBody>
       </p:sp>
       <p:sp>
         <p:nvSpPr>
-          <p:cNvPr id="3" name="Content Placeholder 2"/>
+          <p:cNvPr id="4" name="TextBox 3">
+            <a:extLst>
+              <a:ext uri="{FF2B5EF4-FFF2-40B4-BE49-F238E27FC236}">
+                <a16:creationId xmlns:a16="http://schemas.microsoft.com/office/drawing/2014/main" id="{A2D99CCD-411D-49B4-A240-7C7BAA969EF1}"/>
+              </a:ext>
+            </a:extLst>
+          </p:cNvPr>
+          <p:cNvSpPr txBox="1"/>
+          <p:nvPr/>
+        </p:nvSpPr>
+        <p:spPr>
+          <a:xfrm>
+            <a:off x="6120947" y="2097088"/>
+            <a:ext cx="3256548" cy="2862322"/>
+          </a:xfrm>
+          <a:prstGeom prst="rect">
+            <a:avLst/>
+          </a:prstGeom>
+          <a:noFill/>
+        </p:spPr>
+        <p:txBody>
+          <a:bodyPr wrap="square" rtlCol="0">
+            <a:spAutoFit/>
+          </a:bodyPr>
+          <a:lstStyle/>
+          <a:p>
+            <a:r>
+              <a:rPr lang="en-GB" dirty="0"/>
+              <a:t>Data1 - Mean: 187.566433566</a:t>
+            </a:r>
+          </a:p>
+          <a:p>
+            <a:r>
+              <a:rPr lang="en-GB" dirty="0"/>
+              <a:t>Data1 - Median: 187.0</a:t>
+            </a:r>
+          </a:p>
+          <a:p>
+            <a:r>
+              <a:rPr lang="en-GB" dirty="0"/>
+              <a:t>Data2 - Mean: 182.123876124</a:t>
+            </a:r>
+          </a:p>
+          <a:p>
+            <a:r>
+              <a:rPr lang="en-GB" dirty="0"/>
+              <a:t>Data2 - Median: 182.0</a:t>
+            </a:r>
+          </a:p>
+          <a:p>
+            <a:r>
+              <a:rPr lang="en-GB" dirty="0"/>
+              <a:t>Data3 - Mean: 184.236763237</a:t>
+            </a:r>
+          </a:p>
+          <a:p>
+            <a:r>
+              <a:rPr lang="en-GB" dirty="0"/>
+              <a:t>Data3 - Median: 184.0</a:t>
+            </a:r>
+          </a:p>
+          <a:p>
+            <a:r>
+              <a:rPr lang="en-GB" dirty="0"/>
+              <a:t>Data4 - Mean: 186.776223776</a:t>
+            </a:r>
+          </a:p>
+          <a:p>
+            <a:r>
+              <a:rPr lang="en-GB" dirty="0"/>
+              <a:t>Data4 - Median: 187.0</a:t>
+            </a:r>
+          </a:p>
+          <a:p>
+            <a:r>
+              <a:rPr lang="en-GB" dirty="0"/>
+              <a:t>Data5 - Mean: 186.97002997</a:t>
+            </a:r>
+          </a:p>
+          <a:p>
+            <a:r>
+              <a:rPr lang="en-GB" dirty="0"/>
+              <a:t>Data5 - Median: 187.0</a:t>
+            </a:r>
+          </a:p>
+        </p:txBody>
+      </p:sp>
+      <p:pic>
+        <p:nvPicPr>
+          <p:cNvPr id="5" name="Picture 4">
+            <a:extLst>
+              <a:ext uri="{FF2B5EF4-FFF2-40B4-BE49-F238E27FC236}">
+                <a16:creationId xmlns:a16="http://schemas.microsoft.com/office/drawing/2014/main" id="{8E1160FA-3544-4AB0-960B-2AB554C165C0}"/>
+              </a:ext>
+            </a:extLst>
+          </p:cNvPr>
+          <p:cNvPicPr>
+            <a:picLocks noChangeAspect="1"/>
+          </p:cNvPicPr>
+          <p:nvPr/>
+        </p:nvPicPr>
+        <p:blipFill>
+          <a:blip r:embed="rId2"/>
+          <a:stretch>
+            <a:fillRect/>
+          </a:stretch>
+        </p:blipFill>
+        <p:spPr>
+          <a:xfrm>
+            <a:off x="1141413" y="2097088"/>
+            <a:ext cx="4979534" cy="3531405"/>
+          </a:xfrm>
+          <a:prstGeom prst="rect">
+            <a:avLst/>
+          </a:prstGeom>
+        </p:spPr>
+      </p:pic>
+    </p:spTree>
+    <p:extLst>
+      <p:ext uri="{BB962C8B-B14F-4D97-AF65-F5344CB8AC3E}">
+        <p14:creationId xmlns:p14="http://schemas.microsoft.com/office/powerpoint/2010/main" val="397118766"/>
+      </p:ext>
+    </p:extLst>
+  </p:cSld>
+  <p:clrMapOvr>
+    <a:masterClrMapping/>
+  </p:clrMapOvr>
+</p:sld>
+</file>
+
+<file path=ppt/slides/slide13.xml><?xml version="1.0" encoding="utf-8"?>
+<p:sld xmlns:a="http://schemas.openxmlformats.org/drawingml/2006/main" xmlns:r="http://schemas.openxmlformats.org/officeDocument/2006/relationships" xmlns:p="http://schemas.openxmlformats.org/presentationml/2006/main">
+  <p:cSld>
+    <p:spTree>
+      <p:nvGrpSpPr>
+        <p:cNvPr id="1" name=""/>
+        <p:cNvGrpSpPr/>
+        <p:nvPr/>
+      </p:nvGrpSpPr>
+      <p:grpSpPr>
+        <a:xfrm>
+          <a:off x="0" y="0"/>
+          <a:ext cx="0" cy="0"/>
+          <a:chOff x="0" y="0"/>
+          <a:chExt cx="0" cy="0"/>
+        </a:xfrm>
+      </p:grpSpPr>
+      <p:sp>
+        <p:nvSpPr>
+          <p:cNvPr id="2" name="Title 1">
+            <a:extLst>
+              <a:ext uri="{FF2B5EF4-FFF2-40B4-BE49-F238E27FC236}">
+                <a16:creationId xmlns:a16="http://schemas.microsoft.com/office/drawing/2014/main" id="{4DC6CCA2-6548-4388-9415-49961107B342}"/>
+              </a:ext>
+            </a:extLst>
+          </p:cNvPr>
           <p:cNvSpPr>
             <a:spLocks noGrp="1"/>
           </p:cNvSpPr>
           <p:nvPr>
-            <p:ph idx="1"/>
+            <p:ph type="title"/>
           </p:nvPr>
         </p:nvSpPr>
         <p:spPr/>
@@ -12661,37 +13015,1197 @@
           <a:lstStyle/>
           <a:p>
             <a:r>
-              <a:rPr lang="en-GB" dirty="0" err="1" smtClean="0"/>
-              <a:t>SciPy</a:t>
-            </a:r>
-            <a:r>
-              <a:rPr lang="en-GB" dirty="0" smtClean="0"/>
-              <a:t> – Statistics calculations, graphical representations.</a:t>
-            </a:r>
-          </a:p>
-          <a:p>
-            <a:r>
-              <a:rPr lang="en-GB" dirty="0" smtClean="0"/>
-              <a:t>Adam Sampson/Ruth Falconer – Lab project which this submission is based off of.</a:t>
-            </a:r>
-          </a:p>
-          <a:p>
-            <a:r>
-              <a:rPr lang="en-GB" dirty="0"/>
-              <a:t>Paul </a:t>
-            </a:r>
-            <a:r>
-              <a:rPr lang="en-GB" dirty="0" smtClean="0"/>
-              <a:t>Robertson – OpenGL base project</a:t>
-            </a:r>
-            <a:endParaRPr lang="en-GB" dirty="0"/>
+              <a:rPr lang="en-GB" dirty="0"/>
+              <a:t>Results – 960x768 – 5000 ITERATIONS</a:t>
+            </a:r>
           </a:p>
         </p:txBody>
       </p:sp>
+      <p:sp>
+        <p:nvSpPr>
+          <p:cNvPr id="4" name="TextBox 3">
+            <a:extLst>
+              <a:ext uri="{FF2B5EF4-FFF2-40B4-BE49-F238E27FC236}">
+                <a16:creationId xmlns:a16="http://schemas.microsoft.com/office/drawing/2014/main" id="{27E75B97-4AAE-4DC6-8567-8FFC00595AEC}"/>
+              </a:ext>
+            </a:extLst>
+          </p:cNvPr>
+          <p:cNvSpPr txBox="1"/>
+          <p:nvPr/>
+        </p:nvSpPr>
+        <p:spPr>
+          <a:xfrm>
+            <a:off x="6120947" y="2097088"/>
+            <a:ext cx="3256548" cy="2862322"/>
+          </a:xfrm>
+          <a:prstGeom prst="rect">
+            <a:avLst/>
+          </a:prstGeom>
+          <a:noFill/>
+        </p:spPr>
+        <p:txBody>
+          <a:bodyPr wrap="square" rtlCol="0">
+            <a:spAutoFit/>
+          </a:bodyPr>
+          <a:lstStyle/>
+          <a:p>
+            <a:r>
+              <a:rPr lang="en-GB" dirty="0"/>
+              <a:t>Data1 - Mean: 368.331668332</a:t>
+            </a:r>
+          </a:p>
+          <a:p>
+            <a:r>
+              <a:rPr lang="en-GB" dirty="0"/>
+              <a:t>Data1 - Median: 368.0</a:t>
+            </a:r>
+          </a:p>
+          <a:p>
+            <a:r>
+              <a:rPr lang="en-GB" dirty="0"/>
+              <a:t>Data2 - Mean: 358.282717283</a:t>
+            </a:r>
+          </a:p>
+          <a:p>
+            <a:r>
+              <a:rPr lang="en-GB" dirty="0"/>
+              <a:t>Data2 - Median: 358.0</a:t>
+            </a:r>
+          </a:p>
+          <a:p>
+            <a:r>
+              <a:rPr lang="en-GB" dirty="0"/>
+              <a:t>Data3 - Mean: 362.982017982</a:t>
+            </a:r>
+          </a:p>
+          <a:p>
+            <a:r>
+              <a:rPr lang="en-GB" dirty="0"/>
+              <a:t>Data3 - Median: 363.0</a:t>
+            </a:r>
+          </a:p>
+          <a:p>
+            <a:r>
+              <a:rPr lang="en-GB" dirty="0"/>
+              <a:t>Data4 - Mean: 366.833166833</a:t>
+            </a:r>
+          </a:p>
+          <a:p>
+            <a:r>
+              <a:rPr lang="en-GB" dirty="0"/>
+              <a:t>Data4 - Median: 366.0</a:t>
+            </a:r>
+          </a:p>
+          <a:p>
+            <a:r>
+              <a:rPr lang="en-GB" dirty="0"/>
+              <a:t>Data5 - Mean: 366.839160839</a:t>
+            </a:r>
+          </a:p>
+          <a:p>
+            <a:r>
+              <a:rPr lang="en-GB" dirty="0"/>
+              <a:t>Data5 - Median: 367.0</a:t>
+            </a:r>
+          </a:p>
+        </p:txBody>
+      </p:sp>
+      <p:pic>
+        <p:nvPicPr>
+          <p:cNvPr id="5" name="Picture 4">
+            <a:extLst>
+              <a:ext uri="{FF2B5EF4-FFF2-40B4-BE49-F238E27FC236}">
+                <a16:creationId xmlns:a16="http://schemas.microsoft.com/office/drawing/2014/main" id="{84A792C5-81C7-4B21-91FD-8451743BD754}"/>
+              </a:ext>
+            </a:extLst>
+          </p:cNvPr>
+          <p:cNvPicPr>
+            <a:picLocks noChangeAspect="1"/>
+          </p:cNvPicPr>
+          <p:nvPr/>
+        </p:nvPicPr>
+        <p:blipFill>
+          <a:blip r:embed="rId2"/>
+          <a:stretch>
+            <a:fillRect/>
+          </a:stretch>
+        </p:blipFill>
+        <p:spPr>
+          <a:xfrm>
+            <a:off x="1141413" y="2097088"/>
+            <a:ext cx="4979534" cy="3531405"/>
+          </a:xfrm>
+          <a:prstGeom prst="rect">
+            <a:avLst/>
+          </a:prstGeom>
+        </p:spPr>
+      </p:pic>
     </p:spTree>
     <p:extLst>
       <p:ext uri="{BB962C8B-B14F-4D97-AF65-F5344CB8AC3E}">
-        <p14:creationId xmlns:p14="http://schemas.microsoft.com/office/powerpoint/2010/main" val="1745421668"/>
+        <p14:creationId xmlns:p14="http://schemas.microsoft.com/office/powerpoint/2010/main" val="2218792065"/>
+      </p:ext>
+    </p:extLst>
+  </p:cSld>
+  <p:clrMapOvr>
+    <a:masterClrMapping/>
+  </p:clrMapOvr>
+</p:sld>
+</file>
+
+<file path=ppt/slides/slide14.xml><?xml version="1.0" encoding="utf-8"?>
+<p:sld xmlns:a="http://schemas.openxmlformats.org/drawingml/2006/main" xmlns:r="http://schemas.openxmlformats.org/officeDocument/2006/relationships" xmlns:p="http://schemas.openxmlformats.org/presentationml/2006/main">
+  <p:cSld>
+    <p:spTree>
+      <p:nvGrpSpPr>
+        <p:cNvPr id="1" name=""/>
+        <p:cNvGrpSpPr/>
+        <p:nvPr/>
+      </p:nvGrpSpPr>
+      <p:grpSpPr>
+        <a:xfrm>
+          <a:off x="0" y="0"/>
+          <a:ext cx="0" cy="0"/>
+          <a:chOff x="0" y="0"/>
+          <a:chExt cx="0" cy="0"/>
+        </a:xfrm>
+      </p:grpSpPr>
+      <p:sp>
+        <p:nvSpPr>
+          <p:cNvPr id="2" name="Title 1">
+            <a:extLst>
+              <a:ext uri="{FF2B5EF4-FFF2-40B4-BE49-F238E27FC236}">
+                <a16:creationId xmlns:a16="http://schemas.microsoft.com/office/drawing/2014/main" id="{4DC6CCA2-6548-4388-9415-49961107B342}"/>
+              </a:ext>
+            </a:extLst>
+          </p:cNvPr>
+          <p:cNvSpPr>
+            <a:spLocks noGrp="1"/>
+          </p:cNvSpPr>
+          <p:nvPr>
+            <p:ph type="title"/>
+          </p:nvPr>
+        </p:nvSpPr>
+        <p:spPr/>
+        <p:txBody>
+          <a:bodyPr/>
+          <a:lstStyle/>
+          <a:p>
+            <a:r>
+              <a:rPr lang="en-GB" dirty="0"/>
+              <a:t>Results – 1280x960 – 500 ITERATIONS</a:t>
+            </a:r>
+          </a:p>
+        </p:txBody>
+      </p:sp>
+      <p:sp>
+        <p:nvSpPr>
+          <p:cNvPr id="4" name="TextBox 3">
+            <a:extLst>
+              <a:ext uri="{FF2B5EF4-FFF2-40B4-BE49-F238E27FC236}">
+                <a16:creationId xmlns:a16="http://schemas.microsoft.com/office/drawing/2014/main" id="{3058380A-F169-4DF5-812E-72544885AC42}"/>
+              </a:ext>
+            </a:extLst>
+          </p:cNvPr>
+          <p:cNvSpPr txBox="1"/>
+          <p:nvPr/>
+        </p:nvSpPr>
+        <p:spPr>
+          <a:xfrm>
+            <a:off x="6120947" y="2097088"/>
+            <a:ext cx="3256548" cy="2862322"/>
+          </a:xfrm>
+          <a:prstGeom prst="rect">
+            <a:avLst/>
+          </a:prstGeom>
+          <a:noFill/>
+        </p:spPr>
+        <p:txBody>
+          <a:bodyPr wrap="square" rtlCol="0">
+            <a:spAutoFit/>
+          </a:bodyPr>
+          <a:lstStyle/>
+          <a:p>
+            <a:r>
+              <a:rPr lang="en-GB" dirty="0"/>
+              <a:t>Data1 - Mean: 70.2417582418</a:t>
+            </a:r>
+          </a:p>
+          <a:p>
+            <a:r>
+              <a:rPr lang="en-GB" dirty="0"/>
+              <a:t>Data1 - Median: 70.0</a:t>
+            </a:r>
+          </a:p>
+          <a:p>
+            <a:r>
+              <a:rPr lang="en-GB" dirty="0"/>
+              <a:t>Data2 - Mean: 68.8521478521</a:t>
+            </a:r>
+          </a:p>
+          <a:p>
+            <a:r>
+              <a:rPr lang="en-GB" dirty="0"/>
+              <a:t>Data2 - Median: 68.0</a:t>
+            </a:r>
+          </a:p>
+          <a:p>
+            <a:r>
+              <a:rPr lang="en-GB" dirty="0"/>
+              <a:t>Data3 - Mean: 69.4185814186</a:t>
+            </a:r>
+          </a:p>
+          <a:p>
+            <a:r>
+              <a:rPr lang="en-GB" dirty="0"/>
+              <a:t>Data3 - Median: 69.0</a:t>
+            </a:r>
+          </a:p>
+          <a:p>
+            <a:r>
+              <a:rPr lang="en-GB" dirty="0"/>
+              <a:t>Data4 - Mean: 69.8181818182</a:t>
+            </a:r>
+          </a:p>
+          <a:p>
+            <a:r>
+              <a:rPr lang="en-GB" dirty="0"/>
+              <a:t>Data4 - Median: 69.0</a:t>
+            </a:r>
+          </a:p>
+          <a:p>
+            <a:r>
+              <a:rPr lang="en-GB" dirty="0"/>
+              <a:t>Data5 - Mean: 70.2057942058</a:t>
+            </a:r>
+          </a:p>
+          <a:p>
+            <a:r>
+              <a:rPr lang="en-GB" dirty="0"/>
+              <a:t>Data5 - Median: 70.0</a:t>
+            </a:r>
+          </a:p>
+        </p:txBody>
+      </p:sp>
+      <p:pic>
+        <p:nvPicPr>
+          <p:cNvPr id="5" name="Picture 4">
+            <a:extLst>
+              <a:ext uri="{FF2B5EF4-FFF2-40B4-BE49-F238E27FC236}">
+                <a16:creationId xmlns:a16="http://schemas.microsoft.com/office/drawing/2014/main" id="{9978149F-FB48-4881-8252-514B6B7711A8}"/>
+              </a:ext>
+            </a:extLst>
+          </p:cNvPr>
+          <p:cNvPicPr>
+            <a:picLocks noChangeAspect="1"/>
+          </p:cNvPicPr>
+          <p:nvPr/>
+        </p:nvPicPr>
+        <p:blipFill>
+          <a:blip r:embed="rId2"/>
+          <a:stretch>
+            <a:fillRect/>
+          </a:stretch>
+        </p:blipFill>
+        <p:spPr>
+          <a:xfrm>
+            <a:off x="1141413" y="2097088"/>
+            <a:ext cx="4979534" cy="3531405"/>
+          </a:xfrm>
+          <a:prstGeom prst="rect">
+            <a:avLst/>
+          </a:prstGeom>
+        </p:spPr>
+      </p:pic>
+    </p:spTree>
+    <p:extLst>
+      <p:ext uri="{BB962C8B-B14F-4D97-AF65-F5344CB8AC3E}">
+        <p14:creationId xmlns:p14="http://schemas.microsoft.com/office/powerpoint/2010/main" val="1050706978"/>
+      </p:ext>
+    </p:extLst>
+  </p:cSld>
+  <p:clrMapOvr>
+    <a:masterClrMapping/>
+  </p:clrMapOvr>
+</p:sld>
+</file>
+
+<file path=ppt/slides/slide15.xml><?xml version="1.0" encoding="utf-8"?>
+<p:sld xmlns:a="http://schemas.openxmlformats.org/drawingml/2006/main" xmlns:r="http://schemas.openxmlformats.org/officeDocument/2006/relationships" xmlns:p="http://schemas.openxmlformats.org/presentationml/2006/main">
+  <p:cSld>
+    <p:spTree>
+      <p:nvGrpSpPr>
+        <p:cNvPr id="1" name=""/>
+        <p:cNvGrpSpPr/>
+        <p:nvPr/>
+      </p:nvGrpSpPr>
+      <p:grpSpPr>
+        <a:xfrm>
+          <a:off x="0" y="0"/>
+          <a:ext cx="0" cy="0"/>
+          <a:chOff x="0" y="0"/>
+          <a:chExt cx="0" cy="0"/>
+        </a:xfrm>
+      </p:grpSpPr>
+      <p:sp>
+        <p:nvSpPr>
+          <p:cNvPr id="2" name="Title 1">
+            <a:extLst>
+              <a:ext uri="{FF2B5EF4-FFF2-40B4-BE49-F238E27FC236}">
+                <a16:creationId xmlns:a16="http://schemas.microsoft.com/office/drawing/2014/main" id="{4DC6CCA2-6548-4388-9415-49961107B342}"/>
+              </a:ext>
+            </a:extLst>
+          </p:cNvPr>
+          <p:cNvSpPr>
+            <a:spLocks noGrp="1"/>
+          </p:cNvSpPr>
+          <p:nvPr>
+            <p:ph type="title"/>
+          </p:nvPr>
+        </p:nvSpPr>
+        <p:spPr/>
+        <p:txBody>
+          <a:bodyPr/>
+          <a:lstStyle/>
+          <a:p>
+            <a:r>
+              <a:rPr lang="en-GB" dirty="0"/>
+              <a:t>Results – 1280x960 – 2500 ITERATIONS</a:t>
+            </a:r>
+          </a:p>
+        </p:txBody>
+      </p:sp>
+      <p:sp>
+        <p:nvSpPr>
+          <p:cNvPr id="4" name="TextBox 3">
+            <a:extLst>
+              <a:ext uri="{FF2B5EF4-FFF2-40B4-BE49-F238E27FC236}">
+                <a16:creationId xmlns:a16="http://schemas.microsoft.com/office/drawing/2014/main" id="{983645C5-19CA-4160-B6A1-FF4D440FAE6B}"/>
+              </a:ext>
+            </a:extLst>
+          </p:cNvPr>
+          <p:cNvSpPr txBox="1"/>
+          <p:nvPr/>
+        </p:nvSpPr>
+        <p:spPr>
+          <a:xfrm>
+            <a:off x="6120947" y="2097088"/>
+            <a:ext cx="3256548" cy="2862322"/>
+          </a:xfrm>
+          <a:prstGeom prst="rect">
+            <a:avLst/>
+          </a:prstGeom>
+          <a:noFill/>
+        </p:spPr>
+        <p:txBody>
+          <a:bodyPr wrap="square" rtlCol="0">
+            <a:spAutoFit/>
+          </a:bodyPr>
+          <a:lstStyle/>
+          <a:p>
+            <a:r>
+              <a:rPr lang="en-GB" dirty="0"/>
+              <a:t>Data1 - Mean: 308.418581419</a:t>
+            </a:r>
+          </a:p>
+          <a:p>
+            <a:r>
+              <a:rPr lang="en-GB" dirty="0"/>
+              <a:t>Data1 - Median: 308.0</a:t>
+            </a:r>
+          </a:p>
+          <a:p>
+            <a:r>
+              <a:rPr lang="en-GB" dirty="0"/>
+              <a:t>Data2 - Mean: 301.057942058</a:t>
+            </a:r>
+          </a:p>
+          <a:p>
+            <a:r>
+              <a:rPr lang="en-GB" dirty="0"/>
+              <a:t>Data2 - Median: 301.0</a:t>
+            </a:r>
+          </a:p>
+          <a:p>
+            <a:r>
+              <a:rPr lang="en-GB" dirty="0"/>
+              <a:t>Data3 - Mean: 304.186813187</a:t>
+            </a:r>
+          </a:p>
+          <a:p>
+            <a:r>
+              <a:rPr lang="en-GB" dirty="0"/>
+              <a:t>Data3 - Median: 304.0</a:t>
+            </a:r>
+          </a:p>
+          <a:p>
+            <a:r>
+              <a:rPr lang="en-GB" dirty="0"/>
+              <a:t>Data4 - Mean: 307.411588412</a:t>
+            </a:r>
+          </a:p>
+          <a:p>
+            <a:r>
+              <a:rPr lang="en-GB" dirty="0"/>
+              <a:t>Data4 - Median: 307.0</a:t>
+            </a:r>
+          </a:p>
+          <a:p>
+            <a:r>
+              <a:rPr lang="en-GB" dirty="0"/>
+              <a:t>Data5 - Mean: 307.253746254</a:t>
+            </a:r>
+          </a:p>
+          <a:p>
+            <a:r>
+              <a:rPr lang="en-GB" dirty="0"/>
+              <a:t>Data5 - Median: 307.0</a:t>
+            </a:r>
+          </a:p>
+        </p:txBody>
+      </p:sp>
+      <p:pic>
+        <p:nvPicPr>
+          <p:cNvPr id="5" name="Picture 4">
+            <a:extLst>
+              <a:ext uri="{FF2B5EF4-FFF2-40B4-BE49-F238E27FC236}">
+                <a16:creationId xmlns:a16="http://schemas.microsoft.com/office/drawing/2014/main" id="{1884C921-C84B-41BA-AC5A-D9A69823F476}"/>
+              </a:ext>
+            </a:extLst>
+          </p:cNvPr>
+          <p:cNvPicPr>
+            <a:picLocks noChangeAspect="1"/>
+          </p:cNvPicPr>
+          <p:nvPr/>
+        </p:nvPicPr>
+        <p:blipFill>
+          <a:blip r:embed="rId2"/>
+          <a:stretch>
+            <a:fillRect/>
+          </a:stretch>
+        </p:blipFill>
+        <p:spPr>
+          <a:xfrm>
+            <a:off x="1141413" y="2097088"/>
+            <a:ext cx="4979534" cy="3531405"/>
+          </a:xfrm>
+          <a:prstGeom prst="rect">
+            <a:avLst/>
+          </a:prstGeom>
+        </p:spPr>
+      </p:pic>
+    </p:spTree>
+    <p:extLst>
+      <p:ext uri="{BB962C8B-B14F-4D97-AF65-F5344CB8AC3E}">
+        <p14:creationId xmlns:p14="http://schemas.microsoft.com/office/powerpoint/2010/main" val="3857603860"/>
+      </p:ext>
+    </p:extLst>
+  </p:cSld>
+  <p:clrMapOvr>
+    <a:masterClrMapping/>
+  </p:clrMapOvr>
+</p:sld>
+</file>
+
+<file path=ppt/slides/slide16.xml><?xml version="1.0" encoding="utf-8"?>
+<p:sld xmlns:a="http://schemas.openxmlformats.org/drawingml/2006/main" xmlns:r="http://schemas.openxmlformats.org/officeDocument/2006/relationships" xmlns:p="http://schemas.openxmlformats.org/presentationml/2006/main">
+  <p:cSld>
+    <p:spTree>
+      <p:nvGrpSpPr>
+        <p:cNvPr id="1" name=""/>
+        <p:cNvGrpSpPr/>
+        <p:nvPr/>
+      </p:nvGrpSpPr>
+      <p:grpSpPr>
+        <a:xfrm>
+          <a:off x="0" y="0"/>
+          <a:ext cx="0" cy="0"/>
+          <a:chOff x="0" y="0"/>
+          <a:chExt cx="0" cy="0"/>
+        </a:xfrm>
+      </p:grpSpPr>
+      <p:sp>
+        <p:nvSpPr>
+          <p:cNvPr id="2" name="Title 1">
+            <a:extLst>
+              <a:ext uri="{FF2B5EF4-FFF2-40B4-BE49-F238E27FC236}">
+                <a16:creationId xmlns:a16="http://schemas.microsoft.com/office/drawing/2014/main" id="{4DC6CCA2-6548-4388-9415-49961107B342}"/>
+              </a:ext>
+            </a:extLst>
+          </p:cNvPr>
+          <p:cNvSpPr>
+            <a:spLocks noGrp="1"/>
+          </p:cNvSpPr>
+          <p:nvPr>
+            <p:ph type="title"/>
+          </p:nvPr>
+        </p:nvSpPr>
+        <p:spPr/>
+        <p:txBody>
+          <a:bodyPr/>
+          <a:lstStyle/>
+          <a:p>
+            <a:r>
+              <a:rPr lang="en-GB" dirty="0"/>
+              <a:t>Results – 1280x960 – 5000 ITERATIONS</a:t>
+            </a:r>
+          </a:p>
+        </p:txBody>
+      </p:sp>
+      <p:sp>
+        <p:nvSpPr>
+          <p:cNvPr id="4" name="TextBox 3">
+            <a:extLst>
+              <a:ext uri="{FF2B5EF4-FFF2-40B4-BE49-F238E27FC236}">
+                <a16:creationId xmlns:a16="http://schemas.microsoft.com/office/drawing/2014/main" id="{DF99D3EA-F0B7-4F4F-B35B-9687EF6F3441}"/>
+              </a:ext>
+            </a:extLst>
+          </p:cNvPr>
+          <p:cNvSpPr txBox="1"/>
+          <p:nvPr/>
+        </p:nvSpPr>
+        <p:spPr>
+          <a:xfrm>
+            <a:off x="6120947" y="2097088"/>
+            <a:ext cx="3256548" cy="2862322"/>
+          </a:xfrm>
+          <a:prstGeom prst="rect">
+            <a:avLst/>
+          </a:prstGeom>
+          <a:noFill/>
+        </p:spPr>
+        <p:txBody>
+          <a:bodyPr wrap="square" rtlCol="0">
+            <a:spAutoFit/>
+          </a:bodyPr>
+          <a:lstStyle/>
+          <a:p>
+            <a:r>
+              <a:rPr lang="en-GB" dirty="0"/>
+              <a:t>Data1 - Mean: 603.978021978</a:t>
+            </a:r>
+          </a:p>
+          <a:p>
+            <a:r>
+              <a:rPr lang="en-GB" dirty="0"/>
+              <a:t>Data1 - Median: 604.0</a:t>
+            </a:r>
+          </a:p>
+          <a:p>
+            <a:r>
+              <a:rPr lang="en-GB" dirty="0"/>
+              <a:t>Data2 - Mean: 590.294705295</a:t>
+            </a:r>
+          </a:p>
+          <a:p>
+            <a:r>
+              <a:rPr lang="en-GB" dirty="0"/>
+              <a:t>Data2 - Median: 590.0</a:t>
+            </a:r>
+          </a:p>
+          <a:p>
+            <a:r>
+              <a:rPr lang="en-GB" dirty="0"/>
+              <a:t>Data3 - Mean: 596.665334665</a:t>
+            </a:r>
+          </a:p>
+          <a:p>
+            <a:r>
+              <a:rPr lang="en-GB" dirty="0"/>
+              <a:t>Data3 - Median: 596.0</a:t>
+            </a:r>
+          </a:p>
+          <a:p>
+            <a:r>
+              <a:rPr lang="en-GB" dirty="0"/>
+              <a:t>Data4 - Mean: 602.69030969</a:t>
+            </a:r>
+          </a:p>
+          <a:p>
+            <a:r>
+              <a:rPr lang="en-GB" dirty="0"/>
+              <a:t>Data4 - Median: 602.0</a:t>
+            </a:r>
+          </a:p>
+          <a:p>
+            <a:r>
+              <a:rPr lang="en-GB" dirty="0"/>
+              <a:t>Data5 - Mean: 602.886113886</a:t>
+            </a:r>
+          </a:p>
+          <a:p>
+            <a:r>
+              <a:rPr lang="en-GB" dirty="0"/>
+              <a:t>Data5 - Median: 603.0</a:t>
+            </a:r>
+          </a:p>
+        </p:txBody>
+      </p:sp>
+      <p:pic>
+        <p:nvPicPr>
+          <p:cNvPr id="5" name="Picture 4">
+            <a:extLst>
+              <a:ext uri="{FF2B5EF4-FFF2-40B4-BE49-F238E27FC236}">
+                <a16:creationId xmlns:a16="http://schemas.microsoft.com/office/drawing/2014/main" id="{AB616EFF-ACCE-46BB-8E2D-0AF4BEB43817}"/>
+              </a:ext>
+            </a:extLst>
+          </p:cNvPr>
+          <p:cNvPicPr>
+            <a:picLocks noChangeAspect="1"/>
+          </p:cNvPicPr>
+          <p:nvPr/>
+        </p:nvPicPr>
+        <p:blipFill>
+          <a:blip r:embed="rId2"/>
+          <a:stretch>
+            <a:fillRect/>
+          </a:stretch>
+        </p:blipFill>
+        <p:spPr>
+          <a:xfrm>
+            <a:off x="1141413" y="2097088"/>
+            <a:ext cx="4979534" cy="3531405"/>
+          </a:xfrm>
+          <a:prstGeom prst="rect">
+            <a:avLst/>
+          </a:prstGeom>
+        </p:spPr>
+      </p:pic>
+    </p:spTree>
+    <p:extLst>
+      <p:ext uri="{BB962C8B-B14F-4D97-AF65-F5344CB8AC3E}">
+        <p14:creationId xmlns:p14="http://schemas.microsoft.com/office/powerpoint/2010/main" val="2701104143"/>
+      </p:ext>
+    </p:extLst>
+  </p:cSld>
+  <p:clrMapOvr>
+    <a:masterClrMapping/>
+  </p:clrMapOvr>
+</p:sld>
+</file>
+
+<file path=ppt/slides/slide17.xml><?xml version="1.0" encoding="utf-8"?>
+<p:sld xmlns:a="http://schemas.openxmlformats.org/drawingml/2006/main" xmlns:r="http://schemas.openxmlformats.org/officeDocument/2006/relationships" xmlns:p="http://schemas.openxmlformats.org/presentationml/2006/main">
+  <p:cSld>
+    <p:spTree>
+      <p:nvGrpSpPr>
+        <p:cNvPr id="1" name=""/>
+        <p:cNvGrpSpPr/>
+        <p:nvPr/>
+      </p:nvGrpSpPr>
+      <p:grpSpPr>
+        <a:xfrm>
+          <a:off x="0" y="0"/>
+          <a:ext cx="0" cy="0"/>
+          <a:chOff x="0" y="0"/>
+          <a:chExt cx="0" cy="0"/>
+        </a:xfrm>
+      </p:grpSpPr>
+      <p:sp>
+        <p:nvSpPr>
+          <p:cNvPr id="2" name="Title 1">
+            <a:extLst>
+              <a:ext uri="{FF2B5EF4-FFF2-40B4-BE49-F238E27FC236}">
+                <a16:creationId xmlns:a16="http://schemas.microsoft.com/office/drawing/2014/main" id="{4DC6CCA2-6548-4388-9415-49961107B342}"/>
+              </a:ext>
+            </a:extLst>
+          </p:cNvPr>
+          <p:cNvSpPr>
+            <a:spLocks noGrp="1"/>
+          </p:cNvSpPr>
+          <p:nvPr>
+            <p:ph type="title"/>
+          </p:nvPr>
+        </p:nvSpPr>
+        <p:spPr/>
+        <p:txBody>
+          <a:bodyPr/>
+          <a:lstStyle/>
+          <a:p>
+            <a:r>
+              <a:rPr lang="en-GB" dirty="0"/>
+              <a:t>Results – 1920x1280 – 500 ITERATIONS</a:t>
+            </a:r>
+          </a:p>
+        </p:txBody>
+      </p:sp>
+      <p:sp>
+        <p:nvSpPr>
+          <p:cNvPr id="4" name="TextBox 3">
+            <a:extLst>
+              <a:ext uri="{FF2B5EF4-FFF2-40B4-BE49-F238E27FC236}">
+                <a16:creationId xmlns:a16="http://schemas.microsoft.com/office/drawing/2014/main" id="{9F0B53A1-62DA-40FA-8490-738B765A3662}"/>
+              </a:ext>
+            </a:extLst>
+          </p:cNvPr>
+          <p:cNvSpPr txBox="1"/>
+          <p:nvPr/>
+        </p:nvSpPr>
+        <p:spPr>
+          <a:xfrm>
+            <a:off x="6120947" y="2097088"/>
+            <a:ext cx="3256548" cy="2862322"/>
+          </a:xfrm>
+          <a:prstGeom prst="rect">
+            <a:avLst/>
+          </a:prstGeom>
+          <a:noFill/>
+        </p:spPr>
+        <p:txBody>
+          <a:bodyPr wrap="square" rtlCol="0">
+            <a:spAutoFit/>
+          </a:bodyPr>
+          <a:lstStyle/>
+          <a:p>
+            <a:r>
+              <a:rPr lang="en-GB" dirty="0"/>
+              <a:t>Data1 - Mean: 138.552447552</a:t>
+            </a:r>
+          </a:p>
+          <a:p>
+            <a:r>
+              <a:rPr lang="en-GB" dirty="0"/>
+              <a:t>Data1 - Median: 138.0</a:t>
+            </a:r>
+          </a:p>
+          <a:p>
+            <a:r>
+              <a:rPr lang="en-GB" dirty="0"/>
+              <a:t>Data2 - Mean: 136.03996004</a:t>
+            </a:r>
+          </a:p>
+          <a:p>
+            <a:r>
+              <a:rPr lang="en-GB" dirty="0"/>
+              <a:t>Data2 - Median: 136.0</a:t>
+            </a:r>
+          </a:p>
+          <a:p>
+            <a:r>
+              <a:rPr lang="en-GB" dirty="0"/>
+              <a:t>Data3 - Mean: 136.529470529</a:t>
+            </a:r>
+          </a:p>
+          <a:p>
+            <a:r>
+              <a:rPr lang="en-GB" dirty="0"/>
+              <a:t>Data3 - Median: 136.0</a:t>
+            </a:r>
+          </a:p>
+          <a:p>
+            <a:r>
+              <a:rPr lang="en-GB" dirty="0"/>
+              <a:t>Data4 - Mean: 137.585414585</a:t>
+            </a:r>
+          </a:p>
+          <a:p>
+            <a:r>
+              <a:rPr lang="en-GB" dirty="0"/>
+              <a:t>Data4 - Median: 137.0</a:t>
+            </a:r>
+          </a:p>
+          <a:p>
+            <a:r>
+              <a:rPr lang="en-GB" dirty="0"/>
+              <a:t>Data5 - Mean: 137.517482517</a:t>
+            </a:r>
+          </a:p>
+          <a:p>
+            <a:r>
+              <a:rPr lang="en-GB" dirty="0"/>
+              <a:t>Data5 - Median: 137.0</a:t>
+            </a:r>
+          </a:p>
+        </p:txBody>
+      </p:sp>
+      <p:pic>
+        <p:nvPicPr>
+          <p:cNvPr id="5" name="Picture 4">
+            <a:extLst>
+              <a:ext uri="{FF2B5EF4-FFF2-40B4-BE49-F238E27FC236}">
+                <a16:creationId xmlns:a16="http://schemas.microsoft.com/office/drawing/2014/main" id="{38FF5C99-19F0-45D8-AA42-839DB3997AA0}"/>
+              </a:ext>
+            </a:extLst>
+          </p:cNvPr>
+          <p:cNvPicPr>
+            <a:picLocks noChangeAspect="1"/>
+          </p:cNvPicPr>
+          <p:nvPr/>
+        </p:nvPicPr>
+        <p:blipFill>
+          <a:blip r:embed="rId2"/>
+          <a:stretch>
+            <a:fillRect/>
+          </a:stretch>
+        </p:blipFill>
+        <p:spPr>
+          <a:xfrm>
+            <a:off x="1141413" y="2097088"/>
+            <a:ext cx="4979534" cy="3531405"/>
+          </a:xfrm>
+          <a:prstGeom prst="rect">
+            <a:avLst/>
+          </a:prstGeom>
+        </p:spPr>
+      </p:pic>
+    </p:spTree>
+    <p:extLst>
+      <p:ext uri="{BB962C8B-B14F-4D97-AF65-F5344CB8AC3E}">
+        <p14:creationId xmlns:p14="http://schemas.microsoft.com/office/powerpoint/2010/main" val="1482105173"/>
+      </p:ext>
+    </p:extLst>
+  </p:cSld>
+  <p:clrMapOvr>
+    <a:masterClrMapping/>
+  </p:clrMapOvr>
+</p:sld>
+</file>
+
+<file path=ppt/slides/slide18.xml><?xml version="1.0" encoding="utf-8"?>
+<p:sld xmlns:a="http://schemas.openxmlformats.org/drawingml/2006/main" xmlns:r="http://schemas.openxmlformats.org/officeDocument/2006/relationships" xmlns:p="http://schemas.openxmlformats.org/presentationml/2006/main">
+  <p:cSld>
+    <p:spTree>
+      <p:nvGrpSpPr>
+        <p:cNvPr id="1" name=""/>
+        <p:cNvGrpSpPr/>
+        <p:nvPr/>
+      </p:nvGrpSpPr>
+      <p:grpSpPr>
+        <a:xfrm>
+          <a:off x="0" y="0"/>
+          <a:ext cx="0" cy="0"/>
+          <a:chOff x="0" y="0"/>
+          <a:chExt cx="0" cy="0"/>
+        </a:xfrm>
+      </p:grpSpPr>
+      <p:sp>
+        <p:nvSpPr>
+          <p:cNvPr id="2" name="Title 1">
+            <a:extLst>
+              <a:ext uri="{FF2B5EF4-FFF2-40B4-BE49-F238E27FC236}">
+                <a16:creationId xmlns:a16="http://schemas.microsoft.com/office/drawing/2014/main" id="{4DC6CCA2-6548-4388-9415-49961107B342}"/>
+              </a:ext>
+            </a:extLst>
+          </p:cNvPr>
+          <p:cNvSpPr>
+            <a:spLocks noGrp="1"/>
+          </p:cNvSpPr>
+          <p:nvPr>
+            <p:ph type="title"/>
+          </p:nvPr>
+        </p:nvSpPr>
+        <p:spPr/>
+        <p:txBody>
+          <a:bodyPr/>
+          <a:lstStyle/>
+          <a:p>
+            <a:r>
+              <a:rPr lang="en-GB" dirty="0"/>
+              <a:t>Results – 1920x1280 – 2500 ITERATIONS</a:t>
+            </a:r>
+          </a:p>
+        </p:txBody>
+      </p:sp>
+      <p:sp>
+        <p:nvSpPr>
+          <p:cNvPr id="4" name="TextBox 3">
+            <a:extLst>
+              <a:ext uri="{FF2B5EF4-FFF2-40B4-BE49-F238E27FC236}">
+                <a16:creationId xmlns:a16="http://schemas.microsoft.com/office/drawing/2014/main" id="{D288572A-4FBD-443C-A08D-C4D490CA59A6}"/>
+              </a:ext>
+            </a:extLst>
+          </p:cNvPr>
+          <p:cNvSpPr txBox="1"/>
+          <p:nvPr/>
+        </p:nvSpPr>
+        <p:spPr>
+          <a:xfrm>
+            <a:off x="6120947" y="2097088"/>
+            <a:ext cx="3256548" cy="2862322"/>
+          </a:xfrm>
+          <a:prstGeom prst="rect">
+            <a:avLst/>
+          </a:prstGeom>
+          <a:noFill/>
+        </p:spPr>
+        <p:txBody>
+          <a:bodyPr wrap="square" rtlCol="0">
+            <a:spAutoFit/>
+          </a:bodyPr>
+          <a:lstStyle/>
+          <a:p>
+            <a:r>
+              <a:rPr lang="en-GB" dirty="0"/>
+              <a:t>Data1 - Mean: 606.14985015</a:t>
+            </a:r>
+          </a:p>
+          <a:p>
+            <a:r>
+              <a:rPr lang="en-GB" dirty="0"/>
+              <a:t>Data1 - Median: 606.0</a:t>
+            </a:r>
+          </a:p>
+          <a:p>
+            <a:r>
+              <a:rPr lang="en-GB" dirty="0"/>
+              <a:t>Data2 - Mean: 596.944055944</a:t>
+            </a:r>
+          </a:p>
+          <a:p>
+            <a:r>
+              <a:rPr lang="en-GB" dirty="0"/>
+              <a:t>Data2 - Median: 596.0</a:t>
+            </a:r>
+          </a:p>
+          <a:p>
+            <a:r>
+              <a:rPr lang="en-GB" dirty="0"/>
+              <a:t>Data3 - Mean: 600.948051948</a:t>
+            </a:r>
+          </a:p>
+          <a:p>
+            <a:r>
+              <a:rPr lang="en-GB" dirty="0"/>
+              <a:t>Data3 - Median: 600.0</a:t>
+            </a:r>
+          </a:p>
+          <a:p>
+            <a:r>
+              <a:rPr lang="en-GB" dirty="0"/>
+              <a:t>Data4 - Mean: 605.020979021</a:t>
+            </a:r>
+          </a:p>
+          <a:p>
+            <a:r>
+              <a:rPr lang="en-GB" dirty="0"/>
+              <a:t>Data4 - Median: 604.0</a:t>
+            </a:r>
+          </a:p>
+          <a:p>
+            <a:r>
+              <a:rPr lang="en-GB" dirty="0"/>
+              <a:t>Data5 - Mean: 604.929070929</a:t>
+            </a:r>
+          </a:p>
+          <a:p>
+            <a:r>
+              <a:rPr lang="en-GB" dirty="0"/>
+              <a:t>Data5 - Median: 604.0</a:t>
+            </a:r>
+          </a:p>
+        </p:txBody>
+      </p:sp>
+      <p:pic>
+        <p:nvPicPr>
+          <p:cNvPr id="5" name="Picture 4">
+            <a:extLst>
+              <a:ext uri="{FF2B5EF4-FFF2-40B4-BE49-F238E27FC236}">
+                <a16:creationId xmlns:a16="http://schemas.microsoft.com/office/drawing/2014/main" id="{2AEB4C77-5380-4411-B674-83DBC5A6E0B1}"/>
+              </a:ext>
+            </a:extLst>
+          </p:cNvPr>
+          <p:cNvPicPr>
+            <a:picLocks noChangeAspect="1"/>
+          </p:cNvPicPr>
+          <p:nvPr/>
+        </p:nvPicPr>
+        <p:blipFill>
+          <a:blip r:embed="rId2"/>
+          <a:stretch>
+            <a:fillRect/>
+          </a:stretch>
+        </p:blipFill>
+        <p:spPr>
+          <a:xfrm>
+            <a:off x="1141413" y="2097088"/>
+            <a:ext cx="4979534" cy="3531405"/>
+          </a:xfrm>
+          <a:prstGeom prst="rect">
+            <a:avLst/>
+          </a:prstGeom>
+        </p:spPr>
+      </p:pic>
+    </p:spTree>
+    <p:extLst>
+      <p:ext uri="{BB962C8B-B14F-4D97-AF65-F5344CB8AC3E}">
+        <p14:creationId xmlns:p14="http://schemas.microsoft.com/office/powerpoint/2010/main" val="446266309"/>
+      </p:ext>
+    </p:extLst>
+  </p:cSld>
+  <p:clrMapOvr>
+    <a:masterClrMapping/>
+  </p:clrMapOvr>
+</p:sld>
+</file>
+
+<file path=ppt/slides/slide19.xml><?xml version="1.0" encoding="utf-8"?>
+<p:sld xmlns:a="http://schemas.openxmlformats.org/drawingml/2006/main" xmlns:r="http://schemas.openxmlformats.org/officeDocument/2006/relationships" xmlns:p="http://schemas.openxmlformats.org/presentationml/2006/main">
+  <p:cSld>
+    <p:spTree>
+      <p:nvGrpSpPr>
+        <p:cNvPr id="1" name=""/>
+        <p:cNvGrpSpPr/>
+        <p:nvPr/>
+      </p:nvGrpSpPr>
+      <p:grpSpPr>
+        <a:xfrm>
+          <a:off x="0" y="0"/>
+          <a:ext cx="0" cy="0"/>
+          <a:chOff x="0" y="0"/>
+          <a:chExt cx="0" cy="0"/>
+        </a:xfrm>
+      </p:grpSpPr>
+      <p:sp>
+        <p:nvSpPr>
+          <p:cNvPr id="2" name="Title 1">
+            <a:extLst>
+              <a:ext uri="{FF2B5EF4-FFF2-40B4-BE49-F238E27FC236}">
+                <a16:creationId xmlns:a16="http://schemas.microsoft.com/office/drawing/2014/main" id="{4DC6CCA2-6548-4388-9415-49961107B342}"/>
+              </a:ext>
+            </a:extLst>
+          </p:cNvPr>
+          <p:cNvSpPr>
+            <a:spLocks noGrp="1"/>
+          </p:cNvSpPr>
+          <p:nvPr>
+            <p:ph type="title"/>
+          </p:nvPr>
+        </p:nvSpPr>
+        <p:spPr/>
+        <p:txBody>
+          <a:bodyPr/>
+          <a:lstStyle/>
+          <a:p>
+            <a:r>
+              <a:rPr lang="en-GB" dirty="0"/>
+              <a:t>Results – 1920x1280 – 5000 ITERATIONS</a:t>
+            </a:r>
+          </a:p>
+        </p:txBody>
+      </p:sp>
+      <p:sp>
+        <p:nvSpPr>
+          <p:cNvPr id="4" name="TextBox 3">
+            <a:extLst>
+              <a:ext uri="{FF2B5EF4-FFF2-40B4-BE49-F238E27FC236}">
+                <a16:creationId xmlns:a16="http://schemas.microsoft.com/office/drawing/2014/main" id="{93CD5A57-518F-4F38-8F55-620A84B6E512}"/>
+              </a:ext>
+            </a:extLst>
+          </p:cNvPr>
+          <p:cNvSpPr txBox="1"/>
+          <p:nvPr/>
+        </p:nvSpPr>
+        <p:spPr>
+          <a:xfrm>
+            <a:off x="6209868" y="2097088"/>
+            <a:ext cx="3256548" cy="2862322"/>
+          </a:xfrm>
+          <a:prstGeom prst="rect">
+            <a:avLst/>
+          </a:prstGeom>
+          <a:noFill/>
+        </p:spPr>
+        <p:txBody>
+          <a:bodyPr wrap="square" rtlCol="0">
+            <a:spAutoFit/>
+          </a:bodyPr>
+          <a:lstStyle/>
+          <a:p>
+            <a:r>
+              <a:rPr lang="en-GB" dirty="0"/>
+              <a:t>Data1 - Mean: 1190.27072927</a:t>
+            </a:r>
+          </a:p>
+          <a:p>
+            <a:r>
+              <a:rPr lang="en-GB" dirty="0"/>
+              <a:t>Data1 - Median: 1190.0</a:t>
+            </a:r>
+          </a:p>
+          <a:p>
+            <a:r>
+              <a:rPr lang="en-GB" dirty="0"/>
+              <a:t>Data2 - Mean: 1171.91808192</a:t>
+            </a:r>
+          </a:p>
+          <a:p>
+            <a:r>
+              <a:rPr lang="en-GB" dirty="0"/>
+              <a:t>Data2 - Median: 1171.0</a:t>
+            </a:r>
+          </a:p>
+          <a:p>
+            <a:r>
+              <a:rPr lang="en-GB" dirty="0"/>
+              <a:t>Data3 - Mean: 1178.58941059</a:t>
+            </a:r>
+          </a:p>
+          <a:p>
+            <a:r>
+              <a:rPr lang="en-GB" dirty="0"/>
+              <a:t>Data3 - Median: 1178.0</a:t>
+            </a:r>
+          </a:p>
+          <a:p>
+            <a:r>
+              <a:rPr lang="en-GB" dirty="0"/>
+              <a:t>Data4 - Mean: 1187.05394605</a:t>
+            </a:r>
+          </a:p>
+          <a:p>
+            <a:r>
+              <a:rPr lang="en-GB" dirty="0"/>
+              <a:t>Data4 - Median: 1187.0</a:t>
+            </a:r>
+          </a:p>
+          <a:p>
+            <a:r>
+              <a:rPr lang="en-GB" dirty="0"/>
+              <a:t>Data5 - Mean: 1187.07992008</a:t>
+            </a:r>
+          </a:p>
+          <a:p>
+            <a:r>
+              <a:rPr lang="en-GB" dirty="0"/>
+              <a:t>Data5 - Median: 1187.0</a:t>
+            </a:r>
+          </a:p>
+        </p:txBody>
+      </p:sp>
+      <p:pic>
+        <p:nvPicPr>
+          <p:cNvPr id="5" name="Picture 4">
+            <a:extLst>
+              <a:ext uri="{FF2B5EF4-FFF2-40B4-BE49-F238E27FC236}">
+                <a16:creationId xmlns:a16="http://schemas.microsoft.com/office/drawing/2014/main" id="{930D4402-62CA-413D-9762-66E76126FDFD}"/>
+              </a:ext>
+            </a:extLst>
+          </p:cNvPr>
+          <p:cNvPicPr>
+            <a:picLocks noChangeAspect="1"/>
+          </p:cNvPicPr>
+          <p:nvPr/>
+        </p:nvPicPr>
+        <p:blipFill>
+          <a:blip r:embed="rId2"/>
+          <a:stretch>
+            <a:fillRect/>
+          </a:stretch>
+        </p:blipFill>
+        <p:spPr>
+          <a:xfrm>
+            <a:off x="1141413" y="2097088"/>
+            <a:ext cx="5068455" cy="3531405"/>
+          </a:xfrm>
+          <a:prstGeom prst="rect">
+            <a:avLst/>
+          </a:prstGeom>
+        </p:spPr>
+      </p:pic>
+    </p:spTree>
+    <p:extLst>
+      <p:ext uri="{BB962C8B-B14F-4D97-AF65-F5344CB8AC3E}">
+        <p14:creationId xmlns:p14="http://schemas.microsoft.com/office/powerpoint/2010/main" val="2625895482"/>
       </p:ext>
     </p:extLst>
   </p:cSld>
@@ -12775,35 +14289,29 @@
           <a:p>
             <a:pPr lvl="1"/>
             <a:r>
-              <a:rPr lang="en-GB" dirty="0" smtClean="0"/>
+              <a:rPr lang="en-GB" dirty="0"/>
               <a:t>Parallelised using GPU</a:t>
             </a:r>
           </a:p>
           <a:p>
             <a:pPr lvl="1"/>
             <a:r>
-              <a:rPr lang="en-GB" dirty="0" smtClean="0"/>
+              <a:rPr lang="en-GB" dirty="0"/>
               <a:t>Lab exercise used as a basis</a:t>
             </a:r>
-            <a:endParaRPr lang="en-GB" dirty="0"/>
-          </a:p>
-          <a:p>
-            <a:r>
-              <a:rPr lang="en-GB" dirty="0"/>
-              <a:t>External </a:t>
-            </a:r>
-            <a:r>
-              <a:rPr lang="en-GB" dirty="0" smtClean="0"/>
-              <a:t>Libraries</a:t>
+          </a:p>
+          <a:p>
+            <a:r>
+              <a:rPr lang="en-GB" dirty="0"/>
+              <a:t>External Libraries</a:t>
             </a:r>
           </a:p>
           <a:p>
             <a:pPr lvl="1"/>
             <a:r>
-              <a:rPr lang="en-GB" dirty="0" smtClean="0"/>
+              <a:rPr lang="en-GB" dirty="0"/>
               <a:t>OpenGL (Year 2, Semester 1 base project file)</a:t>
             </a:r>
-            <a:endParaRPr lang="en-GB" dirty="0"/>
           </a:p>
           <a:p>
             <a:endParaRPr lang="en-GB" dirty="0"/>
@@ -12814,6 +14322,454 @@
     <p:extLst>
       <p:ext uri="{BB962C8B-B14F-4D97-AF65-F5344CB8AC3E}">
         <p14:creationId xmlns:p14="http://schemas.microsoft.com/office/powerpoint/2010/main" val="1512591119"/>
+      </p:ext>
+    </p:extLst>
+  </p:cSld>
+  <p:clrMapOvr>
+    <a:masterClrMapping/>
+  </p:clrMapOvr>
+</p:sld>
+</file>
+
+<file path=ppt/slides/slide20.xml><?xml version="1.0" encoding="utf-8"?>
+<p:sld xmlns:a="http://schemas.openxmlformats.org/drawingml/2006/main" xmlns:r="http://schemas.openxmlformats.org/officeDocument/2006/relationships" xmlns:p="http://schemas.openxmlformats.org/presentationml/2006/main">
+  <p:cSld>
+    <p:spTree>
+      <p:nvGrpSpPr>
+        <p:cNvPr id="1" name=""/>
+        <p:cNvGrpSpPr/>
+        <p:nvPr/>
+      </p:nvGrpSpPr>
+      <p:grpSpPr>
+        <a:xfrm>
+          <a:off x="0" y="0"/>
+          <a:ext cx="0" cy="0"/>
+          <a:chOff x="0" y="0"/>
+          <a:chExt cx="0" cy="0"/>
+        </a:xfrm>
+      </p:grpSpPr>
+      <p:sp>
+        <p:nvSpPr>
+          <p:cNvPr id="2" name="Title 1">
+            <a:extLst>
+              <a:ext uri="{FF2B5EF4-FFF2-40B4-BE49-F238E27FC236}">
+                <a16:creationId xmlns:a16="http://schemas.microsoft.com/office/drawing/2014/main" id="{8ACCFC07-B641-483A-8E39-67C30A3277C2}"/>
+              </a:ext>
+            </a:extLst>
+          </p:cNvPr>
+          <p:cNvSpPr>
+            <a:spLocks noGrp="1"/>
+          </p:cNvSpPr>
+          <p:nvPr>
+            <p:ph type="title"/>
+          </p:nvPr>
+        </p:nvSpPr>
+        <p:spPr/>
+        <p:txBody>
+          <a:bodyPr/>
+          <a:lstStyle/>
+          <a:p>
+            <a:r>
+              <a:rPr lang="en-GB" dirty="0"/>
+              <a:t>Explanation</a:t>
+            </a:r>
+          </a:p>
+        </p:txBody>
+      </p:sp>
+      <p:sp>
+        <p:nvSpPr>
+          <p:cNvPr id="3" name="Content Placeholder 2">
+            <a:extLst>
+              <a:ext uri="{FF2B5EF4-FFF2-40B4-BE49-F238E27FC236}">
+                <a16:creationId xmlns:a16="http://schemas.microsoft.com/office/drawing/2014/main" id="{E813B84D-6D27-447E-B6D3-1948BA7CC1BE}"/>
+              </a:ext>
+            </a:extLst>
+          </p:cNvPr>
+          <p:cNvSpPr>
+            <a:spLocks noGrp="1"/>
+          </p:cNvSpPr>
+          <p:nvPr>
+            <p:ph idx="1"/>
+          </p:nvPr>
+        </p:nvSpPr>
+        <p:spPr/>
+        <p:txBody>
+          <a:bodyPr/>
+          <a:lstStyle/>
+          <a:p>
+            <a:r>
+              <a:rPr lang="en-GB" dirty="0"/>
+              <a:t>An explanation of these results in terms of the design of your application and your understanding of processor and memory architecture (</a:t>
+            </a:r>
+            <a:r>
+              <a:rPr lang="en-GB" dirty="0" err="1"/>
+              <a:t>i.e</a:t>
+            </a:r>
+            <a:r>
+              <a:rPr lang="en-GB" dirty="0"/>
+              <a:t> a description of why it performs the way it does) on the CPU or GPU.</a:t>
+            </a:r>
+          </a:p>
+        </p:txBody>
+      </p:sp>
+    </p:spTree>
+    <p:extLst>
+      <p:ext uri="{BB962C8B-B14F-4D97-AF65-F5344CB8AC3E}">
+        <p14:creationId xmlns:p14="http://schemas.microsoft.com/office/powerpoint/2010/main" val="2970332598"/>
+      </p:ext>
+    </p:extLst>
+  </p:cSld>
+  <p:clrMapOvr>
+    <a:masterClrMapping/>
+  </p:clrMapOvr>
+</p:sld>
+</file>
+
+<file path=ppt/slides/slide21.xml><?xml version="1.0" encoding="utf-8"?>
+<p:sld xmlns:a="http://schemas.openxmlformats.org/drawingml/2006/main" xmlns:r="http://schemas.openxmlformats.org/officeDocument/2006/relationships" xmlns:p="http://schemas.openxmlformats.org/presentationml/2006/main">
+  <p:cSld>
+    <p:spTree>
+      <p:nvGrpSpPr>
+        <p:cNvPr id="1" name=""/>
+        <p:cNvGrpSpPr/>
+        <p:nvPr/>
+      </p:nvGrpSpPr>
+      <p:grpSpPr>
+        <a:xfrm>
+          <a:off x="0" y="0"/>
+          <a:ext cx="0" cy="0"/>
+          <a:chOff x="0" y="0"/>
+          <a:chExt cx="0" cy="0"/>
+        </a:xfrm>
+      </p:grpSpPr>
+      <p:sp>
+        <p:nvSpPr>
+          <p:cNvPr id="2" name="Title 1">
+            <a:extLst>
+              <a:ext uri="{FF2B5EF4-FFF2-40B4-BE49-F238E27FC236}">
+                <a16:creationId xmlns:a16="http://schemas.microsoft.com/office/drawing/2014/main" id="{2E0DE51D-C29A-4F81-B602-96861C745155}"/>
+              </a:ext>
+            </a:extLst>
+          </p:cNvPr>
+          <p:cNvSpPr>
+            <a:spLocks noGrp="1"/>
+          </p:cNvSpPr>
+          <p:nvPr>
+            <p:ph type="title"/>
+          </p:nvPr>
+        </p:nvSpPr>
+        <p:spPr/>
+        <p:txBody>
+          <a:bodyPr/>
+          <a:lstStyle/>
+          <a:p>
+            <a:r>
+              <a:rPr lang="en-GB" dirty="0"/>
+              <a:t>Key results</a:t>
+            </a:r>
+          </a:p>
+        </p:txBody>
+      </p:sp>
+      <p:sp>
+        <p:nvSpPr>
+          <p:cNvPr id="3" name="Content Placeholder 2">
+            <a:extLst>
+              <a:ext uri="{FF2B5EF4-FFF2-40B4-BE49-F238E27FC236}">
+                <a16:creationId xmlns:a16="http://schemas.microsoft.com/office/drawing/2014/main" id="{2D63B9F8-3B1B-4792-B580-A49FF4390F60}"/>
+              </a:ext>
+            </a:extLst>
+          </p:cNvPr>
+          <p:cNvSpPr>
+            <a:spLocks noGrp="1"/>
+          </p:cNvSpPr>
+          <p:nvPr>
+            <p:ph idx="1"/>
+          </p:nvPr>
+        </p:nvSpPr>
+        <p:spPr/>
+        <p:txBody>
+          <a:bodyPr/>
+          <a:lstStyle/>
+          <a:p>
+            <a:r>
+              <a:rPr lang="en-GB" dirty="0"/>
+              <a:t>Presentation of key results of the performance evaluation (Slides 3 – 5)</a:t>
+            </a:r>
+          </a:p>
+          <a:p>
+            <a:r>
+              <a:rPr lang="en-GB" dirty="0"/>
+              <a:t>Timing against various renderings of Mandelbrot.</a:t>
+            </a:r>
+          </a:p>
+        </p:txBody>
+      </p:sp>
+    </p:spTree>
+    <p:extLst>
+      <p:ext uri="{BB962C8B-B14F-4D97-AF65-F5344CB8AC3E}">
+        <p14:creationId xmlns:p14="http://schemas.microsoft.com/office/powerpoint/2010/main" val="2564361261"/>
+      </p:ext>
+    </p:extLst>
+  </p:cSld>
+  <p:clrMapOvr>
+    <a:masterClrMapping/>
+  </p:clrMapOvr>
+</p:sld>
+</file>
+
+<file path=ppt/slides/slide22.xml><?xml version="1.0" encoding="utf-8"?>
+<p:sld xmlns:a="http://schemas.openxmlformats.org/drawingml/2006/main" xmlns:r="http://schemas.openxmlformats.org/officeDocument/2006/relationships" xmlns:p="http://schemas.openxmlformats.org/presentationml/2006/main">
+  <p:cSld>
+    <p:spTree>
+      <p:nvGrpSpPr>
+        <p:cNvPr id="1" name=""/>
+        <p:cNvGrpSpPr/>
+        <p:nvPr/>
+      </p:nvGrpSpPr>
+      <p:grpSpPr>
+        <a:xfrm>
+          <a:off x="0" y="0"/>
+          <a:ext cx="0" cy="0"/>
+          <a:chOff x="0" y="0"/>
+          <a:chExt cx="0" cy="0"/>
+        </a:xfrm>
+      </p:grpSpPr>
+      <p:sp>
+        <p:nvSpPr>
+          <p:cNvPr id="2" name="Title 1">
+            <a:extLst>
+              <a:ext uri="{FF2B5EF4-FFF2-40B4-BE49-F238E27FC236}">
+                <a16:creationId xmlns:a16="http://schemas.microsoft.com/office/drawing/2014/main" id="{F08D4311-F194-4C6E-8AB8-D46E7031A897}"/>
+              </a:ext>
+            </a:extLst>
+          </p:cNvPr>
+          <p:cNvSpPr>
+            <a:spLocks noGrp="1"/>
+          </p:cNvSpPr>
+          <p:nvPr>
+            <p:ph type="title"/>
+          </p:nvPr>
+        </p:nvSpPr>
+        <p:spPr/>
+        <p:txBody>
+          <a:bodyPr/>
+          <a:lstStyle/>
+          <a:p>
+            <a:r>
+              <a:rPr lang="en-GB" dirty="0"/>
+              <a:t>Critical evaluation</a:t>
+            </a:r>
+          </a:p>
+        </p:txBody>
+      </p:sp>
+      <p:sp>
+        <p:nvSpPr>
+          <p:cNvPr id="3" name="Content Placeholder 2">
+            <a:extLst>
+              <a:ext uri="{FF2B5EF4-FFF2-40B4-BE49-F238E27FC236}">
+                <a16:creationId xmlns:a16="http://schemas.microsoft.com/office/drawing/2014/main" id="{4EC26013-34BE-4AED-8BD4-907A05590B5B}"/>
+              </a:ext>
+            </a:extLst>
+          </p:cNvPr>
+          <p:cNvSpPr>
+            <a:spLocks noGrp="1"/>
+          </p:cNvSpPr>
+          <p:nvPr>
+            <p:ph idx="1"/>
+          </p:nvPr>
+        </p:nvSpPr>
+        <p:spPr/>
+        <p:txBody>
+          <a:bodyPr/>
+          <a:lstStyle/>
+          <a:p>
+            <a:r>
+              <a:rPr lang="en-GB" dirty="0"/>
+              <a:t>A critical evaluation of the effectiveness of your solution, with reference to your performance evaluation.</a:t>
+            </a:r>
+          </a:p>
+        </p:txBody>
+      </p:sp>
+    </p:spTree>
+    <p:extLst>
+      <p:ext uri="{BB962C8B-B14F-4D97-AF65-F5344CB8AC3E}">
+        <p14:creationId xmlns:p14="http://schemas.microsoft.com/office/powerpoint/2010/main" val="3601078021"/>
+      </p:ext>
+    </p:extLst>
+  </p:cSld>
+  <p:clrMapOvr>
+    <a:masterClrMapping/>
+  </p:clrMapOvr>
+</p:sld>
+</file>
+
+<file path=ppt/slides/slide23.xml><?xml version="1.0" encoding="utf-8"?>
+<p:sld xmlns:a="http://schemas.openxmlformats.org/drawingml/2006/main" xmlns:r="http://schemas.openxmlformats.org/officeDocument/2006/relationships" xmlns:p="http://schemas.openxmlformats.org/presentationml/2006/main">
+  <p:cSld>
+    <p:spTree>
+      <p:nvGrpSpPr>
+        <p:cNvPr id="1" name=""/>
+        <p:cNvGrpSpPr/>
+        <p:nvPr/>
+      </p:nvGrpSpPr>
+      <p:grpSpPr>
+        <a:xfrm>
+          <a:off x="0" y="0"/>
+          <a:ext cx="0" cy="0"/>
+          <a:chOff x="0" y="0"/>
+          <a:chExt cx="0" cy="0"/>
+        </a:xfrm>
+      </p:grpSpPr>
+      <p:sp>
+        <p:nvSpPr>
+          <p:cNvPr id="2" name="Title 1">
+            <a:extLst>
+              <a:ext uri="{FF2B5EF4-FFF2-40B4-BE49-F238E27FC236}">
+                <a16:creationId xmlns:a16="http://schemas.microsoft.com/office/drawing/2014/main" id="{EBDBBD2B-AF5B-4F40-9703-4737906965A2}"/>
+              </a:ext>
+            </a:extLst>
+          </p:cNvPr>
+          <p:cNvSpPr>
+            <a:spLocks noGrp="1"/>
+          </p:cNvSpPr>
+          <p:nvPr>
+            <p:ph type="title"/>
+          </p:nvPr>
+        </p:nvSpPr>
+        <p:spPr/>
+        <p:txBody>
+          <a:bodyPr/>
+          <a:lstStyle/>
+          <a:p>
+            <a:r>
+              <a:rPr lang="en-GB" dirty="0"/>
+              <a:t>Technical choices</a:t>
+            </a:r>
+          </a:p>
+        </p:txBody>
+      </p:sp>
+      <p:sp>
+        <p:nvSpPr>
+          <p:cNvPr id="3" name="Content Placeholder 2">
+            <a:extLst>
+              <a:ext uri="{FF2B5EF4-FFF2-40B4-BE49-F238E27FC236}">
+                <a16:creationId xmlns:a16="http://schemas.microsoft.com/office/drawing/2014/main" id="{A6DFCE2A-8360-40B7-82C4-8546CEFCAF4D}"/>
+              </a:ext>
+            </a:extLst>
+          </p:cNvPr>
+          <p:cNvSpPr>
+            <a:spLocks noGrp="1"/>
+          </p:cNvSpPr>
+          <p:nvPr>
+            <p:ph idx="1"/>
+          </p:nvPr>
+        </p:nvSpPr>
+        <p:spPr/>
+        <p:txBody>
+          <a:bodyPr/>
+          <a:lstStyle/>
+          <a:p>
+            <a:r>
+              <a:rPr lang="en-GB" dirty="0"/>
+              <a:t>You must explicitly justify your technical choices, and quantify their effect during performance evaluation, using the knowledge you’ve gained from undertaking the module.</a:t>
+            </a:r>
+          </a:p>
+        </p:txBody>
+      </p:sp>
+    </p:spTree>
+    <p:extLst>
+      <p:ext uri="{BB962C8B-B14F-4D97-AF65-F5344CB8AC3E}">
+        <p14:creationId xmlns:p14="http://schemas.microsoft.com/office/powerpoint/2010/main" val="674413947"/>
+      </p:ext>
+    </p:extLst>
+  </p:cSld>
+  <p:clrMapOvr>
+    <a:masterClrMapping/>
+  </p:clrMapOvr>
+</p:sld>
+</file>
+
+<file path=ppt/slides/slide24.xml><?xml version="1.0" encoding="utf-8"?>
+<p:sld xmlns:a="http://schemas.openxmlformats.org/drawingml/2006/main" xmlns:r="http://schemas.openxmlformats.org/officeDocument/2006/relationships" xmlns:p="http://schemas.openxmlformats.org/presentationml/2006/main">
+  <p:cSld>
+    <p:spTree>
+      <p:nvGrpSpPr>
+        <p:cNvPr id="1" name=""/>
+        <p:cNvGrpSpPr/>
+        <p:nvPr/>
+      </p:nvGrpSpPr>
+      <p:grpSpPr>
+        <a:xfrm>
+          <a:off x="0" y="0"/>
+          <a:ext cx="0" cy="0"/>
+          <a:chOff x="0" y="0"/>
+          <a:chExt cx="0" cy="0"/>
+        </a:xfrm>
+      </p:grpSpPr>
+      <p:sp>
+        <p:nvSpPr>
+          <p:cNvPr id="2" name="Title 1"/>
+          <p:cNvSpPr>
+            <a:spLocks noGrp="1"/>
+          </p:cNvSpPr>
+          <p:nvPr>
+            <p:ph type="title"/>
+          </p:nvPr>
+        </p:nvSpPr>
+        <p:spPr/>
+        <p:txBody>
+          <a:bodyPr/>
+          <a:lstStyle/>
+          <a:p>
+            <a:r>
+              <a:rPr lang="en-GB" dirty="0"/>
+              <a:t>Resources</a:t>
+            </a:r>
+          </a:p>
+        </p:txBody>
+      </p:sp>
+      <p:sp>
+        <p:nvSpPr>
+          <p:cNvPr id="3" name="Content Placeholder 2"/>
+          <p:cNvSpPr>
+            <a:spLocks noGrp="1"/>
+          </p:cNvSpPr>
+          <p:nvPr>
+            <p:ph idx="1"/>
+          </p:nvPr>
+        </p:nvSpPr>
+        <p:spPr/>
+        <p:txBody>
+          <a:bodyPr/>
+          <a:lstStyle/>
+          <a:p>
+            <a:r>
+              <a:rPr lang="en-GB" dirty="0" err="1"/>
+              <a:t>SciPy</a:t>
+            </a:r>
+            <a:r>
+              <a:rPr lang="en-GB" dirty="0"/>
+              <a:t> – Statistics calculations, graphical representations.</a:t>
+            </a:r>
+          </a:p>
+          <a:p>
+            <a:r>
+              <a:rPr lang="en-GB" dirty="0"/>
+              <a:t>Adam Sampson/Ruth Falconer – Lab project which this submission is based off of.</a:t>
+            </a:r>
+          </a:p>
+          <a:p>
+            <a:r>
+              <a:rPr lang="en-GB" dirty="0"/>
+              <a:t>Paul Robertson – OpenGL base project</a:t>
+            </a:r>
+          </a:p>
+        </p:txBody>
+      </p:sp>
+    </p:spTree>
+    <p:extLst>
+      <p:ext uri="{BB962C8B-B14F-4D97-AF65-F5344CB8AC3E}">
+        <p14:creationId xmlns:p14="http://schemas.microsoft.com/office/powerpoint/2010/main" val="1745421668"/>
       </p:ext>
     </p:extLst>
   </p:cSld>
@@ -12891,26 +14847,15 @@
           <a:p>
             <a:r>
               <a:rPr lang="en-GB" dirty="0"/>
-              <a:t>Purpose of the application and the problem you’re trying to solve through parallel </a:t>
-            </a:r>
-            <a:r>
-              <a:rPr lang="en-GB" dirty="0" smtClean="0"/>
-              <a:t>programming</a:t>
-            </a:r>
-          </a:p>
-          <a:p>
-            <a:r>
-              <a:rPr lang="en-GB" dirty="0" smtClean="0"/>
               <a:t>Interactive Mandelbrot via OpenGL</a:t>
             </a:r>
           </a:p>
           <a:p>
             <a:pPr lvl="1"/>
             <a:r>
-              <a:rPr lang="en-GB" dirty="0" smtClean="0"/>
-              <a:t>Run quicker/demonstrate good GPU parallelisable algorithm.</a:t>
-            </a:r>
-            <a:endParaRPr lang="en-GB" dirty="0"/>
+              <a:rPr lang="en-GB" dirty="0"/>
+              <a:t>Demonstrate good GPU parallelisable algorithm.</a:t>
+            </a:r>
           </a:p>
         </p:txBody>
       </p:sp>
@@ -12990,41 +14935,102 @@
         </p:nvSpPr>
         <p:spPr/>
         <p:txBody>
-          <a:bodyPr/>
+          <a:bodyPr>
+            <a:normAutofit/>
+          </a:bodyPr>
           <a:lstStyle/>
           <a:p>
             <a:r>
               <a:rPr lang="en-GB" dirty="0"/>
-              <a:t>How the parallel parts of the code are structured(e.g. in terms of </a:t>
-            </a:r>
-            <a:r>
-              <a:rPr lang="en-GB" dirty="0" smtClean="0"/>
-              <a:t>patterns </a:t>
-            </a:r>
-            <a:r>
-              <a:rPr lang="en-GB" dirty="0"/>
-              <a:t>discussed in the module) and how they are integrated with the rest of your application</a:t>
-            </a:r>
-            <a:r>
-              <a:rPr lang="en-GB" dirty="0" smtClean="0"/>
-              <a:t>.</a:t>
-            </a:r>
-          </a:p>
-          <a:p>
-            <a:r>
-              <a:rPr lang="en-GB" dirty="0" smtClean="0"/>
-              <a:t>SIMD</a:t>
-            </a:r>
-          </a:p>
-          <a:p>
-            <a:r>
-              <a:rPr lang="en-GB" dirty="0" smtClean="0"/>
-              <a:t>Parallel for each?</a:t>
-            </a:r>
-            <a:endParaRPr lang="en-GB" dirty="0"/>
+              <a:t>Pipeline pattern</a:t>
+            </a:r>
+          </a:p>
+          <a:p>
+            <a:r>
+              <a:rPr lang="en-GB" dirty="0"/>
+              <a:t>Single CPU Thread (Host)</a:t>
+            </a:r>
+          </a:p>
+          <a:p>
+            <a:r>
+              <a:rPr lang="en-GB" dirty="0"/>
+              <a:t>SIMD (Device)</a:t>
+            </a:r>
+          </a:p>
+          <a:p>
+            <a:r>
+              <a:rPr lang="en-GB" dirty="0"/>
+              <a:t>OpenGL calls (Kernel)</a:t>
+            </a:r>
+          </a:p>
+          <a:p>
+            <a:r>
+              <a:rPr lang="en-GB" dirty="0"/>
+              <a:t>Mutexes?</a:t>
+            </a:r>
           </a:p>
         </p:txBody>
       </p:sp>
+      <p:pic>
+        <p:nvPicPr>
+          <p:cNvPr id="5" name="Picture 4">
+            <a:extLst>
+              <a:ext uri="{FF2B5EF4-FFF2-40B4-BE49-F238E27FC236}">
+                <a16:creationId xmlns:a16="http://schemas.microsoft.com/office/drawing/2014/main" id="{DF7C078B-7BEB-4004-9FFA-FA287AF9A6E2}"/>
+              </a:ext>
+            </a:extLst>
+          </p:cNvPr>
+          <p:cNvPicPr>
+            <a:picLocks noChangeAspect="1"/>
+          </p:cNvPicPr>
+          <p:nvPr/>
+        </p:nvPicPr>
+        <p:blipFill>
+          <a:blip r:embed="rId2"/>
+          <a:stretch>
+            <a:fillRect/>
+          </a:stretch>
+        </p:blipFill>
+        <p:spPr>
+          <a:xfrm>
+            <a:off x="5320631" y="2249487"/>
+            <a:ext cx="5726780" cy="1478570"/>
+          </a:xfrm>
+          <a:prstGeom prst="rect">
+            <a:avLst/>
+          </a:prstGeom>
+        </p:spPr>
+      </p:pic>
+      <p:pic>
+        <p:nvPicPr>
+          <p:cNvPr id="7" name="Picture 6">
+            <a:extLst>
+              <a:ext uri="{FF2B5EF4-FFF2-40B4-BE49-F238E27FC236}">
+                <a16:creationId xmlns:a16="http://schemas.microsoft.com/office/drawing/2014/main" id="{B84E0209-7CF9-4CDB-99A0-C3568E321EA3}"/>
+              </a:ext>
+            </a:extLst>
+          </p:cNvPr>
+          <p:cNvPicPr>
+            <a:picLocks noChangeAspect="1"/>
+          </p:cNvPicPr>
+          <p:nvPr/>
+        </p:nvPicPr>
+        <p:blipFill>
+          <a:blip r:embed="rId3"/>
+          <a:stretch>
+            <a:fillRect/>
+          </a:stretch>
+        </p:blipFill>
+        <p:spPr>
+          <a:xfrm>
+            <a:off x="3985858" y="4465030"/>
+            <a:ext cx="7061553" cy="1478570"/>
+          </a:xfrm>
+          <a:prstGeom prst="rect">
+            <a:avLst/>
+          </a:prstGeom>
+        </p:spPr>
+      </p:pic>
     </p:spTree>
     <p:extLst>
       <p:ext uri="{BB962C8B-B14F-4D97-AF65-F5344CB8AC3E}">
@@ -13102,53 +15108,31 @@
         <p:spPr/>
         <p:txBody>
           <a:bodyPr>
-            <a:normAutofit lnSpcReduction="10000"/>
+            <a:normAutofit/>
           </a:bodyPr>
           <a:lstStyle/>
           <a:p>
             <a:r>
               <a:rPr lang="en-GB" dirty="0"/>
-              <a:t>How your application makes use of threads and how interactions between threads are managed safely (mutexes, atomic operations or barriers</a:t>
-            </a:r>
-            <a:r>
-              <a:rPr lang="en-GB" dirty="0" smtClean="0"/>
-              <a:t>).</a:t>
-            </a:r>
-          </a:p>
-          <a:p>
-            <a:r>
-              <a:rPr lang="en-GB" dirty="0" smtClean="0"/>
-              <a:t>Single CPU Thread</a:t>
-            </a:r>
-          </a:p>
-          <a:p>
-            <a:r>
-              <a:rPr lang="en-GB" dirty="0" smtClean="0"/>
-              <a:t>Parallel for each?</a:t>
-            </a:r>
-          </a:p>
-          <a:p>
-            <a:r>
-              <a:rPr lang="en-GB" dirty="0" smtClean="0"/>
-              <a:t>Non-tiled GPU utilised function</a:t>
-            </a:r>
-          </a:p>
-          <a:p>
-            <a:r>
-              <a:rPr lang="en-GB" dirty="0" smtClean="0"/>
-              <a:t>No communication between pixels so no interactions therefore </a:t>
-            </a:r>
-            <a:r>
-              <a:rPr lang="en-GB" dirty="0"/>
-              <a:t>no </a:t>
-            </a:r>
-            <a:r>
-              <a:rPr lang="en-GB" dirty="0" err="1"/>
-              <a:t>mutexes</a:t>
-            </a:r>
-            <a:r>
-              <a:rPr lang="en-GB" dirty="0"/>
-              <a:t>, atomic operations or barriers</a:t>
+              <a:t>Single CPU Thread (Host)</a:t>
+            </a:r>
+          </a:p>
+          <a:p>
+            <a:r>
+              <a:rPr lang="en-GB" dirty="0"/>
+              <a:t>Non-tiled GPU kernel vs Tiled GPU kernel</a:t>
+            </a:r>
+          </a:p>
+          <a:p>
+            <a:r>
+              <a:rPr lang="en-GB" dirty="0"/>
+              <a:t>Mandelbrot – Data independent</a:t>
+            </a:r>
+          </a:p>
+          <a:p>
+            <a:r>
+              <a:rPr lang="en-GB" dirty="0"/>
+              <a:t>Multi GPU (future)</a:t>
             </a:r>
           </a:p>
         </p:txBody>
@@ -13236,50 +15220,69 @@
           <a:p>
             <a:r>
               <a:rPr lang="en-GB" dirty="0"/>
-              <a:t>The CPU or GPU specification used for testing depending on your chosen application</a:t>
-            </a:r>
-            <a:r>
-              <a:rPr lang="en-GB" dirty="0" smtClean="0"/>
-              <a:t>.</a:t>
-            </a:r>
-          </a:p>
-          <a:p>
-            <a:r>
-              <a:rPr lang="en-GB" dirty="0" smtClean="0"/>
               <a:t>4506 Lab Computers</a:t>
             </a:r>
           </a:p>
           <a:p>
             <a:pPr lvl="1"/>
             <a:r>
-              <a:rPr lang="en-GB" dirty="0" smtClean="0"/>
+              <a:rPr lang="en-GB" dirty="0"/>
               <a:t>OS – Windows 7 Professional</a:t>
             </a:r>
           </a:p>
           <a:p>
             <a:pPr lvl="1"/>
             <a:r>
-              <a:rPr lang="en-GB" dirty="0" smtClean="0"/>
+              <a:rPr lang="en-GB" dirty="0"/>
               <a:t>GPU – Intel® HD Graphics 2500</a:t>
             </a:r>
           </a:p>
           <a:p>
             <a:pPr lvl="1"/>
             <a:r>
-              <a:rPr lang="en-GB" dirty="0" smtClean="0"/>
+              <a:rPr lang="en-GB" dirty="0"/>
               <a:t>CPU – Intel® Core™ i5-3470S @ 2.90GHz</a:t>
             </a:r>
           </a:p>
           <a:p>
             <a:pPr lvl="1"/>
             <a:r>
-              <a:rPr lang="en-GB" dirty="0" smtClean="0"/>
+              <a:rPr lang="en-GB" dirty="0"/>
               <a:t>RAM – 4GB</a:t>
             </a:r>
-            <a:endParaRPr lang="en-GB" dirty="0"/>
           </a:p>
         </p:txBody>
       </p:sp>
+      <p:pic>
+        <p:nvPicPr>
+          <p:cNvPr id="5" name="Picture 4">
+            <a:extLst>
+              <a:ext uri="{FF2B5EF4-FFF2-40B4-BE49-F238E27FC236}">
+                <a16:creationId xmlns:a16="http://schemas.microsoft.com/office/drawing/2014/main" id="{DE7F5FA3-9433-4152-8387-A976F476229E}"/>
+              </a:ext>
+            </a:extLst>
+          </p:cNvPr>
+          <p:cNvPicPr>
+            <a:picLocks noChangeAspect="1"/>
+          </p:cNvPicPr>
+          <p:nvPr/>
+        </p:nvPicPr>
+        <p:blipFill>
+          <a:blip r:embed="rId2"/>
+          <a:stretch>
+            <a:fillRect/>
+          </a:stretch>
+        </p:blipFill>
+        <p:spPr>
+          <a:xfrm>
+            <a:off x="8075970" y="1201040"/>
+            <a:ext cx="3051652" cy="5038442"/>
+          </a:xfrm>
+          <a:prstGeom prst="rect">
+            <a:avLst/>
+          </a:prstGeom>
+        </p:spPr>
+      </p:pic>
     </p:spTree>
     <p:extLst>
       <p:ext uri="{BB962C8B-B14F-4D97-AF65-F5344CB8AC3E}">
@@ -13360,42 +15363,23 @@
           <a:lstStyle/>
           <a:p>
             <a:r>
-              <a:rPr lang="en-GB" dirty="0" smtClean="0"/>
+              <a:rPr lang="en-GB" dirty="0"/>
               <a:t>Time taken to compute Mandelbrot at various levels. (Iterations, Width/Height) (</a:t>
             </a:r>
             <a:r>
-              <a:rPr lang="en-GB" dirty="0" err="1" smtClean="0"/>
+              <a:rPr lang="en-GB" dirty="0" err="1"/>
               <a:t>ms</a:t>
             </a:r>
             <a:r>
-              <a:rPr lang="en-GB" dirty="0" smtClean="0"/>
+              <a:rPr lang="en-GB" dirty="0"/>
               <a:t>)</a:t>
             </a:r>
           </a:p>
           <a:p>
             <a:pPr lvl="1"/>
             <a:r>
-              <a:rPr lang="en-GB" dirty="0" smtClean="0"/>
-              <a:t>1000 x 500,2500,5000 </a:t>
-            </a:r>
-            <a:r>
-              <a:rPr lang="en-GB" dirty="0" err="1" smtClean="0"/>
-              <a:t>Max_Iters</a:t>
-            </a:r>
-            <a:r>
-              <a:rPr lang="en-GB" dirty="0" smtClean="0"/>
-              <a:t> @ 640x480</a:t>
-            </a:r>
-          </a:p>
-          <a:p>
-            <a:pPr lvl="1"/>
-            <a:r>
-              <a:rPr lang="en-GB" dirty="0" smtClean="0"/>
-              <a:t>1000 </a:t>
-            </a:r>
-            <a:r>
-              <a:rPr lang="en-GB" dirty="0"/>
-              <a:t>x 500,2500,5000 </a:t>
+              <a:rPr lang="en-GB" dirty="0"/>
+              <a:t>1000 x (500,2500,5000 </a:t>
             </a:r>
             <a:r>
               <a:rPr lang="en-GB" dirty="0" err="1"/>
@@ -13403,17 +15387,59 @@
             </a:r>
             <a:r>
               <a:rPr lang="en-GB" dirty="0"/>
-              <a:t> @ </a:t>
-            </a:r>
-            <a:r>
-              <a:rPr lang="en-GB" dirty="0" smtClean="0"/>
-              <a:t>1280x</a:t>
-            </a:r>
-            <a:r>
-              <a:rPr lang="en-GB" dirty="0"/>
-              <a:t>960</a:t>
-            </a:r>
-            <a:endParaRPr lang="en-GB" dirty="0" smtClean="0"/>
+              <a:t>) @ 640x480</a:t>
+            </a:r>
+          </a:p>
+          <a:p>
+            <a:pPr lvl="1"/>
+            <a:r>
+              <a:rPr lang="en-GB" dirty="0"/>
+              <a:t>1000 x (500,2500,5000 </a:t>
+            </a:r>
+            <a:r>
+              <a:rPr lang="en-GB" dirty="0" err="1"/>
+              <a:t>Max_Iters</a:t>
+            </a:r>
+            <a:r>
+              <a:rPr lang="en-GB" dirty="0"/>
+              <a:t>) @ 960x768</a:t>
+            </a:r>
+          </a:p>
+          <a:p>
+            <a:pPr lvl="1"/>
+            <a:r>
+              <a:rPr lang="en-GB" dirty="0"/>
+              <a:t>1000 x (500,2500,5000 </a:t>
+            </a:r>
+            <a:r>
+              <a:rPr lang="en-GB" dirty="0" err="1"/>
+              <a:t>Max_Iters</a:t>
+            </a:r>
+            <a:r>
+              <a:rPr lang="en-GB" dirty="0"/>
+              <a:t>) @ 1280x960</a:t>
+            </a:r>
+          </a:p>
+          <a:p>
+            <a:pPr lvl="1"/>
+            <a:r>
+              <a:rPr lang="en-GB" dirty="0"/>
+              <a:t>1000 x (500,2500,5000 </a:t>
+            </a:r>
+            <a:r>
+              <a:rPr lang="en-GB" dirty="0" err="1"/>
+              <a:t>Max_Iters</a:t>
+            </a:r>
+            <a:r>
+              <a:rPr lang="en-GB" dirty="0"/>
+              <a:t>) @ 1920x1280</a:t>
+            </a:r>
+          </a:p>
+          <a:p>
+            <a:r>
+              <a:rPr lang="en-GB" dirty="0"/>
+              <a:t>Eliminate sources of error</a:t>
+            </a:r>
           </a:p>
           <a:p>
             <a:pPr lvl="1"/>
@@ -13456,7 +15482,7 @@
           <p:cNvPr id="2" name="Title 1">
             <a:extLst>
               <a:ext uri="{FF2B5EF4-FFF2-40B4-BE49-F238E27FC236}">
-                <a16:creationId xmlns:a16="http://schemas.microsoft.com/office/drawing/2014/main" id="{8ACCFC07-B641-483A-8E39-67C30A3277C2}"/>
+                <a16:creationId xmlns:a16="http://schemas.microsoft.com/office/drawing/2014/main" id="{4DC6CCA2-6548-4388-9415-49961107B342}"/>
               </a:ext>
             </a:extLst>
           </p:cNvPr>
@@ -13474,43 +15500,126 @@
           <a:p>
             <a:r>
               <a:rPr lang="en-GB" dirty="0"/>
-              <a:t>Explanation</a:t>
+              <a:t>Results – 640x480 – 500 Iterations</a:t>
             </a:r>
           </a:p>
         </p:txBody>
       </p:sp>
-      <p:sp>
-        <p:nvSpPr>
-          <p:cNvPr id="3" name="Content Placeholder 2">
+      <p:pic>
+        <p:nvPicPr>
+          <p:cNvPr id="4" name="Picture 3">
             <a:extLst>
               <a:ext uri="{FF2B5EF4-FFF2-40B4-BE49-F238E27FC236}">
-                <a16:creationId xmlns:a16="http://schemas.microsoft.com/office/drawing/2014/main" id="{E813B84D-6D27-447E-B6D3-1948BA7CC1BE}"/>
+                <a16:creationId xmlns:a16="http://schemas.microsoft.com/office/drawing/2014/main" id="{A2333139-5C22-417A-A101-63FABC4C3AE8}"/>
               </a:ext>
             </a:extLst>
           </p:cNvPr>
-          <p:cNvSpPr>
-            <a:spLocks noGrp="1"/>
-          </p:cNvSpPr>
-          <p:nvPr>
-            <p:ph idx="1"/>
-          </p:nvPr>
+          <p:cNvPicPr>
+            <a:picLocks noChangeAspect="1"/>
+          </p:cNvPicPr>
+          <p:nvPr/>
+        </p:nvPicPr>
+        <p:blipFill>
+          <a:blip r:embed="rId2"/>
+          <a:stretch>
+            <a:fillRect/>
+          </a:stretch>
+        </p:blipFill>
+        <p:spPr>
+          <a:xfrm>
+            <a:off x="1141412" y="2093077"/>
+            <a:ext cx="4903317" cy="3531405"/>
+          </a:xfrm>
+          <a:prstGeom prst="rect">
+            <a:avLst/>
+          </a:prstGeom>
+        </p:spPr>
+      </p:pic>
+      <p:sp>
+        <p:nvSpPr>
+          <p:cNvPr id="5" name="TextBox 4">
+            <a:extLst>
+              <a:ext uri="{FF2B5EF4-FFF2-40B4-BE49-F238E27FC236}">
+                <a16:creationId xmlns:a16="http://schemas.microsoft.com/office/drawing/2014/main" id="{4CB4905A-A163-4430-9BA5-756DF5E522FF}"/>
+              </a:ext>
+            </a:extLst>
+          </p:cNvPr>
+          <p:cNvSpPr txBox="1"/>
+          <p:nvPr/>
         </p:nvSpPr>
-        <p:spPr/>
+        <p:spPr>
+          <a:xfrm>
+            <a:off x="6044729" y="2093077"/>
+            <a:ext cx="3256548" cy="2862322"/>
+          </a:xfrm>
+          <a:prstGeom prst="rect">
+            <a:avLst/>
+          </a:prstGeom>
+          <a:noFill/>
+        </p:spPr>
         <p:txBody>
-          <a:bodyPr/>
+          <a:bodyPr wrap="square" rtlCol="0">
+            <a:spAutoFit/>
+          </a:bodyPr>
           <a:lstStyle/>
           <a:p>
             <a:r>
               <a:rPr lang="en-GB" dirty="0"/>
-              <a:t>An explanation of these results in terms of the design of your application and your understanding of processor and memory architecture (</a:t>
-            </a:r>
-            <a:r>
-              <a:rPr lang="en-GB" dirty="0" err="1"/>
-              <a:t>i.e</a:t>
-            </a:r>
-            <a:r>
-              <a:rPr lang="en-GB" dirty="0"/>
-              <a:t> a description of why it performs the way it does) on the CPU or GPU.</a:t>
+              <a:t>Data1 - Mean: 18.4105894106</a:t>
+            </a:r>
+          </a:p>
+          <a:p>
+            <a:r>
+              <a:rPr lang="en-GB" dirty="0"/>
+              <a:t>Data1 - Median: 18.0</a:t>
+            </a:r>
+          </a:p>
+          <a:p>
+            <a:r>
+              <a:rPr lang="en-GB" dirty="0"/>
+              <a:t>Data2 - Mean: 17.8291708292</a:t>
+            </a:r>
+          </a:p>
+          <a:p>
+            <a:r>
+              <a:rPr lang="en-GB" dirty="0"/>
+              <a:t>Data2 - Median: 18.0</a:t>
+            </a:r>
+          </a:p>
+          <a:p>
+            <a:r>
+              <a:rPr lang="en-GB" dirty="0"/>
+              <a:t>Data3 - Mean: 18.1508491508</a:t>
+            </a:r>
+          </a:p>
+          <a:p>
+            <a:r>
+              <a:rPr lang="en-GB" dirty="0"/>
+              <a:t>Data3 - Median: 18.0</a:t>
+            </a:r>
+          </a:p>
+          <a:p>
+            <a:r>
+              <a:rPr lang="en-GB" dirty="0"/>
+              <a:t>Data4 - Mean: 18.2137862138</a:t>
+            </a:r>
+          </a:p>
+          <a:p>
+            <a:r>
+              <a:rPr lang="en-GB" dirty="0"/>
+              <a:t>Data4 - Median: 18.0</a:t>
+            </a:r>
+          </a:p>
+          <a:p>
+            <a:r>
+              <a:rPr lang="en-GB" dirty="0"/>
+              <a:t>Data5 - Mean: 18.2157842158</a:t>
+            </a:r>
+          </a:p>
+          <a:p>
+            <a:r>
+              <a:rPr lang="en-GB" dirty="0"/>
+              <a:t>Data5 - Median: 18.0</a:t>
             </a:r>
           </a:p>
         </p:txBody>
@@ -13518,7 +15627,7 @@
     </p:spTree>
     <p:extLst>
       <p:ext uri="{BB962C8B-B14F-4D97-AF65-F5344CB8AC3E}">
-        <p14:creationId xmlns:p14="http://schemas.microsoft.com/office/powerpoint/2010/main" val="2970332598"/>
+        <p14:creationId xmlns:p14="http://schemas.microsoft.com/office/powerpoint/2010/main" val="2753564728"/>
       </p:ext>
     </p:extLst>
   </p:cSld>
@@ -13550,7 +15659,7 @@
           <p:cNvPr id="2" name="Title 1">
             <a:extLst>
               <a:ext uri="{FF2B5EF4-FFF2-40B4-BE49-F238E27FC236}">
-                <a16:creationId xmlns:a16="http://schemas.microsoft.com/office/drawing/2014/main" id="{2E0DE51D-C29A-4F81-B602-96861C745155}"/>
+                <a16:creationId xmlns:a16="http://schemas.microsoft.com/office/drawing/2014/main" id="{4DC6CCA2-6548-4388-9415-49961107B342}"/>
               </a:ext>
             </a:extLst>
           </p:cNvPr>
@@ -13561,61 +15670,146 @@
             <p:ph type="title"/>
           </p:nvPr>
         </p:nvSpPr>
-        <p:spPr/>
+        <p:spPr>
+          <a:xfrm>
+            <a:off x="1141413" y="618518"/>
+            <a:ext cx="9905998" cy="1478570"/>
+          </a:xfrm>
+        </p:spPr>
         <p:txBody>
           <a:bodyPr/>
           <a:lstStyle/>
           <a:p>
             <a:r>
               <a:rPr lang="en-GB" dirty="0"/>
-              <a:t>Key results</a:t>
+              <a:t>Results – 640x480 – 2500 ITERATIONS</a:t>
             </a:r>
           </a:p>
         </p:txBody>
       </p:sp>
-      <p:sp>
-        <p:nvSpPr>
-          <p:cNvPr id="3" name="Content Placeholder 2">
+      <p:pic>
+        <p:nvPicPr>
+          <p:cNvPr id="3" name="Picture 2">
             <a:extLst>
               <a:ext uri="{FF2B5EF4-FFF2-40B4-BE49-F238E27FC236}">
-                <a16:creationId xmlns:a16="http://schemas.microsoft.com/office/drawing/2014/main" id="{2D63B9F8-3B1B-4792-B580-A49FF4390F60}"/>
+                <a16:creationId xmlns:a16="http://schemas.microsoft.com/office/drawing/2014/main" id="{DC91C4DD-6242-4402-82F8-D62F55ED8CAF}"/>
               </a:ext>
             </a:extLst>
           </p:cNvPr>
-          <p:cNvSpPr>
-            <a:spLocks noGrp="1"/>
-          </p:cNvSpPr>
-          <p:nvPr>
-            <p:ph idx="1"/>
-          </p:nvPr>
+          <p:cNvPicPr>
+            <a:picLocks noChangeAspect="1"/>
+          </p:cNvPicPr>
+          <p:nvPr/>
+        </p:nvPicPr>
+        <p:blipFill>
+          <a:blip r:embed="rId2"/>
+          <a:stretch>
+            <a:fillRect/>
+          </a:stretch>
+        </p:blipFill>
+        <p:spPr>
+          <a:xfrm>
+            <a:off x="1141413" y="2097088"/>
+            <a:ext cx="4979534" cy="3531405"/>
+          </a:xfrm>
+          <a:prstGeom prst="rect">
+            <a:avLst/>
+          </a:prstGeom>
+        </p:spPr>
+      </p:pic>
+      <p:sp>
+        <p:nvSpPr>
+          <p:cNvPr id="6" name="TextBox 5">
+            <a:extLst>
+              <a:ext uri="{FF2B5EF4-FFF2-40B4-BE49-F238E27FC236}">
+                <a16:creationId xmlns:a16="http://schemas.microsoft.com/office/drawing/2014/main" id="{185CC1B4-7067-4766-9511-A963B9B3D416}"/>
+              </a:ext>
+            </a:extLst>
+          </p:cNvPr>
+          <p:cNvSpPr txBox="1"/>
+          <p:nvPr/>
         </p:nvSpPr>
-        <p:spPr/>
+        <p:spPr>
+          <a:xfrm>
+            <a:off x="6120947" y="2097088"/>
+            <a:ext cx="3256548" cy="2862322"/>
+          </a:xfrm>
+          <a:prstGeom prst="rect">
+            <a:avLst/>
+          </a:prstGeom>
+          <a:noFill/>
+        </p:spPr>
         <p:txBody>
-          <a:bodyPr/>
+          <a:bodyPr wrap="square" rtlCol="0">
+            <a:spAutoFit/>
+          </a:bodyPr>
           <a:lstStyle/>
           <a:p>
             <a:r>
               <a:rPr lang="en-GB" dirty="0"/>
-              <a:t>Presentation of key results of the performance evaluation (Slides 3 – 5</a:t>
-            </a:r>
-            <a:r>
-              <a:rPr lang="en-GB" dirty="0" smtClean="0"/>
-              <a:t>)</a:t>
-            </a:r>
-          </a:p>
-          <a:p>
-            <a:r>
-              <a:rPr lang="en-GB" dirty="0" smtClean="0"/>
-              <a:t>Timing against various renderings of Mandelbrot.</a:t>
-            </a:r>
-            <a:endParaRPr lang="en-GB" dirty="0"/>
+              <a:t>Data1 - Mean: 80.6573426573</a:t>
+            </a:r>
+          </a:p>
+          <a:p>
+            <a:r>
+              <a:rPr lang="en-GB" dirty="0"/>
+              <a:t>Data1 - Median: 80.0</a:t>
+            </a:r>
+          </a:p>
+          <a:p>
+            <a:r>
+              <a:rPr lang="en-GB" dirty="0"/>
+              <a:t>Data2 - Mean: 77.2767232767</a:t>
+            </a:r>
+          </a:p>
+          <a:p>
+            <a:r>
+              <a:rPr lang="en-GB" dirty="0"/>
+              <a:t>Data2 - Median: 77.0</a:t>
+            </a:r>
+          </a:p>
+          <a:p>
+            <a:r>
+              <a:rPr lang="en-GB" dirty="0"/>
+              <a:t>Data3 - Mean: 78.4095904096</a:t>
+            </a:r>
+          </a:p>
+          <a:p>
+            <a:r>
+              <a:rPr lang="en-GB" dirty="0"/>
+              <a:t>Data3 - Median: 78.0</a:t>
+            </a:r>
+          </a:p>
+          <a:p>
+            <a:r>
+              <a:rPr lang="en-GB" dirty="0"/>
+              <a:t>Data4 - Mean: 80.0799200799</a:t>
+            </a:r>
+          </a:p>
+          <a:p>
+            <a:r>
+              <a:rPr lang="en-GB" dirty="0"/>
+              <a:t>Data4 - Median: 80.0</a:t>
+            </a:r>
+          </a:p>
+          <a:p>
+            <a:r>
+              <a:rPr lang="en-GB" dirty="0"/>
+              <a:t>Data5 - Mean: 80.1378621379</a:t>
+            </a:r>
+          </a:p>
+          <a:p>
+            <a:r>
+              <a:rPr lang="en-GB" dirty="0"/>
+              <a:t>Data5 - Median: 80.0</a:t>
+            </a:r>
           </a:p>
         </p:txBody>
       </p:sp>
     </p:spTree>
     <p:extLst>
       <p:ext uri="{BB962C8B-B14F-4D97-AF65-F5344CB8AC3E}">
-        <p14:creationId xmlns:p14="http://schemas.microsoft.com/office/powerpoint/2010/main" val="2564361261"/>
+        <p14:creationId xmlns:p14="http://schemas.microsoft.com/office/powerpoint/2010/main" val="4060831847"/>
       </p:ext>
     </p:extLst>
   </p:cSld>

</xml_diff>